<commit_message>
current version of powerpoint
</commit_message>
<xml_diff>
--- a/Current_Powerpoint/Froyo_v2.pptx
+++ b/Current_Powerpoint/Froyo_v2.pptx
@@ -5,7 +5,7 @@
     <p:sldMasterId id="2147483768" r:id="rId1"/>
   </p:sldMasterIdLst>
   <p:notesMasterIdLst>
-    <p:notesMasterId r:id="rId25"/>
+    <p:notesMasterId r:id="rId28"/>
   </p:notesMasterIdLst>
   <p:sldIdLst>
     <p:sldId id="256" r:id="rId2"/>
@@ -17,20 +17,23 @@
     <p:sldId id="261" r:id="rId8"/>
     <p:sldId id="275" r:id="rId9"/>
     <p:sldId id="276" r:id="rId10"/>
-    <p:sldId id="277" r:id="rId11"/>
-    <p:sldId id="280" r:id="rId12"/>
-    <p:sldId id="278" r:id="rId13"/>
-    <p:sldId id="279" r:id="rId14"/>
-    <p:sldId id="263" r:id="rId15"/>
-    <p:sldId id="264" r:id="rId16"/>
-    <p:sldId id="272" r:id="rId17"/>
-    <p:sldId id="273" r:id="rId18"/>
-    <p:sldId id="274" r:id="rId19"/>
-    <p:sldId id="265" r:id="rId20"/>
-    <p:sldId id="266" r:id="rId21"/>
-    <p:sldId id="267" r:id="rId22"/>
-    <p:sldId id="268" r:id="rId23"/>
-    <p:sldId id="269" r:id="rId24"/>
+    <p:sldId id="281" r:id="rId11"/>
+    <p:sldId id="277" r:id="rId12"/>
+    <p:sldId id="280" r:id="rId13"/>
+    <p:sldId id="278" r:id="rId14"/>
+    <p:sldId id="282" r:id="rId15"/>
+    <p:sldId id="279" r:id="rId16"/>
+    <p:sldId id="284" r:id="rId17"/>
+    <p:sldId id="264" r:id="rId18"/>
+    <p:sldId id="272" r:id="rId19"/>
+    <p:sldId id="273" r:id="rId20"/>
+    <p:sldId id="274" r:id="rId21"/>
+    <p:sldId id="265" r:id="rId22"/>
+    <p:sldId id="283" r:id="rId23"/>
+    <p:sldId id="266" r:id="rId24"/>
+    <p:sldId id="267" r:id="rId25"/>
+    <p:sldId id="268" r:id="rId26"/>
+    <p:sldId id="269" r:id="rId27"/>
   </p:sldIdLst>
   <p:sldSz cx="12192000" cy="6858000"/>
   <p:notesSz cx="6858000" cy="9144000"/>
@@ -11692,7 +11695,7 @@
   <dgm:whole/>
   <dgm:extLst>
     <a:ext uri="http://schemas.microsoft.com/office/drawing/2008/diagram">
-      <dsp:dataModelExt xmlns:dsp="http://schemas.microsoft.com/office/drawing/2008/diagram" relId="rId6" minVer="http://schemas.openxmlformats.org/drawingml/2006/diagram"/>
+      <dsp:dataModelExt xmlns:dsp="http://schemas.microsoft.com/office/drawing/2008/diagram" relId="rId7" minVer="http://schemas.openxmlformats.org/drawingml/2006/diagram"/>
     </a:ext>
   </dgm:extLst>
 </dgm:dataModel>
@@ -11940,7 +11943,7 @@
   <dgm:whole/>
   <dgm:extLst>
     <a:ext uri="http://schemas.microsoft.com/office/drawing/2008/diagram">
-      <dsp:dataModelExt xmlns:dsp="http://schemas.microsoft.com/office/drawing/2008/diagram" relId="rId11" minVer="http://schemas.openxmlformats.org/drawingml/2006/diagram"/>
+      <dsp:dataModelExt xmlns:dsp="http://schemas.microsoft.com/office/drawing/2008/diagram" relId="rId12" minVer="http://schemas.openxmlformats.org/drawingml/2006/diagram"/>
     </a:ext>
   </dgm:extLst>
 </dgm:dataModel>
@@ -41549,6 +41552,90 @@
           <a:bodyPr/>
           <a:lstStyle/>
           <a:p>
+            <a:endParaRPr lang="en-US" dirty="0"/>
+          </a:p>
+        </p:txBody>
+      </p:sp>
+      <p:sp>
+        <p:nvSpPr>
+          <p:cNvPr id="4" name="Slide Number Placeholder 3"/>
+          <p:cNvSpPr>
+            <a:spLocks noGrp="1"/>
+          </p:cNvSpPr>
+          <p:nvPr>
+            <p:ph type="sldNum" sz="quarter" idx="10"/>
+          </p:nvPr>
+        </p:nvSpPr>
+        <p:spPr/>
+        <p:txBody>
+          <a:bodyPr/>
+          <a:lstStyle/>
+          <a:p>
+            <a:fld id="{2809900D-ACB1-E548-A354-1DF8B52F2E15}" type="slidenum">
+              <a:rPr lang="en-US" smtClean="0"/>
+              <a:t>10</a:t>
+            </a:fld>
+            <a:endParaRPr lang="en-US"/>
+          </a:p>
+        </p:txBody>
+      </p:sp>
+    </p:spTree>
+    <p:extLst>
+      <p:ext uri="{BB962C8B-B14F-4D97-AF65-F5344CB8AC3E}">
+        <p14:creationId xmlns:p14="http://schemas.microsoft.com/office/powerpoint/2010/main" val="406021203"/>
+      </p:ext>
+    </p:extLst>
+  </p:cSld>
+  <p:clrMapOvr>
+    <a:masterClrMapping/>
+  </p:clrMapOvr>
+</p:notes>
+</file>
+
+<file path=ppt/notesSlides/notesSlide3.xml><?xml version="1.0" encoding="utf-8"?>
+<p:notes xmlns:a="http://schemas.openxmlformats.org/drawingml/2006/main" xmlns:r="http://schemas.openxmlformats.org/officeDocument/2006/relationships" xmlns:p="http://schemas.openxmlformats.org/presentationml/2006/main">
+  <p:cSld>
+    <p:spTree>
+      <p:nvGrpSpPr>
+        <p:cNvPr id="1" name=""/>
+        <p:cNvGrpSpPr/>
+        <p:nvPr/>
+      </p:nvGrpSpPr>
+      <p:grpSpPr>
+        <a:xfrm>
+          <a:off x="0" y="0"/>
+          <a:ext cx="0" cy="0"/>
+          <a:chOff x="0" y="0"/>
+          <a:chExt cx="0" cy="0"/>
+        </a:xfrm>
+      </p:grpSpPr>
+      <p:sp>
+        <p:nvSpPr>
+          <p:cNvPr id="2" name="Slide Image Placeholder 1"/>
+          <p:cNvSpPr>
+            <a:spLocks noGrp="1" noRot="1" noChangeAspect="1"/>
+          </p:cNvSpPr>
+          <p:nvPr>
+            <p:ph type="sldImg"/>
+          </p:nvPr>
+        </p:nvSpPr>
+        <p:spPr/>
+      </p:sp>
+      <p:sp>
+        <p:nvSpPr>
+          <p:cNvPr id="3" name="Notes Placeholder 2"/>
+          <p:cNvSpPr>
+            <a:spLocks noGrp="1"/>
+          </p:cNvSpPr>
+          <p:nvPr>
+            <p:ph type="body" idx="1"/>
+          </p:nvPr>
+        </p:nvSpPr>
+        <p:spPr/>
+        <p:txBody>
+          <a:bodyPr/>
+          <a:lstStyle/>
+          <a:p>
             <a:r>
               <a:rPr lang="en-US" dirty="0" smtClean="0"/>
               <a:t>A</a:t>
@@ -41578,7 +41665,7 @@
           <a:p>
             <a:fld id="{81852EEE-C031-0240-809B-A214BD9EDE38}" type="slidenum">
               <a:rPr lang="en-US" smtClean="0"/>
-              <a:t>14</a:t>
+              <a:t>16</a:t>
             </a:fld>
             <a:endParaRPr lang="en-US"/>
           </a:p>
@@ -41587,7 +41674,120 @@
     </p:spTree>
     <p:extLst>
       <p:ext uri="{BB962C8B-B14F-4D97-AF65-F5344CB8AC3E}">
-        <p14:creationId xmlns:p14="http://schemas.microsoft.com/office/powerpoint/2010/main" val="954558320"/>
+        <p14:creationId xmlns:p14="http://schemas.microsoft.com/office/powerpoint/2010/main" val="1008170200"/>
+      </p:ext>
+    </p:extLst>
+  </p:cSld>
+  <p:clrMapOvr>
+    <a:masterClrMapping/>
+  </p:clrMapOvr>
+</p:notes>
+</file>
+
+<file path=ppt/notesSlides/notesSlide4.xml><?xml version="1.0" encoding="utf-8"?>
+<p:notes xmlns:a="http://schemas.openxmlformats.org/drawingml/2006/main" xmlns:r="http://schemas.openxmlformats.org/officeDocument/2006/relationships" xmlns:p="http://schemas.openxmlformats.org/presentationml/2006/main">
+  <p:cSld>
+    <p:spTree>
+      <p:nvGrpSpPr>
+        <p:cNvPr id="1" name=""/>
+        <p:cNvGrpSpPr/>
+        <p:nvPr/>
+      </p:nvGrpSpPr>
+      <p:grpSpPr>
+        <a:xfrm>
+          <a:off x="0" y="0"/>
+          <a:ext cx="0" cy="0"/>
+          <a:chOff x="0" y="0"/>
+          <a:chExt cx="0" cy="0"/>
+        </a:xfrm>
+      </p:grpSpPr>
+      <p:sp>
+        <p:nvSpPr>
+          <p:cNvPr id="2" name="Slide Image Placeholder 1"/>
+          <p:cNvSpPr>
+            <a:spLocks noGrp="1" noRot="1" noChangeAspect="1"/>
+          </p:cNvSpPr>
+          <p:nvPr>
+            <p:ph type="sldImg"/>
+          </p:nvPr>
+        </p:nvSpPr>
+        <p:spPr/>
+      </p:sp>
+      <p:sp>
+        <p:nvSpPr>
+          <p:cNvPr id="3" name="Notes Placeholder 2"/>
+          <p:cNvSpPr>
+            <a:spLocks noGrp="1"/>
+          </p:cNvSpPr>
+          <p:nvPr>
+            <p:ph type="body" idx="1"/>
+          </p:nvPr>
+        </p:nvSpPr>
+        <p:spPr/>
+        <p:txBody>
+          <a:bodyPr/>
+          <a:lstStyle/>
+          <a:p>
+            <a:r>
+              <a:rPr lang="en-US" dirty="0" smtClean="0"/>
+              <a:t>Quick review of what we</a:t>
+            </a:r>
+            <a:r>
+              <a:rPr lang="en-US" baseline="0" dirty="0" smtClean="0"/>
+              <a:t> have. Model that predicts if a sales promotion will be successful, clustering of demographics, </a:t>
+            </a:r>
+          </a:p>
+          <a:p>
+            <a:endParaRPr lang="en-US" baseline="0" dirty="0" smtClean="0"/>
+          </a:p>
+          <a:p>
+            <a:r>
+              <a:rPr lang="en-US" baseline="0" dirty="0" smtClean="0"/>
+              <a:t>Compare with objectives we laid out and what we succeeded with and what we </a:t>
+            </a:r>
+            <a:r>
+              <a:rPr lang="en-US" baseline="0" dirty="0" err="1" smtClean="0"/>
+              <a:t>didn</a:t>
+            </a:r>
+            <a:r>
+              <a:rPr lang="fr-FR" baseline="0" dirty="0" smtClean="0"/>
+              <a:t>’</a:t>
+            </a:r>
+            <a:r>
+              <a:rPr lang="en-US" baseline="0" dirty="0" smtClean="0"/>
+              <a:t>t. </a:t>
+            </a:r>
+            <a:endParaRPr lang="en-US" dirty="0"/>
+          </a:p>
+        </p:txBody>
+      </p:sp>
+      <p:sp>
+        <p:nvSpPr>
+          <p:cNvPr id="4" name="Slide Number Placeholder 3"/>
+          <p:cNvSpPr>
+            <a:spLocks noGrp="1"/>
+          </p:cNvSpPr>
+          <p:nvPr>
+            <p:ph type="sldNum" sz="quarter" idx="10"/>
+          </p:nvPr>
+        </p:nvSpPr>
+        <p:spPr/>
+        <p:txBody>
+          <a:bodyPr/>
+          <a:lstStyle/>
+          <a:p>
+            <a:fld id="{81852EEE-C031-0240-809B-A214BD9EDE38}" type="slidenum">
+              <a:rPr lang="en-US" smtClean="0"/>
+              <a:t>25</a:t>
+            </a:fld>
+            <a:endParaRPr lang="en-US"/>
+          </a:p>
+        </p:txBody>
+      </p:sp>
+    </p:spTree>
+    <p:extLst>
+      <p:ext uri="{BB962C8B-B14F-4D97-AF65-F5344CB8AC3E}">
+        <p14:creationId xmlns:p14="http://schemas.microsoft.com/office/powerpoint/2010/main" val="1087711000"/>
       </p:ext>
     </p:extLst>
   </p:cSld>
@@ -44591,6 +44791,230 @@
           <a:p>
             <a:r>
               <a:rPr lang="en-US" dirty="0" smtClean="0"/>
+              <a:t>Data Exploration </a:t>
+            </a:r>
+            <a:r>
+              <a:rPr lang="en-US" dirty="0" smtClean="0"/>
+              <a:t>– Demographics K-Means</a:t>
+            </a:r>
+            <a:endParaRPr lang="en-US" dirty="0"/>
+          </a:p>
+        </p:txBody>
+      </p:sp>
+      <p:sp>
+        <p:nvSpPr>
+          <p:cNvPr id="5" name="Text Placeholder 4"/>
+          <p:cNvSpPr>
+            <a:spLocks noGrp="1"/>
+          </p:cNvSpPr>
+          <p:nvPr>
+            <p:ph type="body" idx="1"/>
+          </p:nvPr>
+        </p:nvSpPr>
+        <p:spPr/>
+        <p:txBody>
+          <a:bodyPr/>
+          <a:lstStyle/>
+          <a:p>
+            <a:r>
+              <a:rPr lang="en-US" dirty="0" smtClean="0"/>
+              <a:t>K-Means</a:t>
+            </a:r>
+            <a:endParaRPr lang="en-US" dirty="0"/>
+          </a:p>
+        </p:txBody>
+      </p:sp>
+      <p:sp>
+        <p:nvSpPr>
+          <p:cNvPr id="3" name="Content Placeholder 2"/>
+          <p:cNvSpPr>
+            <a:spLocks noGrp="1"/>
+          </p:cNvSpPr>
+          <p:nvPr>
+            <p:ph sz="half" idx="2"/>
+          </p:nvPr>
+        </p:nvSpPr>
+        <p:spPr/>
+        <p:txBody>
+          <a:bodyPr/>
+          <a:lstStyle/>
+          <a:p>
+            <a:r>
+              <a:rPr lang="en-US" dirty="0" smtClean="0"/>
+              <a:t>Can we identify groups of people who purchase yogurt?</a:t>
+            </a:r>
+          </a:p>
+          <a:p>
+            <a:pPr lvl="1"/>
+            <a:r>
+              <a:rPr lang="en-US" dirty="0" smtClean="0"/>
+              <a:t>Identified 12 clusters</a:t>
+            </a:r>
+          </a:p>
+          <a:p>
+            <a:pPr lvl="1"/>
+            <a:r>
+              <a:rPr lang="en-US" dirty="0" smtClean="0"/>
+              <a:t>Clusters were not stable</a:t>
+            </a:r>
+          </a:p>
+          <a:p>
+            <a:pPr lvl="1"/>
+            <a:endParaRPr lang="en-US" dirty="0" smtClean="0"/>
+          </a:p>
+        </p:txBody>
+      </p:sp>
+      <p:sp>
+        <p:nvSpPr>
+          <p:cNvPr id="12" name="Text Placeholder 11"/>
+          <p:cNvSpPr>
+            <a:spLocks noGrp="1"/>
+          </p:cNvSpPr>
+          <p:nvPr>
+            <p:ph type="body" sz="quarter" idx="3"/>
+          </p:nvPr>
+        </p:nvSpPr>
+        <p:spPr/>
+        <p:txBody>
+          <a:bodyPr/>
+          <a:lstStyle/>
+          <a:p>
+            <a:r>
+              <a:rPr lang="en-US" smtClean="0"/>
+              <a:t>Elbow Curve</a:t>
+            </a:r>
+            <a:endParaRPr lang="en-US"/>
+          </a:p>
+        </p:txBody>
+      </p:sp>
+      <p:pic>
+        <p:nvPicPr>
+          <p:cNvPr id="11" name="Content Placeholder 10"/>
+          <p:cNvPicPr>
+            <a:picLocks noGrp="1" noChangeAspect="1"/>
+          </p:cNvPicPr>
+          <p:nvPr>
+            <p:ph sz="quarter" idx="4"/>
+          </p:nvPr>
+        </p:nvPicPr>
+        <p:blipFill>
+          <a:blip r:embed="rId3">
+            <a:extLst>
+              <a:ext uri="{28A0092B-C50C-407E-A947-70E740481C1C}">
+                <a14:useLocalDpi xmlns:a14="http://schemas.microsoft.com/office/drawing/2010/main" val="0"/>
+              </a:ext>
+            </a:extLst>
+          </a:blip>
+          <a:stretch>
+            <a:fillRect/>
+          </a:stretch>
+        </p:blipFill>
+        <p:spPr bwMode="auto">
+          <a:xfrm>
+            <a:off x="6172200" y="2984071"/>
+            <a:ext cx="5183188" cy="2726595"/>
+          </a:xfrm>
+          <a:prstGeom prst="rect">
+            <a:avLst/>
+          </a:prstGeom>
+          <a:noFill/>
+          <a:extLst>
+            <a:ext uri="{909E8E84-426E-40DD-AFC4-6F175D3DCCD1}">
+              <a14:hiddenFill xmlns:a14="http://schemas.microsoft.com/office/drawing/2010/main">
+                <a:solidFill>
+                  <a:srgbClr val="FFFFFF"/>
+                </a:solidFill>
+              </a14:hiddenFill>
+            </a:ext>
+          </a:extLst>
+        </p:spPr>
+      </p:pic>
+      <p:sp>
+        <p:nvSpPr>
+          <p:cNvPr id="10" name="AutoShape 6" descr="data:image/png;base64,iVBORw0KGgoAAAANSUhEUgAABJMAAAJoCAYAAADS9qBkAAAABHNCSVQICAgIfAhkiAAAAAlwSFlzAAALEgAACxIB0t1+/AAAIABJREFUeJzs3XuUXHWV//33JgHC1QAKCiIRuRrQgIo/bySgEIJBYDICA+IgNy/cRhSH+DgiiqKAiKCMERVFdLwAIoIToigBRlEEooCDZkZhIka5yiUYhbCfP6oamtCd/p5Knz5V3e/XWrW6z6nTVbvTH9Ya95y9KzITSZIkSZIkqcQqTRcgSZIkSZKk3mEzSZIkSZIkScVsJkmSJEmSJKmYzSRJkiRJkiQVs5kkSZIkSZKkYjaTJEmSJEmSVMxmkiRJWqGI+OeIuLbf8RMRsfkI13BKRNwTEX8cyfftZRHx44g4tAvqeG1E/HfTdUiSpOFjM0mSJBERd0TEoxHxUEQ83P56dr9LcpDvR6K2TYHjgW0yc+Nhes2nNcQi4r0RcVdEbBsRU9vPX7zcz7ykff5Hw1FDL1i+kdiJzLwuM7cdrpokSVLzxjddgCRJ6goJvDEzf1xwbdRdzHI2A+7NzPuq/mBEjMvMZQM8lf2u+QBwJLBzZv5vRGwI3AO8KiLWy8wH2pf+M/Cb6uX3tGAlmocr+PeXJEk9zDuTJElSnypNojdGxP9GxN0RcdqTL9DygfadTn+KiC9HxDrt574cEe9uf79x+y6fd7aPXxQRz2gWRcTrgXnAxu27pb7UPv+miLg1Iu6PiB9FxDb9fub3EfG+iPgl8EhEDPR/70T72lOAQ4HXZeb/9nv+78ClwD+1r1sF2B/42nL1bRMR8yLivoj474h4c7/n9oyImyLiwYi4MyJO6vfcZu3f/63t5+6OiPf3e/4VEXFD+2cXR8QZg/0hImLviLi5fe3CiNh9gGtOioivDvD+q7SPD2n/PR9qf/2n9r/pv9Nqqj0cEfe3r10tIs5o1704Is6NiNXbz02NiEXtf//FwJf6zi3393lPRPwyIh6IiP+IiNX6Pf++iPhjRPwhIg5b/i4ySZLUPJtJkiSpE/sAO7Yfe/fbzfM24K3AVGBzYB3gM+3n5gPT2t9PBf4X2Ll9vDNwzfJvkplXATOAP2bmupl5aERsBXwdOBZ4DvCfwPciov8d1we0f25iZj4xyO/wCeDNtBpJdy7/1sAF7d8FYDpwC7C474KIWJNWo+tC4Nnt9/xsv8bWI8DBmfks4I3AOyLiTcu9z2uALYE3AB+MiK3b5z8NnNX+2RcB3xroF4iInYCvAO9pX7szcMcgv+/ydxhlv9/j08D0zFwXeDWwIDNvB94B/DQz18nM9ds/9wlgC+Al7a+bAB/s97rPBSYCL6B1x9dA7/1mYHfghcBLgUPatewB/Auwa/u1pw3ws5IkqWE2kyRJUp9L23f6PND+etgKrv14Zj6YmX8AzqJ9Bw9wIHBmZt6ZmY8Cs4F/at8BMx94bfu6nYHTaDVToNVcml9Y537A5Zn5o/YI1RnAGrSaIH0+nZl/zMy/reB1dgPmZuZdAz2ZmdcD67WbV2+l1Vzqbybw+8y8IFt+CVxCq1FCZl6Tmbe1v78V+Eb793zyLYAPZebfM/NXwC9pNVagdWfUFhGxQWY+mpk/H+R3OBT4Ymb+qP0+izPztyv4nQezDNg+IiZk5p8zc0ULs48A3t3++y8BPs5Tf/++1zopMx9bwb//p9vv8xfge8CU9vk3A+dn5u2ZuRT4UAe/iyRJqpnNJEmS1GfvzFw/M9drf/3iCq79Q7/v7wT6FmNv3D7u/9x4YKPM/B2wJCJ2AF4HXA78sd2sqdJMetp7ZGYCi2jdITNQfYM5AHhzRHxoBdd8FTia1h0y31nuuc2A/9duvN0fEQ/QaqZtBBARr2yP4N0dEX8B3k7rDqb+/tzv+0eBtdvfHwZsDdweET+LiDcOUt+mtO7w6li76bc/8E5gcUR8r98dUk8TEc8B1gRu7Pu9ad0ZtkG/y+7JzMeGeNvBfu+Naf0t+yxi5Hd0SZKkIdhMkiRJfar8j/ZN+32/GfDH9vd/bB/3f+4xnmoezAf+EVg1MxfTGm37Z1pjUQsK33v59+irp38DqWQ06re0xsveGRH/Osg1FwLvAq5o3ynT3yLg6nbjra8Jt25mHt1+/mu09i5tkpkTgTkU/htn5v9m5oGZ+Rxad3BdFBFrDHDpIlpjcENZQqsJ1Od5y73fDzJzd1ojar8BPt/31HKvcy+t5s/kfr/3xPaIHYP8TBWLgef3O37BSr6eJEmqgc0kSZLUiRMiYmJEbEprd9E32uf/A3h3REyKiLWBjwLf6Le36Bpad/r07Ue6un18XfsOoxLforUAfJeIGB8R7wWWAj+t+ktk5q9pjbu9NyKOG+D5O2iN5H1ggB+/HNgqIt7SrmPViHh5v7t61gYeyMzH2ruNDlzu5wdtLEXEQRHRdxfTg7QaKgPtfvoi8Lb2v0VEa7H5VgNctwDYOSI2jYhnASf2e68No7XQfE1ajb9H+r3Xn4HnR8Sq7X+PBM4DzmrfpUREbDLQ0u8Ofav9+2zTrmegf3dJktQwm0mSJKnP99qf5tX3uHiQ6xL4LnAjcBOtnTdfaj/3JVqjYdfQGr96lFazqc98Wk2WvpG262jtOyodcaO9E+gttBZ730NrufVemfl4v/qGfJl+r/crYA9aC7CPfMaFmT/JzD8NcP4RWkukD6B1t9Qfae0PWr19ybuAj0TEg7SaIt8crIYBjvcAbouIh4BPAfsPtH8oM2+gtfT8LFpNp6t56q6t/r/jD9vv/yvgBlp/sz6rAMcDd9G682hnWiNvAD8CbgP+FBF3t8+dCPwPcH17fG8eMFADazCD/n0ycy5wNvBjWneO9TUIV7T7SpIkjbAo/38CSpIkSSOn/cl4twCrr+BT+SRJ0gjzziRJkiR1jYjYJyJWi4j1gE8Al9lIkiSpu9hMkiRJUjd5O3A3sJDWDqd3NVuOJElanmNukiRJkiRJKuadSZIkSZIkSSo2vukCSkWEt1BJkiRJkiQNs8yMKtf3TDMJwJE8lTrkkEP48pe/3HQZ6gFmRVWYF5UyK6rCvKiUWVEV5kWlIir1kQDH3CRJkiRJklSBzSSNSpMmTWq6BPUIs6IqzItKmRVVYV5UyqyoCvOiOtlM0qg0bdq0pktQjzArqsK8qJRZURXmRaXMiqowL6qTzSRJkiRJkiQVs5kkSZIkSZKkYtErn5AWEdkrtUqSJEmSJPWCiCAzK32km3cmSZIkSZIkqZjNJI1KV199ddMlqEeYFVVhXlTKrKgK86JSZkVVmBfVyWaSJEmSJEmSirkzSZIkSZIkaYxyZ5IkSZIkSZJqZTNJo5LzwSplVlSFeVEps6IqzItKmRVVYV5UJ5tJkiRJkiRJKubOJEmSJEmSpDHKnUmSJEmSJEmqlc0kjUrOB6uUWVEV5kWlzIqqMC8qZVZUhXlRnWwmSZIkSZIkqZg7kyRJkiRJksYodyZJkiRJkiSpVjaTNCo5H6xSZkVVmBeVMiuqwryolFlRFeZFdbKZJEmSJEmSpGLuTJIkSZIkSRqj3JkkSZIkSZKkWtlM0qjkfLBKmRVVYV5UyqyoCvOiUmZFVZgX1clmkiRJkiRJkoq5M0mSJEmSJGmMcmeSJEmSJEmSamUzSaOS88EqZVZUhXlRKbOiKsyLSpkVVWFeVCebSZIkSZIkSSrmzqQBZCazZ5/OqaeeQESlsUFJkiRJkqSe4c6kYXLxxVdy7rmLueSSeU2XIkmSJEmS1FVsJvUzZ86FTJ48k3/5l2t5+OEzmT37GiZPnsmcORc2XZoqcj5YpcyKqjAvKmVWVIV5USmzoirMi+o0vukCusmRRx7E+utvwNFHXwMES5c+wcc+djSzZk1vujRJkiRJkqSu4M6k5Vx00VwOPfRKHnkkWHvtJzj//Bk2kyRJkiRJ0qjUyc4k70xazsKFizj//D0466zdmTZtHgsXLmq6JEmSJEmSpK7hzqTlzJ59BLNmTWeXXYJly6Zz4omHN12SOuB8sEqZFVVhXlTKrKgK86JSZkVVmBfVyWbSIKZNA//bkyRJkiRJejp3Jg3i0Udhww3hT3+CtdcesbeVJEmSJEkaMZ3sTPLOpEGsuSbssAP85CdNVyJJkiRJktQ9bCatgKNuvcv5YJUyK6rCvKiUWVEV5kWlzIqqMC+qk82kFbCZJEmSJEmS9HTuTFqBRx+F5zwH7r4b1lprRN9akiRJkiSpdu5MGmZrrgk77ujeJEmSJEmSpD42k4bgqFtvcj5YpcyKqjAvKmVWVIV5USmzoirMi+pkM2kINpMkSZIkSZKe4s6kIbg3SZIkSZIkjVbuTKrBmmvCDju4N0mSJEmSJAlsJhVx1K33OB+sUmZFVZgXlTIrqsK8qJRZURXmRXWymVTAZpIkSZIkSVKLO5MKLFkCG20Ef/6ze5MkSZIkSdLo4c6kmqy1FkyZAj/9adOVSJIkSZIkNctmUiFH3XqL88EqZVZUhXlRKbOiKsyLSpkVVWFeVCebSYWmTrWZJEmSJEmS5M6kQkuWwIYbwt13uzdJkiRJkiSNDu5MqpF7kyRJkiRJkmpuJkXE8yPiRxFxW0TcEhHHDnLdtIi4OSJujYgf11nTypg2DebPb7oKlXA+WKXMiqowLyplVlSFeVEps6IqzIvqVPedSY8Dx2fmZOBVwFERsU3/CyLiWcBngZmZuR3w5ppr6phLuCVJkiRJ0lg3ojuTIuJS4JzMvKrfuXcCz8vMDw7xs43uTILW3qSNNmrtTVpzzUZLkSRJkiRJWmldvTMpIiYBU4CfLffUVsD6EfHjiLghIg4eqZqqWmsteOlL3ZskSZIkSZLGrhFpJkXE2sBFwHGZ+chyT48HdgRmAHsA/xYRW4xEXZ2YOtVRt17gfLBKmRVVYV5UyqyoCvOiUmZFVZgX1Wl83W8QEeNpNZK+mpnfHeCSPwD3ZuZSYGlEXAO8FPif5S885JBDmDRpEgATJ05kypQpTJs2DXjqP5SROP7IR0b2/TyufrxgwYKuqsdjjz322OOxddynW+rxuLuP+3RLPR537/GCBQu6qh6Pu/vYvHg82PFZZ53FggULnuyvdKL2nUkRcQGtZtHxgzy/DXAOrbuSVqc1Brd/Zv56uesa35kE8Mgjrb1J99zj3iRJkiRJktTbOtmZVOudSRHxGuAg4JaIuBlI4P3AZkBm5ucz8/aIuBL4FbAM+PzyjaRusvbarb1J118Pu+7adDWSJEmSJEkja5U6Xzwz/yszx2XmlMzcITN3zMy5mTknMz/f77ozMnNyZr4kM8+ps6bhMG0aLHdXsrrM1f6BVMisqArzolJmRVWYF5UyK6rCvKhOtTaTRiubSZIkSZIkaayqfWfScOmWnUnQ2pv03OfC3Xe7N0mSJEmSJPWuTnYmeWdSB9ZeG7bfvrU3SZIkSZIkaSyxmdQhR926m/PBKmVWVIV5USmzoirMi0qZFVVhXlQnm0kdspkkSZIkSZLGIncmdahvb9I998AaazRdjSRJkiRJUnXuTBpB7k2SJEmSJEljkc2kleCoW/dyPlilzIqqMC8qZVZUhXlRKbOiKsyL6mQzaSXYTJIkSZIkSWONO5NWwsMPw/Oe594kSZIkSZLUm9yZNMLWWQe22869SZIkSZIkaeywmbSSpk2D+fObrkLLcz5YpcyKqjAvKmVWVIV5USmzoirMi+pkM2kluTdJkiRJkiSNJe5MWkl9e5PuvRcmTGi6GkmSJEmSpHLuTGqAe5MkSZIkSdJYYjNpGDjq1n2cD1Yps6IqzItKmRVVYV5UyqyoCvOiOtlMGgZTp9pMkiRJkiRJY4M7k4bBQw/Bxhu7N0mSJEmSJPUWdyY1ZN11YfJk+NnPmq5EkiRJkiSpXjaThol7k7qL88EqZVZUhXlRKbOiKsyLSpkVVWFeVCebScPEZpIkSZIkSRoL3Jk0TNybJEmSJEmSeo07kxrk3iRJkiRJkjQW2EwaRlOnOurWLZwPVimzoirMi0qZFVVhXlTKrKgK86I62UwaRu5NkiRJkiRJo507k4aRe5MkSZIkSVIvcWdSw9ZdF178Yvj5z5uuRJIkSZIkqR42k4aZo27dwflglTIrqsK8qJRZURXmRaXMiqowL6qTzaRhZjNJkiRJkiSNZu5MGmbuTZIkSZIkSb3CnUldYN11Ydtt3ZskSZIkSZJGJ5tJNZg2DebPb7qKsc35YJUyK6rCvKiUWVEV5kWlzIqqMC+qk82kGrg3SZIkSZIkjVbuTKrBgw/C85/f2pu0+upNVyNJkiRJkjQwdyZ1iWc9C7bZxr1JkiRJkiRp9LGZVBNH3ZrlfLBKmRVVYV5UyqyoCvOiUmZFVZgX1clmUk1sJkmSJEmSpNHInUk1efBB2GQTuO8+9yZJkiRJkqTu5M6kLtK3N+mGG5quRJIkSZIkafjYTKqRo27NcT5YpcyKqjAvKmVWVIV5USmzoirMi+pkM6lGNpMkSZIkSdJo486kGv3lL7DppnDvve5NkiRJkiRJ3cedSV1m4kTYemv3JkmSJEmSpNHDZlLNHHVrhvPBKmVWVIV5USmzoirMi0qZFVVhXlQnm0k1mzrVZpIkSZIkSRo93JlUs769SffdB6ut1nQ1kiRJkiRJT3FnUheaOBG22sq9SZIkSZIkaXSwmTQC3Js08pwPVimzoirMi0qZFVVhXlTKrKgK86I62UwaATaTJEmSJEnSaOHOpBHg3iRJkiRJktSN3JnUpdybJEmSJEmSRgubSSNk6lRH3UaS88EqZVZUhXlRKbOiKsyLSpkVVWFeVCebSSNk2jSYP7/pKiRJkiRJklaOO5NGyAMPwAte4N4kSZIkSZLUPdyZ1MXWWw+23BJ+8YumK5EkSZIkSeqczaQRNG2ae5NGivPBKmVWVIV5USmzoirMi0qZFVVhXlQnm0kjyGaSJEmSJEnqde5MGkF9e5Puvx9WXbXpaiRJkiRJ0ljnzqQut956sMUW7k2SJEmSJEm9y2bSCHPUbWQ4H6xSZkVVmBeVMiuqwryolFlRFeZFdbKZNMJsJkmSJEmSpF7mzqQRdv/9MGkS3Hefe5MkSZIkSVKz3JnUA9ZfH170IvcmSZIkSZKk3mQzqQGOutXP+WCVMiuqwryolFlRFeZFpcyKqjAvqpPNpAbYTJIkSZIkSb3KnUkNcG+SJEmSJEnqBu5M6hHrrw+bbw433th0JZIkSZIkSdXYTGqIo271cj5YpcyKqjAvKmVWVIV5USmzoirMi+pkM6khNpMkSZIkSVIvcmdSQ9ybJEmSJEmSmubOpB7i3iRJkiRJktSLbCY1yFG3+jgfrFJmRVWYF5UyK6rCvKiUWVEV5kV1spnUoKlTYf78pquQJEmSJEkq586kBt13H7zwhe5NkiRJkiRJzXBnUo/ZYINWM+mmm5quRJIkSZIkqYzNpIa5N6kezgerlFlRFeZFpcyKqjAvKmVWVIV5UZ1sJjXMZpIkSZIkSeol7kxqWGtvUvKOd5zOJz5xAhGVxhQlSZIkSZI65s6kHrTBBrDeeldy7rmLueSSeU2XI0mSJEmStEI2kxo0Z86FTJ48k4ceupYlS85k9uxrmDx5JnPmXNh0aT3P+WCVMiuqwryolFlRFeZFpcyKqjAvqtP4pgsYy4488iDWX38DjjnmGiBYuvQJPvaxo5k1a3rTpUmSJEmSJA3InUkNu+iiuRx66JU89lgQ8QRf/eoMm0mSJEmSJGlEdLIzyTuTGrZw4SLOP38PHn10d04/fR4LFy5quiRJkiRJkqRBuTOpYbNnH8GsWdPZb7/g7runs/fehzdd0qjgfLBKmRVVYV5UyqyoCvOiUmZFVZgX1clmUpdYfXU44gj47GebrkSSJEmSJGlw7kzqInfdBdtvD3fcAeuu23Q1kiRJkiRptOtkZ5J3JnWRTTaB3XaDL3+56UokSZIkSZIGZjOpyxx9dGvU7Yknmq6ktzkfrFJmRVWYF5UyK6rCvKiUWVEV5kV1spnUZV77WlhjDfjBD5quRJIkSZIk6ZncmdSFvvhF+M534PLLm65EkiRJkiSNZp3sTLKZ1IX++ld4wQvg+uvhRS9quhpJkiRJkjRauYB7lFhjDXjb2+Dcc5uupHc5H6xSZkVVmBeVMiuqwryolFlRFeZFdbKZ1KXe9S74yldgyZKmK5EkSZIkSXqKY25dbJ99YMYMePvbm65EkiRJkiSNRo65jTLHHAOf+QyMsR6aJEmSJEnqYjaTutiuu8KyZTB/ftOV9B7ng1XKrKgK86JSZkVVmBeVMiuqwryoTjaTulgEHH00nHNO05VIkiRJkiS1uDOpyz3yCLzgBbBgQeurJEmSJEnScHFn0ii09tpw8MHwuc81XYkkSZIkSZLNpJ5w1FHwhS/A0qVNV9I7nA9WKbOiKsyLSpkVVWFeVMqsqArzojrZTOoBW20FL3sZfOMbTVciSZIkSZLGOncm9Yjvfx/+7d/gF79oLeaWJEmSJElaWe5MGsX22AMefBCuv77pSiRJkiRJ0lhmM6lHrLJKa3fSOec0XUlvcD5YpcyKqjAvKmVWVIV5USmzoirMi+pkM6mHvO1t8J//CYsXN12JJEmSJEkaq9yZ1GPe+U7YaCP40IearkSSJEmSJPW6TnYm2UzqMbfeCrvtBnfeCaut1nQ1kiRJkiSpl7mAewzYbjvYdlu4+OKmK+luzgerlFlRFeZFpcyKqjAvKmVWVIV5UZ1sJvWgY45xEbckSZIkSWqGY2496PHH4UUvgksugZe9rOlqJEmSJElSr3LMbYwYP761iPszn2m6EkmSJEmSNNbYTOpRhx8Ol14K99zTdCXdyflglTIrqsK8qJRZURXmRaXMiqowL6qTzaQe9exnw777whe+0HQlkiRJkiRpLHFnUg+76SbYZx/43e9ao2+SJEmSJElVuDNpjNlxR9h0U7jssqYrkSRJkiRJY0WtzaSIeH5E/CgibouIWyLi2BVc+4qIeCwi/qHOmkabY46Bc85puoru43ywSpkVVWFeVMqsqArzolJmRVWYF9Wp7juTHgeOz8zJwKuAoyJim+UviohVgI8DV9Zcz6gzaxb89rdwyy1NVyJJkiRJksaCEd2ZFBGXAudk5lXLnT8O+DvwCuDyzLxkgJ91Z9IgPvxh+OMf4XOfa7oSSZIkSZLUS2rZmRQRa7XvHCIitoqIN0XEqh0UNwmYAvxsufMbA/tk5r8DlYpXy5FHwje/CQ880HQlkiRJkiRptCsZc7sGmBARmwDzgIOBL1d5k4hYG7gIOC4zH1nu6bOAf+1/eZXXFjz3ubDnnnD++U1X0j2cD1Yps6IqzItKmRVVYV5UyqyoCvOiOpV8oHxk5qMRcRhwbmaeFhELSt8gIsbTaiR9NTO/O8AlLwe+EREBPBuYERGPZeYzPqPskEMOYdKkSQBMnDiRKVOmMG3aNOCp/1DG6vFrXnM1p5wCxx03jXHjmq+n6eMFCxZ0VT0ee+yxxx6PreM+3VKPx9193Kdb6vG4e48XLFjQVfV43N3H5sXjwY7POussFixY8GR/pRND7kyKiJuBdwGfAg7LzNsi4pbM3L7oDSIuAO7NzOMLrj0f+J47k6rLhJ12gg99CN74xqarkSRJkiRJvaCWnUnAvwCzge+0G0mbAz8uLOg1wEHArhFxc0TcFBF7RMTbI+LIAX7EblGHIuDoo+Gcc5quRJIkSZIkjWZDNpMyc35mvgk4p338u8w8tuTFM/O/MnNcZk7JzB0yc8fMnJuZczLz8wNcf+hAdyWpzP77w803w29+03Qlzeu7jU8aillRFeZFpcyKqjAvKmVWVIV5UZ2GbCZFxKsi4tfA7e3jl0bEubVXpsomTIDDD4fPfrbpSiRJkiRJ0mhVsjPpZ8A/Apdl5g7tc7dm5nYjUF//OtyZVGDRInjpS+HOO2GddZquRpIkSZIkdbO6diaRmYuWO7Wsypto5Gy6Key6K1xwQdOVSJIkSZKk0aikmbQoIl4NZESsGhHvBf675rq0Eo45Bj7zmdYnvI1VzgerlFlRFeZFpcyKqjAvKmVWVIV5UZ1KmknvAI4CNgHuAqa0j9Wldt4ZVl0VfvjDpiuRJEmSJEmjzQp3JkXEOODYzPzUyJU0aC3uTKrg85+HK66A73636UokSZIkSVK36mRnUskC7hsy8xUrVdkwsJlUzZIlsNlmcMMN8MIXNl2NJEmSJEnqRnUt4L4uIj4TEa+LiB37Hh3WqBGy1lpwyCFw7rlNV9IM54NVyqyoCvOiUmZFVZgXlTIrqsK8qE7jC66Z0v764X7nEth1+MvRcHrXu2CnneDkk2HNNZuuRpIkSZIkjQZDjrl1C8fcOrPXXrD33nD44U1XIkmSJEmSuk0tO5PaL/xGYDIwoe9cZn548J8YfjaTOjNvHpxwAixYAFEpGpIkSZIkabSrZWdSRHwO2B84BgjgzcBmHVWoEfeGN8Df/gbXXtt0JSPL+WCVMiuqwryolFlRFeZFpcyKqjAvqlPJAu5XZ+ZbgQcy82TgVcBW9Zal4bLKKnD00fCZzzRdiSRJkiRJGg2GHHOLiJ9l5isj4nrgH4D7gNsyc4uRKLBfHY65deihh2DSJPjVr+D5z2+6GkmSJEmS1C1qGXMDLo+IicDpwE3AHcB/VC9PTVl3XTjoIPjc55quRJIkSZIk9bohm0mZ+ZHM/EtmXkxrV9I2mflv9Zem4XT00XDeebB0adOVjAzng1XKrKgK86JSZkVVmBeVMiuqwryoTuOHuiAi3jrAOTLzgnpKUh223hqmTIFvfxsOPrjpaiRJkiRJUq8q2Zl0Tr/DCcDrgZsy8x/rLGyAOtyZtJK+9z34yEfg5z9vuhJJkiRJktQNOtmZNGQzaYA3mQh8IzP3qPSDK8lm0spbtgy23BK+/vXk0ktP59RTTyCiUl4kSZIkSdIoUtcC7uUtAV7Ywc+pYePGwVFHwfvedyXnnruYSy6Z13RJtXE+WKXMiqowLyplVlSFeVEps6IqzIvqNGQzKSK+FxGXtR+XA78BvlN/aRpuc+ZcyHnnzeS6667l4YfPZPaKCI/YAAAgAElEQVTsa5g8eSZz5lzYdGmSJEmSJKlHlOxMmtrv8HHgzsz8Q61VDVyHY24rKTO56KK5vO1t17BkyalsuulszjxzKrNmTXfcTZIkSZKkMaiTMbchP80tM+d3XpK6SUS0H0tZZZXjeeCBJ548J0mSJEmSVKJkzO3hiHhogMfDEfHQSBSp4bNw4SK+/OU9OPHET/Lyl89g4cJFTZdUC+eDVcqsqArzolJmRVWYF5UyK6rCvKhOQ96ZBJwFLAa+CgRwEPC8zPxgnYWpHrNnHwHAbrvBVltN56yzGi5IkiRJkiT1lJKdSb/MzJcOda5u7kwafp/9LFx2GVx5ZdOVSJIkSZKkJnSyM2nIMTdgSUQcFBHjImKViDgIWNJZieomRx4Jv/89zJvXdCWSJEmSJKlXlDSTDgT2A/7cfry5fU49btVV4eMfh/e9D5Yta7qa4eV8sEqZFVVhXlTKrKgK86JSZkVVmBfVachmUmbekZl7Z+azM/M5mblPZt4xArVpBOy7L6y1Flx4YdOVSJIkSZKkXlCyM+k04BTgr8Bc4CXAuzNzRNsP7kyqz09+AvvvD7/9LayxRtPVSJIkSZKkkVLXzqTdM/MhYCZwB7AFcEL18tStXv1q2Gkn+PSnm65EkiRJkiR1u5Jm0vj21zcC387MB2usRw059VQ44wy4556mKxkezgerlFlRFeZFpcyKqjAvKmVWVIV5UZ1KmkmXR8TtwMuAqyLiOcDSesvSSNtqKzjgADjllKYrkSRJkiRJ3WzInUkAEbE+8GBmLouItYB1MvNPtVf39BrcmVSzu++GF78Yrr8ettii6WokSZIkSVLdOtmZVNRM6gY2k0bGRz8Kv/wlfOtbTVciSZIkSZLqVtcCbo0h7343/PSnrbuTepnzwSplVlSFeVEps6IqzItKmRVVYV5Up0GbSRHxmvbX1UeuHDVtzTXhwx+GE04AbwSTJEmSJEnLG3TMLSJuzMyXRcRNmbnjCNc1UD2OuY2QZctghx1aTaV99mm6GkmSJEmSVJdh3ZkUEdcDvwL2Br65/POZeWwnRXbKZtLImjsXjjsObr0VVl216WokSZIkSVIdhntn0kzgR8BS4MYBHhrFpk+HTTeFL3yh6Uo643ywSpkVVWFeVMqsqArzolJmRVWYF9Vp/GBPZOa9wDci4r8z85cjWJO6QAScfjrsuSe85S2wzjpNVyRJkiRJkrrBoGNuT14Q8XzgHOA17VPXAsdl5h9qrm35Ohxza8DBB8MLX9janyRJkiRJkkaXYd2Z1O9FfwB8Hfhq+9RbgIMyc7eOquyQzaRm3Hkn7Lgj3HILbLxx09VIkiRJkqThNNw7k/psmJnnZ+bj7ceXged0VKF6zmabwWGHwUknNV1JNc4Hq5RZURXmRaXMiqowLyplVlSFeVGdSppJ90bEWyJiXPvxFuC+ugtT93j/++G734Xbbmu6EkmSJEmS1LSSMbfNaO1MehWQwE+AYzPz/+ov72l1OObWoE99Cq66Ci6/vOlKJEmSJEnScKllZ1K3sJnUrL/9DbbdFr74Rdhll6arkSRJkiRJw6GunUkSq68OH/sYnHACPPFE09UMzflglTIrqsK8qJRZURXmRaXMiqowL6qTzSQV228/WGUV+OY3m65EkiRJkiQ1xTE3VTJ/PhxyCNx+e+tuJUmSJEmS1Ltq2ZkUEROBtwKTgPF95zPz2A5q7JjNpO7xpjfBtGlw/PFNVyJJkiRJklZGXTuTvk+rkXQLcGO/h8aoT3wCPv5xeOCBpisZnPPBKmVWVIV5USmzoirMi0qZFVVhXlSn8UNfwoTM9B4UPWnbbWHffeGjH4Uzzmi6GkmSJEmSNJJKxtzeDTwCXA78re98Zt5fb2nPqMMxty7ypz/B5Mlw440waVLT1UiSJEmSpE7UtTPpKOCjwF+AvoszMzfvqMoO2UzqPh/6ECxcCF/7WtOVSJIkSZKkTtS1M+k9wBaZOSkzX9h+jGgjSd3pve+FH/+4dXdSt3E+WKXMiqowLyplVlSFeVEps6IqzIvqVNJM+h/g0boLUe9Ze2046SQ44QTwpjFJkiRJksaGkjG37wCTgR/z9J1Jx9Zb2jPqcMytCz3+OGy/PXzyk7Dnnk1XI0mSJEmSqqhrZ9I/D3Q+M79S5Y1Wls2k7nXZZfD+98OCBTC+5PMBJUmSJElSV6hlZ1JmfmWgR+dlarTZay/YYAP4ShelwvlglTIrqsK8qJRZURXmRaXMiqowL6rTkPeRRMTveepT3J7kEm71iYDTT4d994UDDoC11mq6IkmSJEmSVJeSMbcN+h1OAN4MrJ+ZH6yzsAHqcMytyx1wAGy3HXzgA01XIkmSJEmSStSyM2mQN7oxM19W+QdXgs2k7ve738FOO8Ftt8FGGzVdjSRJkiRJGkotO5MiYsd+j5dHxDsoGI/T2LP55nDwwfDhDzddifPBKmdWVIV5USmzoirMi0qZFVVhXlSnkqbQJ/t9/zhwB7BfLdWo533gA7DNNnDssbD11k1XI0mSJEmShltHY25NcMytd5x2Glx/PVxySdOVSJIkSZKkFalrzO24iFg3Wr4QETdFxO6dl6nR7thj4cYb4brrmq5EkiRJkiQNtyGbScChmfkQsDuwAXAw8PFaq1JPmzABTjkFTjgBmrqZzPlglTIrqsK8qJRZURXmRaXMiqowL6pTSTOp71anPYELMvO2fuekAR10ECxdChdf3HQlkiRJkiRpOA25Mykizgc2AV4IvBQYB1ydmS+rv7yn1eHOpB7zwx/CO98Jt96anHTS6Zx66glE2IeUJEmSJKlbdLIzqaSZtAowBfhdZv4lIjYANsnMX3VeanU2k3rTjBnwvOfN5aKLruT88/dg1qzpTZckSZIkSZLaalnAnZlPZOZNmfmX9vF9I91IUm+aM+dCfvvbmXzlK9fy8MNnMnv2NUyePJM5cy6s/b2dD1Yps6IqzItKmRVVYV5UyqyoCvOiOo1vugCNXkceeRDrr78Bhx56DY88Evz1r0/wsY8d7d1JkiRJkiT1sCHH3LqFY2696aKL5nLooVcSESxZ8gRf+9oM9t/fZpIkSZIkSd1g2MfcImJcRNy+cmVpLFu4cBHnn78H99zzSaZMmcFHP7qIxx9vuipJkiRJktSpFTaTMnMZ8JuIeMEI1aNRZvbsI5g1azqrrRZcd910nvvcwznsMHjiiXrf1/lglTIrqsK8qJRZURXmRaXMiqowL6rTkAu4gfWA2yLiqoi4rO9Rd2EafSZMgEsvhd//Ho46CpxalCRJkiSp9wy5Mykipg50PjPn11LR4HW4M2mUeOgh2G03eO1r4YwzICpNZkqSJEmSpOHSyc6kogXcEbEZsGVm/jAi1gTGZebDHdbZEZtJo8v998Ouu8Kb3gQf/nDT1UiSJEmSNDYN+wLu9oseAVwEzGmf2gS4tHp50lPWXx/mzYNvfxs+/vHhf33ng1XKrKgK86JSZkVVmBeVMiuqwryoTuMLrjkK2An4GUBmLoyIDWutSmPChhvCD38IO+8Ma64Jxx7bdEWSJEmSJGkoJTuTfpaZr4yImzNzh4gYD9yUmS8ZmRKfrMMxt1Hqjjtg6lT44AfhsMOarkaSJEmSpLGjkzG3kjuT5kfE+4E1ImI34F3A9zopUBrIpEmtO5SmTYM11oADD2y6IkmSJEmSNJghdyYBJwL3ALcAbwe+n5n/X61VaczZcsvWDqXjj4fvfGflX8/5YJUyK6rCvKiUWVEV5kWlzIqqMC+qU8mdScdk5qeB8/pORMRx7XPSsJk8Gb7/fdhjD5gwAWbMaLoiSZIkSZK0vJKdSTdl5o7Lnbs5M3eotbJn1uHOpDHipz+FvfeGb32rNfomSZIkSZLq0cnOpEGbSRHxT8CBwGuBa/s9tS6wLDNf32mhnbCZNLZcfTXstx9897vwqlc1XY0kSZIkSaNTJ82kFe1M+gnwSeD29te+x/HA9E6LlEpMmwYXXNC6Q+mmm6r/vPPBKmVWVIV5USmzoirMi0qZFVVhXlSnQZtJmXlnZl4NvAG4NjPnA4uB5wOVOlZSJ/bYA+bMgT33hFtvbboaSZIkSZIEZTuTbgReB6wH/BdwA/D3zDyo/vKeVodjbmPU178OJ5zQGn3bcsumq5EkSZIkafToZMyt5NPcIjMfjYjDgHMz87SIWNBZiVJ1Bx4If/0rvOENMH8+TJrUdEWSJEmSJI1dK9qZ1Cci4lXAQcAV7XPj6itJeqbDDoP3vhde/3q4666hr3c+WKXMiqowLyplVlSFeVEps6IqzIvqVHJn0r8As4HvZOZtEbE58ON6y5Ke6Zhj4NFHn7pDacMNm65IkiRJkqSxZ8idSd3CnUnq88EPwmWXwY9+BOuv33Q1kiRJkiT1rk52JpUs4P4x8IyLMnPXauWtHJtJ6pPZGnm77jr4wQ9g3XWbrkiSJEmSpN7USTOpZGfSe4ET2o9/AxYAv6henjQ8IuCMM2DHHWHmTFiy5JnXOB+sUmZFVZgXlTIrqsK8qJRZURXmRXUaspmUmTf2e/xXZh4PTKu/NGlwEfDZz8Lmm8O++8LSpU1XJEmSJEnS2FAy5tZ/K80qwMuAszNz6zoLG6AOx9z0DI8/Dgce2GomXXwxrLpq0xVJkiRJktQ76hpzu5HWWNuNwE+B9wCHVS9PGn7jx8OFF7b2KL3lLbBsGWQmJ554GjYfJUmSJEkafiVjbi/MzM3bX7fMzN0z87qRKE4qsdpq8O1vw/33w2GHwUUXXcnZZ/+cSy6Z13Rp6gHOkqsK86JSZkVVmBeVMiuqwryoToM2kyLiH1b0GMkipaFMmAB77XUh3/rWTI444lr++tejmD37GiZPnsmcORc2XZ4kSZIkSaPGoDuTIuL8FfxcZuah9ZQ0MHcmaSiZyQUXzOXII6/h738/lU03nc2ZZ05l1qzpRFQa/5QkSZIkaUzoZGfS+MGeyMy3rXxJ0siJCNZaK1h99aWMH388ixc/wbJlYSNJkiRJkqRhNOTOpIj4WERM7He8XkScUm9ZUmcWLlzE+efvwcUX78X228/g5JMXsXRp01WpmzlLrirMi0qZFVVhXlTKrKgK86I6lXya24zM/EvfQWY+AOxZX0lS52bPPoJZs6YzYUJw/fXT2W67w5k5Ex55pOnKJEmSJEkaHQbdmfTkBRG/Al6RmX9rH68B/CIzJ49Aff3rcGeSKlu2DN7+dvj1r+GKK2C99ZquSJIkSZKk7tHJzqSSO5O+BlwVEYdFxGHAD4CvdFKgNNLGjYPzzoNXvhJ22QXuvrvpiiRJkiRJ6m1DNpMy8xPAKcC27cdHMvO0uguTVkb/+eAIOPNM2GcfeN3rYNGi5upS93GWXFWYF5UyK6rCvKiUWVEV5kV1GvTT3PrLzLnA3IiYmZlX1lyTNOwi4EMfgnXXbTWUfvAD2HLLpquSJEmSJKn3DLkz6WkXR9yUmTvWWM+K3tudSRoW553XaizNnQvbb990NZIkSZIkNaeTnUlFdyb1f4+K10td54gjYJ11YLfd4LLLYKedmq5IkiRJkqTeUbKAu7+311KFNMyGmg8+4AD4whdg5kxwlHhsc5ZcVZgXlTIrqsK8qJRZURXmRXUqaiZFxKsj4kBgm4h4a0S8tea6pNrNnAnf/Cbstx9ccUXT1UiSJEmS1BuG3JkUEV8FXgQsAJa1T2dmHltzbcvX4c4k1eJnP4M3vQnOPhv237/paiRJkiRJGjl17Ux6OfBiOzkarV75ytanu82YAQ8/DIcf3nRFkiRJkiR1r5Ixt1uB53by4hHx/Ij4UUTcFhG3RMQz7maKiAMj4pftx3UR4edraaVVnQ9+yUtau5NOOQXOPLOWktSlnCVXFeZFpcyKqjAvKmVWVIV5UZ1K7kx6NvDriPg58Le+k5n5poKffRw4PjMXRMTawI0RMS8zb+93ze+AnTPzwYjYAzgP+H/lv4I0PLbcEq65Bt7wBnjoITjpJAg/v1CSJEmSpKcp2Zk0daDzmTm/8ptFXAqck5lXDfL8ROCWzNx0gOectNOI+POfYffd4fWvh09+0oaSJEmSJGn06mRn0pDNpOESEZOAq4HtMvORQa55L7BVZh45wHM2kzRiHngA9twTJk+GOXNg3LimK5IkSZIkafh10kwadGdSRFzX/vpwRDzU7/FwRDxUsbC1gYuA41bQSNoFeBvwr1VeWxrIys4Hr7deayn3738PBx4If//78NSl7uMsuaowLyplVlSFeVEps6IqzIvqNOjOpMx8bfvrOivzBhExnlYj6auZ+d1BrnkJ8Hlgj8x8YLDXOuSQQ5g0aRIAEydOZMqUKUybNg146j8Ujz0GWLBgwbC83hVXTGO//WDnna/m5JNh+vTu+P089thjjz3u7uM+3VKPx9193Kdb6vG4e48XLFjQVfV43N3H5sXjwY7POussFixY8GR/pRNFY24RMQ7YiH7Np8z8v6I3iLgAuDczjx/k+RcAVwEHZ+b1K3gdx9zUiMceg0MOgbvugssug3XXbboiSZIkSZKGRy07kyLiGOAk4M/AE+3TmZkvKSjoNcA1wC1Ath/vBzZrv8bnI+I84B+AO4EAHsvMnQZ4LZtJasyyZfCud8HNN8N//idssEHTFUmSJEmStPKGdWdSP8cBW2fm5Mzcvv0YspEEkJn/lZnjMnNKZu6QmTtm5tzMnJOZn29fc0RmbtB+boeBGklSVX238Q2XcePgc5+DadNaj8WLh/Xl1aDhzopGN/OiUmZFVZgXlTIrqsK8qE6D7kzqZxHwYN2FSN0uAj7xCXjWs+B1r4Mf/hBWYsRUkiRJkqSeNOiYW0T07TiaDGwNXAH8re/5zDyz9uqeXo9jbuoaZ58NZ5wB8+bB1lsns2efzqmnnkBEpTsDJUmSJElqVCdjbiu6M6nvU9z+r/1Yrf2A1u4jacw69lhYZx3YZRc4/vgrOffcxbziFfOYNWt606VJkiRJklSrQXcmZebJmXky8Ou+7/ud+++RK1GqbiTmg//+9wsZP34mJ554LQ8/fCazZ1/D5MkzmTPnwtrfW8PHWXJVYV5UyqyoCvOiUmZFVZgX1alkAffswnPSmHLkkQdx5plHscEGTwDBAw88wcknH82RRx7UdGmSJEmSJNVmRTuTZgB7AvsB3+z31LrAi0f6U9fcmaRudNFFczn00CvZYIPgjjue4JhjZnD22Y66SZIkSZJ6Qyc7k1Z0Z9IfgV8AS4Eb+z0uA/xfyxKwcOEizj9/D373u09y5pkz+MpXFnH22U1XJUmSJElSfQa9M+nJCyLGZ+bjI1TPiurwziQVu/rqq5k2bdqIv+8dd8Duu8MBB8DJJ4Mf7tb9msqKepN5USmzoirMi0qZFVVhXlRqWD/NLSK+lZn7ATdHxDO6OJn5kg5qlEa1SZPg2mthxgy491445xwYN67pqiRJkiRJGj4r2pn0vMxcHBGbDfR8Zt5Za2XPrMc7k9QzHnwQ9t4bnvtcuOACWG21piuSJEmSJOmZhnVnUmYubn/7BmC1zLyz/2NlCpVGu2c9C+bOhaVLYa+9YMmSpiuSJEmSJGl4rGgBd58XAHMi4ncR8e2IOCYiptRdmLQyrr766qZLYMIEuOgi2HhjeMMb4P77m65IA+mGrKh3mBeVMiuqwryolFlRFeZFdRqymZSZJ2XmrsBk4FrgBFqf6iZpCOPHw5e+BK99Ley8M9x1V9MVSZIkSZK0cko+ze0DwGuAtYGbgeuAa/uNwY0Idyap1512Gvz7v8O8ebDllk1XI0mSJEnSMH+aWz//ADwOXAHMB36amX/roD5pTHvf+2D99WHqVLjiCthhh6YrkiRJkiSpupIxtx1pLeH+ObAbcEtEXFd3YdLK6Nb54MMPh3POgenToUtLHHO6NSvqTuZFpcyKqjAvKmVWVIV5UZ2GvDMpIrYDXgdMBV4OLKK1O0lSB2bNgvXWgze/Gb7wBdh776YrkiRJkiSpXMnOpMuBa2jtSrohMx8bicIGqMOdSRpVfvEL2GsvOPVUOOSQpquRJEmSJI1FnexMGrKZ1C1sJmk0uv321sjbscfCe97TdDWSJEmSpLGmk2bSkDuTpF7UK/PB22wD113XGnebPRvsl468XsmKuoN5USmzoirMi0qZFVVhXlQnm0lSwzbdFK69Fq66Co48EpYta7oiSZIkSZIGVzzmFhFrZuajNdezovd3zE2j2sMPw777wrOeBV/7GkyY0HRFkiRJkqTRrpYxt4h4dUT8Gri9ffzSiDi3wxolDWKddeCKKyAC3vjGVnNJkiRJkqRuUzLm9ilgOnAfQGb+Eti5zqKkldWr88Grrw7f/CZssQXsuivce2/TFY1+vZoVNcO8qJRZURXmRaXMiqowL6pT0c6kzFy03Cm3ukg1GTcOPvc52H13eN3r4P/+r+mKJEmSJEl6ypA7kyLiIuBM4DPAK4HjgJdn5gH1l/e0OtyZpDHnzDPh05+GuXNh222brkaSJEmSNNrUsjMJeAdwFLAJcBcwpX0sqWbHHw8f+QjssgvccEPrXGZy4omnYXNVkiRJktSEIZtJmXlvZh6UmRtl5oaZ+ZbMvG8kipM6NZrmg9/6VjjvvNZS7quugosvvpJzz13MJZfMa7q0UWE0ZUX1My8qZVZUhXlRKbOiKsyL6jR+qAsi4uwBTj8I/CIzvzv8JUla3l57/f/s3XmclXX9///HGxh2FQFxQVBRSNHCjVIzQTMG1FyYLApyIZEMxDD9yRRpljapaZqJHzWb1PEjX0VKWwRcGFHL7aMgYOq4wbCEyqKDss/798d1RgYY4JyBM2eWx/12u25zrjNn5rwOn+fnkl68368LzjmnhPz8iXTp0oeKipsoLBzPlVfeypgxQxg5cliuS5QkSZIkNRHpzEy6EzgYeCj1VAHwHtAJeDfG+OOsVrixDmcmqUmLMXLDDVMoLJxBZWUR++xTyC239KOgIJ8QMtreKkmSJEkSULuZSdtdmQR8CfhqjHFD6k1uB54BjgdmZ1ylpFoJIdCjR6Bdu9W0bHkpixZV8o9/BM44I5CXl+vqJEmSJElNRToDuHcH2lc7bwd0TDWX1mSlKmkHNdb9wWVl5RQXD+TDD2/kllsG8eyz5RxxBEyfnuvKGq7GmhVlh3lRusyKMmFelC6zokyYF2VTOiuTrgdmhhBKgQCcAPw6hNAOeCKLtUnaTGHhiM8fjxmTz8UXw1//CuefD8ccA7/9Ley7bw4LlCRJkiQ1etudmQQQQtgb+HLq9KUY46KsVlVzDc5Mkrbis8/guuvgttvgJz+BSy+FVq1yXZUkSZIkqb6rzcykdLa5AawGFgPLgYNCCCdkWpyk7GnbFq6+Gl58EZ5/Hg47DB57LNdVSZIkSZIao+02k0IIFwAzgKnA1amvv8huWdKOaar7g3v0gEcegd//Hi65BM44A959N9dV1W9NNSuqHfOidJkVZcK8KF1mRZkwL8qmdFYmXQL0BebFGE8EjgBWZLUqSTtk0CCYPRuOPRa+/GW48spkK5wkSZIkSTtquzOTQggvxRj7hhBmAl+JMa4JIcyNMR5aNyV+Xoczk6RaWLAALrss2f52001w1lkQMtoNK0mSJElqrGozMymdZtJfgPOBHwMnkcxNyosxnlLbQmvDZpK0Y6ZPh4svhn32SbbBHXxwriuSJEmSJOVaVgZwxxjPijGuiDH+Avg5cDdwZu1KlOqG+4O3dOKJ8OqrcOqp8LWvweWXQ0VFrqvKPbOiTJgXpcusKBPmRekyK8qEeVE2bbOZFEJoHkJ4o+o8xvh0jPHRGOPa7JcmaWfLy0sGc8+ZA0uXJquT7r8fXPQnSZIkSUpXOtvcHgEujjHOr5uStlqH29yknez552HUKGjbFm69FQ4/PNcVSZIkSZLqUla2uQG7A3NDCE+GEB6tOmpXoqT65Jhj4MUX4fvfh/x8GD0ali3LdVWSJEmSpPosnWbSz4HTgF8CN1Y7pHrL/cHpa94cLrwQXn8dKiuhd2/44x+TxzFGxo27nsa8KtCsKBPmRekyK8qEeVG6zIoyYV6UTekM4H4aeJ/kDm5PAy8Br2S5Lkl1rFMnmDABHnsMiouTVUu/+c1UJkxYzOTJ03JdniRJkiSpnkhnZtII4EKgY4zxwBBCT+B/Yoxfr4sCq9XhzCSpjtxxRwm//OVElizpw4YN13DggeNp1WoWY8YMYeTIYbkuT5IkSZK0k2RrZtIo4KvAJwAxxjKgS+blSWooLrxwKDffPIq9964EAvPmVXLBBaO58MKhuS5NkiRJkpRj6TST1sQY11adhBBaAC4RUr3m/uAdE0IghMDHH6+md+9LadFiFVdeGSgpyahZ3SCYFWXCvChdZkWZMC9Kl1lRJsyLsimdZtLTIYSfAm1CCN8AHgL+lt2yJOVaWVk5xcUDmTPnRkpKBvGDH5Rz7bUwYgSsWpXr6iRJkiRJuZLOzKRmwA+AAUAApgJ/rOsBRs5MknKvoiK589sbb8BDD8FBB+W6IkmSJEnSjqjNzKR0mkmDgX/EGNfsSHE7ymaSVD/ECLffDr/4RfK1oCDXFUmSJEmSaitbA7i/CbwVQrgvhHBaamaSVK+5Pzh7QoAf/Qj++U+47DL48Y9h7drt/1x9ZVaUCfOidJkVZcK8KF1mRZkwL8qm7TaTYoznAweRzEr6LvBOCOGP2S5MUv129NHwyivw3ntwwgkwf36uK5IkSZIk1YXtbnP7/IUh5AEDgfOBE2KMnbNZWA3v7zY3qR6KEW68EX77W/jTn+CUU3JdkSRJkiQpXdmamTQI+A7QHygFHgSmxRjX167M2rGZJNVvzz0HQ4bA978Pv/wltHBDrCRJkiTVe9mamXQO8FfgCzHG82KM/6zrRpKUKfcH172vfjXZ9vbyy3DyybB4ca4rSo9ZUSbMi9JlVpQJ86J0mRVlwrwom9KZmfTdGONfq+7mFkI4PoRwW/ZLk9TQ7LEHPOIn4IQAACAASURBVPYYnHgiHHUUTJ+e64okSZIkSTtbWjOTQghHAN8DzgbeAybHGG/Ncm2b1+A2N6kBeeKJZMvbqFHw059Cs3TWQUqSJEmS6tROnZkUQuhFcve27wIfAf8PuCzGuN+OFlobNpOkhmfhwmSOUvv2cN990LlOx/ZLkiRJkrZnZ89MegM4CTgtxnh8aiXShh0pUKor7g+uH7p2Tba69ekDRx4J//53rivakllRJsyL0mVWlAnzonSZFWXCvCibttVMGgwsBqaHEO4KIXwdyKhTJUktWsBvfgO33QZnngm/+x24yFCSJEmSGq7tzkwKIbQDziDZ7nYScC/wlxjjtOyXt0kdbnOTGrj334ezz4Zu3eBPf4IOHXJdkSRJkiQ1bTt7mxsAMcZPY4z/G2P8JrAv8CpwRS1rlNSE7b8/PPtssv3t6KPh1VdzXZEkSZIkKVMZ3V8pxrg8xnhnjPHr2SpI2hncH1x/tWoFt94K114LAwbAHXfkdtubWVEmzIvSZVaUCfOidJkVZcK8KJu8WbeknPjOd+C555JZSt//PqxcCTFGxo27Hre0SpIkSVL9td2ZSfWFM5Okxumzz2D0aHj+eRgxYgpXXTWV4uKBFBTk57o0SZIkSWr0sjIzSZKyqW1b+MpXSvj449O47LJnqKi4icLCGRx66GnccUdJrsuTJEmSJG3GZpIaJfcHNywXXjiUm28eRZculUBg/vxKRo4czYUXDs36e5sVZcK8KF1mRZkwL0qXWVEmzIuyyWaSpJwLIRBC4NNPV3PIIZcCq/jZzwJXXhlYtSrX1UmSJEmSqnNmkqR6oajoLnr16s7gwQOYPHka//d/5bz77gW89FJy97dTTsl1hZIkSZLU+NRmZpLNJEn12rRpMGoUfPGLcMst0K1briuSJEmSpMbDAdxSivuDG48BA2D2bOjTB444An77W1i3buf9frOiTJgXpcusKBPmRekyK8qEeVE22UySVO+1bg1XXQXPPw9PPAFHHgnPPpvrqiRJkiSpaXKbm6QGJUaYNAnGjk1WLV13HeyxR66rkiRJkqSGyW1ukhq9EODss+H116FDBzjsMLjrLqiszHVlkiRJktQ02ExSo+T+4MZv113hppuSAd3FxXD88TBrVua/x6woE+ZF6TIryoR5UbrMijJhXpRNNpMkNWh9+iTzk4YPT7a9jR0LFRW5rkqSJEmSGi9nJklqND78EK64IlmtdNNNyXa4kNHOX0mSJElqWmozM8lmkqRG59ln4aKLYJ994Lbb4KCDcl2RJEmSJNVPDuCWUtwf3LQdfzy88gp84xtwzDHwi1/A6tU1v9asKBPmRekyK8qEeVG6zIoyYV6UTTaTJDVKeXlw2WXw6qswezZ88YvJ9jdJkiRJ0o5xm5ukJuGf/4TRo+Hoo+F3v4OuXSHGSGHhDRQVXU5wuJIkSZKkJshtbpK0FaecAnPmQK9eyR3gbr4ZHnxwKhMmLGbyZJcsSZIkSVK6bCapUXJ/sGrSti1ccw2MGVPCz352Guec8wwVFadTWDiDQw89jTvuKMl1iarnvLYoXWZFmTAvSpdZUSbMi7LJZpKkJufnPx9KcfEodtmlEgi8804l++03mkMOGUplZa6rkyRJkqT6zZlJkpqkSZOmMHz4VLp1C8ybV8k3vzmIuXPzWboUvvUtOPtsOO44aGbLXZIkSVIj5swkSUpTWVk5xcUDmTPnRu65ZxB9+pTz2mvw5JPQuTNcdBF07w4//jE89xyuWJIkSZKkFFcmqVEqLS2lf//+uS5DDcC2svKf/8BDDyXH8uXJiqVvfxuOOcYVS02V1xaly6woE+ZF6TIryoR5UbpcmSRJO9Ehh8CVV8Ls2fD449CxI1x4YbJiaexY+Ne/XLEkSZIkqelxZZIkZej115PVSg8+CJ98ksxXOvts+MpXXLEkSZIkqWGpzcokm0mStAPmzt3YWFq5ctPGUsjocixJkiRJdc9tblJKaWlprktQA7GjWTn0UPjFL5LVSo89Bu3bw/nnw/77w09+Ai+8AFV98Bgj48Zdj43xhstri9JlVpQJ86J0mRVlwrwom2wmSdJOcuihcPXVSWPpH/+Adu3g3HOTxtJll8FvfjOVCRMWM3nytFyXKkmSJEm15jY3ScqiGOGqq0q4/faJfPxxH9atu4YuXcbTseMsfvzjIYwcOSzXJUqSJElqwtzmJkn1TAhw9dVDmTBhFHvtVQkEKioqWbBgNO+8M5Ty8lxXKEmSJEmZsZmkRsn9wUpXXWQlhEAIgRUrVtO796W0aLGK664LrF0b6NMHhgxJZiup/vPaonSZFWXCvChdZkWZMC/KJptJklQHysrKKS4eyJw5N1JcPIhPPinn5pvhvfeSO78NGQLHHZfcGW79+lxXK0mSJElb58wkSaoHNmyARx6B3/0O5s+Hiy+GCy6ADh1yXZkkSZKkxsyZSZLUQDVvDoMHwzPPwMMPw8yZ0KNH0lR6++1cVydJkiRJG9lMUqPk/mClqz5m5eijoaQEZs+GXXaBY4+FM86A6dOTu8Mpd+pjXlQ/mRVlwrwoXWZFmTAvyiabSZJUT3XtCr/+NcybB6ecAj/6ERx5JNxzD6xZk+vqJEmSJDVVzkySpAaishKmTUvmKr32Glx0Efzwh9ClS64rkyRJktRQOTNJkhqxZs1g4ECYOhWeeALKy+ELX0gGdc+Zk+vqJEmSJDUVNpPUKLk/WOlqqFk59FC46y546y3Yf38YMAC+8Q345z+TFUwAMUbGjbseV3XuPA01L6p7ZkWZMC9Kl1lRJsyLsslmkiQ1YHvsAePHw/vvwznnJI9794bbb4f775/KhAmLmTx5Wq7LlCRJktSIODNJkhqRGOHyy0u4886JfPppHyorr2G//cbTrt0sxowZwsiRw3JdoiRJkqR6xJlJktTEhQA33DCUu+8exZ57VgKBBQsq+fTT0Xz22VA++CDXFUqSJElq6GwmqVFyf7DS1RizEkIghMDKlavp3ftS2rZdxXnnBV59NdCrF5x+Ojz8MKxZk+tKG57GmBdlh1lRJsyL0mVWlAnzomyymSRJjVBZWTnFxQOZM+dGiosH0bp1Offem9wBbvBg+MMfoGtXGDUKXnwx2R4nSZIkSelwZpIkNVHvvw/33Qf33AN5eXDuufD97ydNJkmSJElNQ21mJtlMkqQmLkb417+SptKkSXD00Ulj6ayzoG3bXFcnSZIkKZscwC2luD9Y6TIrydDur34V7rwTFi6E4cOhpCRZofSDH8CMGW6Dq2JelC6zokyYF6XLrCgT5kXZZDNJkvS5Nm1gyBB47DGYOxcOPhh+9CM48ED4xS/g3XdzXaEkSZKkXHObmyRpm2KEV15JtsE98AAcckiyDe7ss2HXXau/LlJYeANFRZcTQkarZCVJkiTliNvcJEk7XQhw1FHw+98n2+DGjoW//x26d4ehQ2HaNNiwAR5+eCoTJixm8uRpuS5ZkiRJUhZltZkUQtg3hPBUCGFuCGF2CGHMVl73+xBCWQhhZgjh8GzWpKbB/cFKl1nJTMuWyWDuv/wF3n4bjjkGRowooXXr07jwwmeoqLiJyy+fwaGHnsYdd5TkutydzrwoXWZFmTAvSpdZUSbMi7KpRZZ//3rg0hjjzBBCe+D/QgjTYoxvVL0ghDAIODDG2DOE8BXgf4BjslyXJGkHde4MF18Mo0cP5aabOnH11TOAwLx5lTRvPpo//CGfxx+HXr2So2fP5GvnzslqJ0mSJEkNU53OTAoh/BW4Ncb4ZLXn/geYHmP8f6nz/wD9Y4xLNvtZZyZJUj01adIUhg+fSrdugfLySiZMGETv3vmUlcFbb216wMYGU/VGU8+esMsu6b+nM5okSZKkHVebmUnZXpn0uRDC/sDhwAubfasrUF7tfGHquSVIkhqEsrJyiosHMnjwACZPnkZZWTnDhsGRR276uhjho4/YpMn00EPJ17ffhg4dtmwy9eoFPXpAq1ab/q6qGU19+06joCC/7j6sJEmS1MTVycqk1Ba3UuBXMcZHNvve34CiGOO/UudPAP9fjPGVzV7nyiSlrbS0lP79++e6DDUAZqX+qKxMBnxvvpLprbegvBy6dk0aS2vWlPCf/0ykefM+LFx4DT17jicvbxZjxgxh5MhhWa3RvChdZkWZMC9Kl1lRJsyL0lUvVyaFEFoAk4D7Nm8kpSwEulU73zf13BbOO+889t9/fwA6dOjA4Ycf/vn/c1QNF/Pcc4CZM2fWq3o899zz9M67dYN33inlkEPgoos2fn/9eujevT9vvQX/+EdXPv74a8yZswIILFz4HhdddAIXXjg05/V77nnVeZX6Uo/n9fu8Sn2px/P6ez5z5sx6VY/n9fvcvHi+tfObb76ZmTNnft5fqY2sr0wKIdwLfBRjvHQr3z8FGBVjPDWEcAxwc4xxiwHcrkySJFWpmtHUpUtg/vxK8vIGMXhwPmPHbrm1TpIkSdLW1buVSSGErwJDgdkhhFeBCPwU2A+IMcY7Y4z/DCGcEkJ4G/gUOD+bNUmSGr7NZzS99lo57drBGWck85XGjoVvfhOaN891pZIkSVLjU6d3c9sRrkxSJkpLSz9fwidti1lpXNatg4cfht/9DpYuhTFj4PzzM7tL3LaYF6XLrCgT5kXpMivKhHlRumqzMqlZtoqRJKmu5eXBkCHw/PNw773wzDOw//5w2WUwb16uq5MkSZIaB1cmSZIatfffh1tvhT//Gb7+9WQL3LHH5roqSZIkqX6ozcokm0mSpCahogL+9Ce45Rbo0iVpKhUUQIus39dUkiRJqr/c5ialVN36UNoes9J07LILXHIJlJXBFVfAbbclw7pvuAFWrEjvd5gXpcusKBPmRekyK8qEeVE22UySJDUpzZvDWWfBjBnwl7/Aa68lTaWLL4a33851dZIkSVL95zY3SVKTt2hRslLpzjuTeUpjx0L//hAyWuwrSZIkNTxuc5MkqRb22QeuvTa549upp8KPfgRHHgn33ANr1iSviTEybtz1+A8bkiRJaupsJqlRcn+w0mVWVF3btjByJMydC7/+Ndx/PxxwAPzqV1BcPJXf//5FJk+elusy1QB4bVEmzIvSZVaUCfOibLKZJEnSZpo1g0GDYNo0GDGihJtuOo0LLniGVatGcdFFM+jZ8zTuuKMk12VKkiRJOeHMJEmStiHGyKRJUxg7dgYLFxbRrl0heXn96Ngxn0GDAoMGJfOV2rXLdaWSJElS5pyZJEnSThZCIITAJ5+spnfvS2nWbBV33RWYPDnQrRv89rew117wjW/AjTcmW+T8tw9JkiQ1ZjaT1Ci5P1jpMitKR1lZOcXFA/nDH75JcfEg3n67nD594IorYPp0WLgQRo+Gt99OBnh37w4jRsDDD8OKFbmuXrngtUWZMC9Kl1lRJsyLsqlFrguQJKm+KywcASR/KSsoyN/i+7vuCmeckRwxwptvwpQpcNddcN55cPjhyQymgQOTx838pxxJkiQ1YM5MkiQpiz77DGbMSJpLU6bA8uWQn580lgYMgM6da/65GCOFhTdQVHQ5IWS0hV2SJElKW21mJtlMkiSpDr37LkydmjSWSkvhC19IGkuDBkHfvtAitWZ40qQpDB8+leLigTWuhpIkSZJ2BgdwSynuD1a6zIoysTPy0qMHXHQRPPIIfPghXHcdrFkDP/whdOkCRx9dQteup3HFFc9QUXEThYUzOPTQ07jjjpId/wCqM15blAnzonSZFWXCvCibbCZJkpQjLVvCiScmDaVZs2D2bLjooqF07z6K996rBAKLF1cyaNBoCgqG5rpcSZIkCXCbmyRJ9U7VFrfOnQOLFlXSu/cg3n47nx49kubTSSfBCSfAbrvlulJJkiQ1dG5zkySpESgrK6e4eCDvvHMj998/iG9/u5ylS+H225OB3bfcAl27wpe/DFdckcxg+vTTXFctSZKkpsKVSWqUSktL6d+/f67LUANgVpSJ+pSX1avhhRfgqadg+nR45RU4/PCNK5eOPRZat851lU1XfcqK6j/zonSZFWXCvChdtVmZ1CJbxUiSpOxp3Rr69UuOq69OVib9619Jc6mwEObMSVYuVTWX+vZNZjRJkiRJO8qVSZIkNUKffALPPJOsWnrqKXj7bTjuuI3NpSOOgBbV/kkpxkhh4Q0UFV1OCBn9w5QkSZIasNqsTLKZJElSE7BsGTz99Mbm0oIFyRDvqubSW29N4Qc/mEpx8UAKCvKzWouNK0mSpPrDZpKU4v5gpcusKBONKS9LlkBpKdx2WwnPPz+R9ev7EOM1tGo1nhYtZtGr1xCOOmoYHTrw+bHbbmxyXvVc+/aQSU+o6m51ddG4ypXGlBVln3lRusyKMmFelC5nJkmSpLTsuSd85zvw7W8PZdKkTowdO4OFCwMdOlQyYsRoDjssn48/hhUrkmPRoo2PV6xgk++tXr1po2lrTadXXy3hqacmEmMfKipuorBwPFdeeStjxgxh5Mhhuf4jkSRJUppcmSRJUhNXtVKoW7dAeXklxcWDMloxtG5d0lyq3mDavOGUHJH//GcKs2fPYM2aIlq0KORb3+rHtdfm06OH290kSZJywZVJkiQpY2Vl5RQXD2Tw4AFMnjyNsrLyjH4+Lw86d06ObQtMmhQYPnw1Bx54Ke+/X8ny5YFjjgkcdBB873vw7W9Dly61/iiSJEmqA81yXYCUDaWlpbkuQQ2EWVEmGmteCgtHUFCQTwiBgoJ8xo27IGvvVdW4mjPnRu69dxD9+5ezcCH8/Ofw/PPQqxcMGgT33QcVFVkrI+saa1aUHeZF6TIryoR5UTa5MkmSJNWZwsIRnz+uvpVu0KDk+PRT+Nvf4P77YfTo5LnvfQ8GDoSWLXNRsSRJkjbnzCRJklQvLV0KDz0E//u/8PrrUFCQNJa+9jVo5tpqSZKknaI2M5NsJkmSpHpv/nx44IGksbRsGXz3u0ljqU8fCM7uliRJqrXaNJP8dz01Su4PVrrMijJhXnKne3e44gqYNQseewxatIAzz4TDDoNrr4V33811hZsyK8qEeVG6zIoyYV6UTTaTJElSg3LYYfDrX8N778Gdd8KiRXDMMXDccfCHP8AHH2z6+hgj48ZdjyucJUmSdg63uUmSpAZv3Tp4/PFkG9zf/w7HHptsgzvzTJg6dQrDh0+luHjgJkO/JUmS5MwkSZIkPv0UHn0UiopKmDt3Im3b9mHlyms48MDxtGo1izFjhjBy5LBclylJklQvODNJSnF/sNJlVpQJ89IwtGuXDOieNWsod901iry8SiDwzjuVrF07mvnzh1JaCmvWZK8Gs6JMmBely6woE+ZF2WQzSZIkNUohBHbdNbB+/Wp6976UXXZZxdChAQhccQV07gz5+XDDDfDqq1BZmeuKJUmSGga3uUmSpEarqOguevXqzuDBA5g8eRplZeWMG3cBAMuXQ2kpPPkkPPEEfPQRnHQSnHxycvTokdvaJUmS6oIzkyRJkmppwYKNjaUnnoDWrTc2lk46CfbYI9cVSpIk7XzOTJJS3B+sdJkVZcK8NG777gvnngv33QeLFsE//gFf/CLcfz8cdBAcfjhcdhk89lgy5HtbzIoyYV6ULrOiTJgXZZPNJEmSpM2EAL17w5gxyZ3hPvoIbr8ddtsNfvMb2HNP6NcPfvUr+Ne/YN26jT8bY+TOOx/AFdWSJKmxcpubJElShj79FJ55JtkO9+ST8N57cMIJ8PWvQ2XlFK66airFxQMpKMjPdamSJEnb5MwkSZKkHPjwQ/jpT0uYNGkiK1f2Yf36a8jLG09e3iwOOWQIxx8/jL32gr33hr322nh07gzNm+/Ye8cYKSy8gaKiywkho78HSpIk2UySqpSWltK/f/9cl6EGwKwoE+ZF2xJjZNKkKfzkJzMoL89nr72mMnJkP3r2zGfJksB//8vnx+LFydcVK5LB3tUbTDU1nfbaC3bZpeb3nTRpCsOHuxKqIfPaonSZFWXCvChdtWkmtchWMZIkSU1JCIEQAitWrGa//W5j2bKufPGLgYKCrf/dbN06+OCDLZtMb74JTz+98bnFi6FZs02bSx99VMLrr0+kWbM+VFTcxLhx47nyylsZM2YII0cOq8NPLkmSmhpXJkmSJO0kRUV30atXdwYPHsDkydMoKytn3LgLdvj3xggrV27adFq8OFJaOoXHH5/Bp58WAYV84Qv9OOusfPr1Cxx3HOy6645/JkmS1Li5zU2SJKkJqdri1q1boLy8krFjBxFjPs88Ay+9BF/4QjIY/GtfS4499sh1xZIkqb6pTTOpWbaKkXKptLQ01yWogTAryoR5UbrqKitlZeUUFw9kzpwbKS4eRJs25fzylzB9OixdCr//Pey5J/zxj3DQQdC7N4wcCfffD+XldVKi0uC1RekyK8qEeVE2OTNJkiSpgSosHPH5482Hb7dqBV/9anKMGwcbNsCsWfDMMzB5MowdC+3aJSuWTjghOXr2BG8IJ0mStsdtbpIkSU1QjMmg7xkzkgbT00/D2rUbm0tf+xp88YvQvPnmPxcpLLyBoqLLCXaeJElq8JyZJEmSpFqbNy9pLM2YkRxLliQrm6oaTEcdBY8+msxpKi4euMVqKEmS1PA4M0lKcX+w0mVWlAnzonQ11Kzstx8MGwZ33glvvJEc558PixbBt79dQuvWp3HOOc9QUXETY8bM4OCDT+OOO0pyXXaD11DzorpnVpQJ86JsspkkSZKkGu25JxQUwC23wPz5Q/nTn0bRvn0lEFi6tJJ580Zz441DOe88+J//SWYyrV+f66olSVK2uc1NkiRJaZk0Kdni1q1boLy8krvvHsTBB+fz73/D88/Dv/8NCxbA0UfDscfCMcckR5cuua5ckiRtjTOTJEmSlDVFRXfRq1d3Bg8ewOTJ0ygrK2fcuAs2ec3y5fDii3zeYHrhBejYMWkqVTWY+vSBvLwcfQhJkrQJm0lSSmlpKf379891GWoAzIoyYV6ULrOyUWVlcte4qpVLzz8P774LRxyxaYNpn31q/vmmcPc486J0mRVlwrwoXbVpJrXIVjGSJElSs2ZwyCHJcf75yXOffAIvvZQ0loqLYeRIaNNm061xRx4JrVrBww9PZcKExfTtO827x0mSVE+4MkmSJEk5FSO8886mq5dmzy6hefOJtG7dhxUrrmHvvcfTqtUsRowYwtixw2jTJtdVS5LUOLjNTZIkSY3CypWRG2+cws03z2DFiiJaty6ka9d+rF2bz5IlgTZtYK+9aj723nvj486doXnz9N+3KWyrkySpOre5SSnuD1a6zIoyYV6ULrOy49q3Dxx6aGDDhtX07n0p5eWVXHddoKAgECOsWAGLF8N//7vp8frrm54vX540lLbWeKp+7LprbrbVmRely6woE+ZF2WQzSZIkSfVSWVk5xcUDN7l7HEAIsPvuydG797Z/x7p18OGHWzad3nkHnntu4/n8+SWsXTuR5s37sH79TZx33nguvPBWTjxxCAUFw+jalc+P1q3r4MNLklSPuc1NkiRJTV6MkZKSKVxxxQwWLy6iU6dCTj21H7vvns+iRYGFC2HhwmQ1VPv2sO++bNJg2vzo1ClpeqXzvm6rkyTlktvcJEmSpFoIIdCmTWDlyo3b6k4/PdlWV11lJXz0EZ83l6qOf/970/PVq2GffbbdcNpnH3j0Ue9WJ0lqeFyZpEbJ/cFKl1lRJsyL0mVWGqaiorvo1av7Jtvqxo27oFa/67PPtmw4VR0LFsCbb5awYsVEmjXrQ2XlybRu/QR5ebM47LAhHHfcMDp2TFY3dey48ag6b9cuvVVPNXElVMPmtUWZMC9KlyuTJEmSpFoqLBzx+eMdXSXUti307JkcNYlxKA8+2IlLL53BokWBXXet5NxzR9OrVz7Ll8OyZTBvHixdmjyuOpYuTeZAbavZtLXz9u1zM2BcktT4uDJJkiRJyoFJk6YwfPhUunULlJdXUlw8KK0Gz+rVfN5wqqnZVNP5kiUbB4xv2HANXbuOZ9ddZ3HJJUMYOXJYHXxaSVJ95cokSZIkqYHY2t3qtqd1a9h77+RIV4xDeeCBTlx22QwWLw588EElFRWjee21fJ57Do49Fpo1q+UHkSQ1Of4nQ41SaWlprktQA2FWlAnzonSZFaWjsHAEBQX5PP300xQU5Nd6PlM6Qgi0bLlxwHjr1qu49trAXnsFRoyAAw6AK66AmTPBzQD1l9cWZcK8KJtsJkmSJElNQNVKqDlzbqS4eBArV5bz85/D3Lnwt78lK5POOgt694Zf/hLeeivXFUuS6itnJkmSJEkCklVJzz8PDzwADz4IXbvCd78L3/kOdOuW6+okSdlQm5lJNpMkSZIkbWH9eigtTRpLf/kLHHZY0lj61rdgjz1yXZ0kaWepTTPJbW5qlNwfrHSZFWXCvChdZkWZqK95adECTj4Z7r4bFi+Gyy6DGTOgZ08YNAjuvRc++STXVTYt9TUrqp/Mi7LJZpIkSZKkbWrVCk4/PVmltHAhnHMOTJqUbH0rKEger1q15c/FGBk37nrcYSBJjYvb3CRJkiTVyrJlMHly0mR65RX45jeTrXAnnwx5eTBp0hSGD59KcfFACgryc12uJKkGzkySJEmSlBOLF8NDDyWNpdmzS2jZciJt2/Zh4cJr6NlzPHl5sxgzZggjRw7LdamSpGqcmSSluD9Y6TIryoR5UbrMijLRWPKy994wZgz8+9/w2mtDGThwFB9+WAkEysoqWbRoNHfdNZSzzoLRo6GoCO67D556Ct58E1au3LH3bwpb6hpLVlQ3zIuyqUWuC5AkSZLUuPToERg8OPD3v6/moIMupby8kuuuC3zpS4GFC/n8mDNn4+MFC5LZTF27wr77Jl83f9y1K3TuDM1q+Cfxhx+eyoQJi+nbd1qdbKmLMVJYeANFRZcTQkb/oC9JDZ7b3CRJkiTtdEVFd9GrV3cGDx7A5MnTKCsrZ9y4C7b6+hhhqehwjgAAFXBJREFU+fJNm0s1PV65MlkFVdVo+uijEubMmUgIffjvf6+hW7dkS9255w7h3HOH0bp10qSqOmpqRNWG86AkNRbOTJIkSZLUqK1aBYsWbWwulZdHnn56CtOnz2DVqiLy8grZa69+tGqVz9q1gdWrYc2ajUeLFmzSYKrp8ba+P3duCS+/PJEY+/DRR9ewzz7jad16FhdfPIQf/9h5UJIaHptJUkppaSn9+/fPdRlqAMyKMmFelC6zokyYlx1XtUqoW7dAeXklxcWDalwtFCOsW8cmDaaqxzU9V9P3V6+OzJw5hccfn0FFRRGtWxfSuXM/li/Pp3nzQPfubHLst9/Gx/vskzSzaiPGyNChP+T++//HbXVKi9cWpas2zSRnJkmSJElq0MrKyikuHrjJlrqahAAtWyZH7QUmTQo8/vhqevdO5kHdfHMyI+rjj2H+fJg3L/k6fz689trGx0uWwF57bb3Z1L077LZbze/68MNT+etflzJ5ct3MhJKkbXFlkiRJkiRlINN5UFXWrUu25lU1lzY/5s1LZjpVby4tXpxsqwuhDwsWXEPPnslMqDFjhjBypNvqJO04t7lJkiRJUgMVI6xYsXmDKfLcc1N4+eUZrF2bzIQaNKgfY8bkc/zxgVatcl21pIauNs2knXQvA6l+KS0tzXUJaiDMijJhXpQus6JMmBdVCQF23x369IFvfhNGjYLrrw+MHRto1Wo13bufTV7eKlq2DPzsZ4E99oBTT4Xf/x7efDNpRklVvLYom5yZJEmSJEn1WNVMqI4dW7Js2VrKysp56CFYtgyeeAKmToXrr0+Gew8YAPn58PWvQ4cOua5cUmPlNjdJkiRJauBihP/8J2ksTZ0Kzz0HX/pS0lgaMAD69oXmzXNdpaT6yJlJkiRJkiRWrYJnn93YXFq0KFmtlJ+fHPvum+sKJdUXzkySUtwfrHSZFWXCvChdZkWZMC9KVyZZadMGvvEN+O1vYfZseO01GDQo2RZ3+OFw6KEwdixMmQKffbblz8cYGTfuevwH/YbLa4uyyWaSJEmSJDVyXbvC+efDAw/AkiXw5z9Dp05w7bWw557JVriqxlOM8PDDU5kwYTGTJ0/LdemS6iG3uUmSJElSE/bJJ/DUU8l2uIceKuHjjyfSpk0fKiquYa+9xtOy5Sy+970hDB8+jI4dk8HeO3v+UoyRwsIbKCq6nBAy2m0jaQc5M0mSJEmSVGuVlZHbbpvClVfOYMWKItq0KeSgg/rRsmU+K1YEli+Hjz+Gdu1g992To2PHjY+399xuu0GzGvbHTJo0heHDp1JcPJCCgvy6/+BSE+bMJCnF/cFKl1lRJsyL0mVWlAnzonTVRVaaNQvsvXdgw4bV9O59KS1arOKqqwIvvxx4+21YuhTWroV582D6dLj7bvjpT+E730nuGNepU9JseuUVeOghuO46GDkymd/Uowe0bJk0lnr0gKOOgkMOKWHXXU/jBz94hoqKm/jhD2fQtetpXHxxCS+9BO+9BxUVyda7nakpzITy2qJsapHrAiRJkiRJ9UdZWTnFxQMZPHgAkydPo6ysfJPvN2uWbHXr0AEOOCCz371hQ9JsWr48OZYuHcqUKZ24554ZQGD16koOOWQ0ZWX5XHQRfPRRcqxfD507J8cee2x8vLXzTp2SxtXWVM2E6tt3miuhpFpwm5skSZIkKWeqtrh16xYoL6+kuHjQFg2eVas2Npaqjg8/rPlx1dG27ZaNpkWLSpg1ayIh9GHJkms44IDxtGkzizFjhjBy5LAc/QlIuVWbbW6uTJIkSZIk5cz2VkIBtGkD3bolRzpiTFZAbd5s+vDDobRp04knn0xWQs2bV0le3mhuvz2f6dPhC1+Agw9OvvbqBe3b79zPWlccaK5sc2WSGqXS0lL69++f6zLUAJgVZcK8KF1mRZkwL0qXWdk5Nl8JddttgzjkkHzeeAPefHPjUVaWDA2v3mCqOrp3r3mQ+NbUdXNn0qQpnHPOH7nvvhFu49N2uTJJkiRJkqRtqGkl1Pe/D0cfvenrKith/vxNG0yPPgpvvAHLlkHPnps2mKqOXXfd8j1rO6MpRvjss2S+1IoVG2dNVX9c/fz110tYsGAiGzb0Yf36UYwa9QQ/+9mtjB3rNj7tXK5MkiRJkiQpAytXwltvbWwyVa1qeust2G23jY2lZctKeP75iTRv3of337+G7t3HE8Is8vOH0LfvsG02hqoeN2+e3AGv6ujQoebHu+8Ou+0WefnlKdx00wwWLy6iTZtCoB99++Zz5pmBM85I7qQnVefKJEmSJEmSsqx9ezjyyOSorrISFi7c2GB6442hdOjQiddfT2Y0LV5cSc+eo1myJJ9//WtjE2jvvWtuGHXoAK1bZ1JZ4KOPAitXrqZ370spL6/kjjsC7dsHHnkEfvMb6NIFzjwTzjgDjjoKHKmk2nBlkhol95MrXWZFmTAvSpdZUSbMi9JlVhqmdO5WtzMVFd1Fr17d6dixJcuWraWsrJxx4y4AYMMGeOEFeOSR5Fi5Ek4/PWksnXgitGyZtbJUj7kySZIkSZKkeiSdu9XtTIWFI4Ck+bh506p5czjuuOS47rpkBdUjj8AvfwlDhsCAAUlj6ZRTklVR0ta4MkmSJEmSpCZuyRL429+S5tLTT8NXvpI0lk4/Pbl7nRqv2qxMyuBmhpIkSZIkqTHac0+44IKkobR4MfzoR/DyyxtnQ119NcycmdxhbnMxRsaNu566WgBS1++nLdlMUqNUWlqa6xLUQJgVZcK8KF1mRZkwL0qXWVEmdiQv7drBWWfBn/8M//0v/O538PHHUFAABxwAl1wCTz0F69Ylr3/44alMmLCYyZOn7ZTat6eu309bcmaSJEmSJEmqUYsW0K9fctx4I8ydm2yFGzcO5s4tIS9vIm3a9KGi4iYuuWQ8P/nJrXzrW0M466xhNG8OzZqx3a/pvKZ5c/jTn0q47baJrF+fvF9h4XiuvPJWxowZwsiRw3L9R9WkODNJkiRJkiRlbMGCyC9+MYX775/B6tVFtGpVSI8e/ejYMZ/KykBlZXIHuR35Wv3x+vWRDRumEOMMoIg2bQo59dR+nH12PocdFujZE/Lycv2n0vB4NzdJkiRJklQn9t03MHBg4MEHV9Ojx6WUl1fyq18FCgoy6ktkIDBpUmD48NXsscelLFpUSYyBBx4IzJ0L5eVw0EFw2GHJceihydcDDkhWNmnncWaSGiX3kytdZkWZMC9Kl1lRJsyL0mVWlIm6yktZWTnFxQOZM+dGiosHUVZWXifv9/bbN1JSMoijjy7nL3+Bt96CZcvg3nvhlFOgogL++Ec4+WTYdVc46ig45xy4/nr4xz9g3ryah4lvzmHfNXNlkiRJkiRJqpXCwhGfPy4oyM/p+7VpA0cckRzVVVTA668n857mzIEnn0y+fvJJsnqpagVT1de994aQWlxVNey7b99pdfL5YowUFt5AUdHlhJCtFV47zplJkiRJkiSpyVm+PGkwVTWZqo7166FTpxKWLp1IXl4fPvzwGvbddzx5ebMYOnQI3/3uMFq2pMYjL29jI6o2Jk2awvDhUykuHlgnzSuo3cwkm0mSJEmSJEkpH3wAc+ZESkqm8OCDM/j00yJatiykW7d+tG+fz7p1gbVrYc0aWLt202PduqShtLVm09aOBQtKeOedicTYh4qKa+jZM2le1cWd6hzALaWUlpbSv3//XJehBsCsKBPmRekyK8qEeVG6zIoyYV5qr0sXOOmkwLJlgUmTVtO7dzJc/Lrrtj9cPMakobR5k2lrR1VDas2aoTz7bCfuv38GEFi9upJf/3p0na1OypTNJEmSJEmSpM1UDfsePHgAkydPS2u4eAgbVxtlJtCsWeDPf97YvAoh1Nu5SW5zkyRJkiRJyrGiorvo1av7Js2rceMuyPr7OjNJkiRJkiRJaatNM6lZtooBCCHcHUJYEkJ4bSvf3zWE8GgIYWYIYXYI4bxs1qOmo7S0NNclqIEwK8qEeVG6zIoyYV6ULrOiTJgXZVNWm0lAMbCtaVGjgLkxxsOBE4EbQwjOcdIOmzlzZq5LUANhVpQJ86J0mRVlwrwoXWZFmTAvyqasNpNijM8Cy7f1EmCX1ONdgKUxxvXZrElNw4oVK3JdghoIs6JMmBely6woE+ZF6TIryoR5UTblehXQH4BHQwiLgPbAd3JcjyRJkiRJkrYh29vcticfeDXGuA9wBHBbCKF9jmtSI/D+++/nugQ1EGZFmTAvSpdZUSbMi9JlVpQJ86Jsyvrd3EII+wF/izF+qYbv/R0oijE+lzp/ErgixvhyDa/1Vm6SJEmSJEk7WaZ3c6uLbW4hddRkHnAy8FwIYU+gF/BuTS/M9INJkiRJkiRp58vqyqQQwv8C/YFOwBLgKqAlEGOMd4YQ9gb+DOyd+pGiGOMDWStIkiRJkiRJOyTr29wkSZIkSZLUeOR6AHdaQggDQwhvhBDeCiFcket6VH+FEN4PIcwKIbwaQngx1/Wofgkh3B1CWBJCeK3ac7uHEKaFEN4MIUwNIeyWyxpVP2wlK1eFEBaEEF5JHQNzWaPqjxDCviGEp0IIc0MIs0MIY1LPe33RJmrIysWp572+aAshhFYhhBdSf6+dHUK4KvW81xZtYhtZ8dqiGoUQmqUy8WjqPOPrSr1fmRRCaAa8BXwdWAS8BAyJMb6R08JUL4UQ3gWOijEuz3Utqn9CCMcDK4F7q24KEEK4DlgaY7w+1azePcY4Lpd1Kve2kpWrgIoY4005LU71TghhL2CvGOPM1F1p/w84Azgfry+qZhtZ+Q5eX1SDEELbGONnIYTmwHPAGKAAry3azFayMgivLapBCGEscBSwa4zx9Nr8b6KGsDLpy0BZjHFejHEdMJHkP7pSTQINI9fKgRjjs8DmjcYzgHtSj+8BzqzTolQvbSUrsPUbSqgJizH+N8Y4M/V4JfAfYF+8vmgzW8lK19S3vb5oCzHGz1IPW5HcPCnitUU12EpWwGuLNhNC2Bc4Bfhjtaczvq40hP/R3RUor3a+gI3/0ZU2F4HHQwgvhRBG5LoYNQhdYoxLIPlLPtAlx/WofhsdQpgZQvij2wpUkxDC/sDhwPPAnl5ftDXVsvJC6imvL9pCaivKq8B/gcdjjC/htUU12EpWwGuLtvQ74HI2NhyhFteVhtBMkjLx1RjjkSSd1lGprSpSJur33l/l0gSgR4zxcJK/qLlkXJtIbVuaBFySWnWy+fXE64uAGrPi9UU1ijFWxhiPIFnt+OUQwqF4bVENashKb7y2aDMhhFOBJalVsttatbbd60pDaCYtBLpXO9839Zy0hRjj4tTXD4G/kGyTlLZlSQhhT/h8lsUHOa5H9VSM8cO4cdDgXUDfXNaj+iWE0IKkOXBfjPGR1NNeX7SFmrLi9UXbE2P8BCgFBuK1RdtQPSteW1SDrwKnp2YNPwCcFEK4D/hvpteVhtBMegk4KISwXwihJTAEeDTHNakeCiG0Tf1LHyGEdsAAYE5uq1I9FNi0C/8ocF7q8bnAI5v/gJqsTbKS+g9rlcF4fdGm/gS8HmO8pdpzXl9Uky2y4vVFNQkhdK7alhRCaAN8g2TOltcWbWIrWXnDa4s2F2P8aYyxe4yxB0lv5akY4/eBv5HhdaXe380NIHULw1tIml93xxh/k+OSVA+FEA4gWY0USYbO3W9WVF0I4X+B/kAnYAlwFfBX4CGgGzAP+HaMcUWualT9sJWsnEgy36QSeB8YWbW3XE1bCOGrwAxgNsl/gyLwU+BF4EG8vihlG1n5Hl5ftJkQwhdJBuE2Sx3/L8Z4bQihI15bVM02snIvXlu0FSGEfsBPUndzy/i60iCaSZIkSZIkSaofGsI2N0mSJEmSJNUTNpMkSZIkSZKUNptJkiRJkiRJSpvNJEmSJEmSJKXNZpIkSZIkSZLSZjNJkiRJkiRJabOZJEmS6q0QQmUI4YZq5z8JIVy5k353cQhh8M74Xdt5n2+FEF4PITyZzbpCCPuFEL6beYWSJEmZsZkkSZLqszXA4BBCx1wXUl0IoXkGL/8BcEGM8evZqiflAOB7mfxAhp9DkiQJsJkkSZLqt/XAncClm39j8xU8IYSK1Nd+IYTSEMJfQwhvhxCKQgjfCyG8EEKYFUI4oNqv+UYI4aUQwhshhFNTP98shHB96vUzQwgjqv3eGSGER4C5NdTz3RDCa6mjKPXcz4HjgbtDCNfV8DNXpF7/agjh1zV8/72qRloI4agQwvRqtbwaQnglhPB/IYR2QBFwfOq5S9L9HCGEtiGEv6d+32shhLPT+r+MJElqslrkugBJkqRtiMBtwOyamjE1vLbKl4CDgRXAu8BdMcavhBDGABezsTm1X4yxbwjhIGB6COFA4FxgRer1LYHnQgjTUq8/Ajg0xji/+huHEPYGfpP6/grg8RDC6THGX4UQTgIujTG+utnPDAS+CfSNMa4JIXTYzmeqfv4T4Ecxxn+HENoCq4FxwE9ijKenfv+IdD5HqiG3MMZ4WurndqnxT1eSJCnFlUmSJKleizGuBO4BLsngx16KMX4QY1wLvANUNVFmA/tXe92Dqfd4O/W6g4EBwDkhhFeBF4COQM/U61/cvJGU0heYHmNcFmOsBO4HTqj2/VDDz5wMFMcY16RqWFHDa2r6OYDngN+FEC4Gdk+95+bS/RyzSVZoFYUQjo8xVmzlPSVJkgCbSZIkqWG4hWT2ULtqz60n9XeZEEIAWlb73ppqjyurnVey6crs6it/Quo8ABfHGI9IHQfGGJ9IvebTbdS4tcbPjvj8MwKtq56MMV5H8ufRhmTFUa+t1LPdzxFjLAOOJGkqXRNCGJ+FzyFJkhoRm0mSJKk+CwAxxuUkq4h+UO177wNHpx6fAeTV4vefHRIHkgywfhOYCvwohNACIITQM7WVbFteBE4IIXRMDbX+LlC6nZ95HDg/hNAm9T671/Ca94CjUo8Lqp4MIfSIMc6NMV4PvESyoqoC2LXaz6b1OVJb9FbFGP8XuIGksSRJkrRVzkySJEn1WfWVQzcCo6o9dxfwSGob11S2vmpo87lD1c0naQTtAoyMMa4NIfyRZCvcK6kVTx8AZ26zyBj/G0IYx8YG0t9jjH/f1vvHGKeGEPoAL4cQ1gD/BMZv9vpfkgzv/phNm1M/DiGcCGwgGQb+WOrnNqT+PP4cY7wlhJDO5/gicEMIoRJYC1y0rc8qSZIUYtzW368kSZIkSZKkjdzmJkmSJEmSpLTZTJIkSZIkSVLabCZJkiRJkiQpbTaTJEmSJEmSlDabSZIkSZKk/78dOxAAAAAAEORvvcIAhRHAJpMAAAAA2GQSAAAAAJtMAgAAAGAL8fHayzR8PLkAAAAASUVORK5CYII="/>
+          <p:cNvSpPr>
+            <a:spLocks noChangeAspect="1" noChangeArrowheads="1"/>
+          </p:cNvSpPr>
+          <p:nvPr/>
+        </p:nvSpPr>
+        <p:spPr bwMode="auto">
+          <a:xfrm>
+            <a:off x="-1" y="-1"/>
+            <a:ext cx="1681163" cy="1681163"/>
+          </a:xfrm>
+          <a:prstGeom prst="rect">
+            <a:avLst/>
+          </a:prstGeom>
+          <a:noFill/>
+          <a:extLst>
+            <a:ext uri="{909E8E84-426E-40DD-AFC4-6F175D3DCCD1}">
+              <a14:hiddenFill xmlns:a14="http://schemas.microsoft.com/office/drawing/2010/main">
+                <a:solidFill>
+                  <a:srgbClr val="FFFFFF"/>
+                </a:solidFill>
+              </a14:hiddenFill>
+            </a:ext>
+          </a:extLst>
+        </p:spPr>
+        <p:txBody>
+          <a:bodyPr vert="horz" wrap="square" lIns="91440" tIns="45720" rIns="91440" bIns="45720" numCol="1" anchor="t" anchorCtr="0" compatLnSpc="1">
+            <a:prstTxWarp prst="textNoShape">
+              <a:avLst/>
+            </a:prstTxWarp>
+          </a:bodyPr>
+          <a:lstStyle/>
+          <a:p>
+            <a:endParaRPr lang="en-US"/>
+          </a:p>
+        </p:txBody>
+      </p:sp>
+    </p:spTree>
+    <p:extLst>
+      <p:ext uri="{BB962C8B-B14F-4D97-AF65-F5344CB8AC3E}">
+        <p14:creationId xmlns:p14="http://schemas.microsoft.com/office/powerpoint/2010/main" val="820200128"/>
+      </p:ext>
+    </p:extLst>
+  </p:cSld>
+  <p:clrMapOvr>
+    <a:masterClrMapping/>
+  </p:clrMapOvr>
+</p:sld>
+</file>
+
+<file path=ppt/slides/slide11.xml><?xml version="1.0" encoding="utf-8"?>
+<p:sld xmlns:a="http://schemas.openxmlformats.org/drawingml/2006/main" xmlns:r="http://schemas.openxmlformats.org/officeDocument/2006/relationships" xmlns:p="http://schemas.openxmlformats.org/presentationml/2006/main">
+  <p:cSld>
+    <p:spTree>
+      <p:nvGrpSpPr>
+        <p:cNvPr id="1" name=""/>
+        <p:cNvGrpSpPr/>
+        <p:nvPr/>
+      </p:nvGrpSpPr>
+      <p:grpSpPr>
+        <a:xfrm>
+          <a:off x="0" y="0"/>
+          <a:ext cx="0" cy="0"/>
+          <a:chOff x="0" y="0"/>
+          <a:chExt cx="0" cy="0"/>
+        </a:xfrm>
+      </p:grpSpPr>
+      <p:sp>
+        <p:nvSpPr>
+          <p:cNvPr id="2" name="Title 1"/>
+          <p:cNvSpPr>
+            <a:spLocks noGrp="1"/>
+          </p:cNvSpPr>
+          <p:nvPr>
+            <p:ph type="title"/>
+          </p:nvPr>
+        </p:nvSpPr>
+        <p:spPr/>
+        <p:txBody>
+          <a:bodyPr/>
+          <a:lstStyle/>
+          <a:p>
+            <a:r>
+              <a:rPr lang="en-US" dirty="0" smtClean="0"/>
               <a:t>Data Exploration – Data </a:t>
             </a:r>
             <a:r>
@@ -44723,7 +45147,7 @@
 </p:sld>
 </file>
 
-<file path=ppt/slides/slide11.xml><?xml version="1.0" encoding="utf-8"?>
+<file path=ppt/slides/slide12.xml><?xml version="1.0" encoding="utf-8"?>
 <p:sld xmlns:a="http://schemas.openxmlformats.org/drawingml/2006/main" xmlns:r="http://schemas.openxmlformats.org/officeDocument/2006/relationships" xmlns:p="http://schemas.openxmlformats.org/presentationml/2006/main">
   <p:cSld>
     <p:spTree>
@@ -44764,8 +45188,16 @@
               <a:t>Preparation </a:t>
             </a:r>
             <a:r>
-              <a:rPr lang="en-US" dirty="0" err="1" smtClean="0"/>
-              <a:t>kmeans</a:t>
+              <a:rPr lang="en-US" dirty="0" smtClean="0"/>
+              <a:t>K-</a:t>
+            </a:r>
+            <a:r>
+              <a:rPr lang="en-US" dirty="0"/>
+              <a:t>M</a:t>
+            </a:r>
+            <a:r>
+              <a:rPr lang="en-US" dirty="0" smtClean="0"/>
+              <a:t>eans</a:t>
             </a:r>
             <a:endParaRPr lang="en-US" dirty="0"/>
           </a:p>
@@ -44862,7 +45294,7 @@
 </p:sld>
 </file>
 
-<file path=ppt/slides/slide12.xml><?xml version="1.0" encoding="utf-8"?>
+<file path=ppt/slides/slide13.xml><?xml version="1.0" encoding="utf-8"?>
 <p:sld xmlns:a="http://schemas.openxmlformats.org/drawingml/2006/main" xmlns:r="http://schemas.openxmlformats.org/officeDocument/2006/relationships" xmlns:p="http://schemas.openxmlformats.org/presentationml/2006/main">
   <p:cSld>
     <p:spTree>
@@ -44896,11 +45328,15 @@
           <a:p>
             <a:r>
               <a:rPr lang="en-US" dirty="0" smtClean="0"/>
-              <a:t>Data Quality – Data </a:t>
+              <a:t>Data Quality – </a:t>
             </a:r>
             <a:r>
               <a:rPr lang="en-US" dirty="0" smtClean="0"/>
-              <a:t>Preparation random forest</a:t>
+              <a:t>Issues with </a:t>
+            </a:r>
+            <a:r>
+              <a:rPr lang="en-US" dirty="0" smtClean="0"/>
+              <a:t>Data Preparation (random forest)</a:t>
             </a:r>
             <a:endParaRPr lang="en-US" dirty="0"/>
           </a:p>
@@ -45010,7 +45446,178 @@
 </p:sld>
 </file>
 
-<file path=ppt/slides/slide13.xml><?xml version="1.0" encoding="utf-8"?>
+<file path=ppt/slides/slide14.xml><?xml version="1.0" encoding="utf-8"?>
+<p:sld xmlns:a="http://schemas.openxmlformats.org/drawingml/2006/main" xmlns:r="http://schemas.openxmlformats.org/officeDocument/2006/relationships" xmlns:p="http://schemas.openxmlformats.org/presentationml/2006/main">
+  <p:cSld>
+    <p:spTree>
+      <p:nvGrpSpPr>
+        <p:cNvPr id="1" name=""/>
+        <p:cNvGrpSpPr/>
+        <p:nvPr/>
+      </p:nvGrpSpPr>
+      <p:grpSpPr>
+        <a:xfrm>
+          <a:off x="0" y="0"/>
+          <a:ext cx="0" cy="0"/>
+          <a:chOff x="0" y="0"/>
+          <a:chExt cx="0" cy="0"/>
+        </a:xfrm>
+      </p:grpSpPr>
+      <p:sp>
+        <p:nvSpPr>
+          <p:cNvPr id="2" name="Title 1"/>
+          <p:cNvSpPr>
+            <a:spLocks noGrp="1"/>
+          </p:cNvSpPr>
+          <p:nvPr>
+            <p:ph type="title"/>
+          </p:nvPr>
+        </p:nvSpPr>
+        <p:spPr/>
+        <p:txBody>
+          <a:bodyPr/>
+          <a:lstStyle/>
+          <a:p>
+            <a:r>
+              <a:rPr lang="en-US" dirty="0" smtClean="0"/>
+              <a:t>Data Quality – Data </a:t>
+            </a:r>
+            <a:r>
+              <a:rPr lang="en-US" dirty="0" smtClean="0"/>
+              <a:t>Preparation K-Means</a:t>
+            </a:r>
+            <a:endParaRPr lang="en-US" dirty="0"/>
+          </a:p>
+        </p:txBody>
+      </p:sp>
+      <p:sp>
+        <p:nvSpPr>
+          <p:cNvPr id="3" name="Content Placeholder 2"/>
+          <p:cNvSpPr>
+            <a:spLocks noGrp="1"/>
+          </p:cNvSpPr>
+          <p:nvPr>
+            <p:ph idx="1"/>
+          </p:nvPr>
+        </p:nvSpPr>
+        <p:spPr/>
+        <p:txBody>
+          <a:bodyPr>
+            <a:normAutofit lnSpcReduction="10000"/>
+          </a:bodyPr>
+          <a:lstStyle/>
+          <a:p>
+            <a:r>
+              <a:rPr lang="en-US" dirty="0" smtClean="0"/>
+              <a:t>Cleaned and merged source files, handle missing values</a:t>
+            </a:r>
+          </a:p>
+          <a:p>
+            <a:pPr lvl="1"/>
+            <a:r>
+              <a:rPr lang="en-US" dirty="0" smtClean="0"/>
+              <a:t>Ignored 1</a:t>
+            </a:r>
+            <a:r>
+              <a:rPr lang="en-US" baseline="30000" dirty="0" smtClean="0"/>
+              <a:t>st</a:t>
+            </a:r>
+            <a:r>
+              <a:rPr lang="en-US" dirty="0" smtClean="0"/>
+              <a:t> two years of demographic data</a:t>
+            </a:r>
+          </a:p>
+          <a:p>
+            <a:pPr lvl="1"/>
+            <a:r>
+              <a:rPr lang="en-US" dirty="0" smtClean="0"/>
+              <a:t>Dropped samples with </a:t>
+            </a:r>
+            <a:r>
+              <a:rPr lang="en-US" dirty="0" err="1" smtClean="0"/>
+              <a:t>NaN</a:t>
+            </a:r>
+            <a:endParaRPr lang="en-US" dirty="0" smtClean="0"/>
+          </a:p>
+          <a:p>
+            <a:r>
+              <a:rPr lang="en-US" dirty="0" smtClean="0"/>
+              <a:t>Feature Engineering</a:t>
+            </a:r>
+          </a:p>
+          <a:p>
+            <a:pPr lvl="1"/>
+            <a:r>
+              <a:rPr lang="en-US" dirty="0" err="1" smtClean="0"/>
+              <a:t>Binarized</a:t>
+            </a:r>
+            <a:r>
+              <a:rPr lang="en-US" dirty="0" smtClean="0"/>
+              <a:t> nominal data</a:t>
+            </a:r>
+          </a:p>
+          <a:p>
+            <a:pPr lvl="1"/>
+            <a:r>
+              <a:rPr lang="en-US" dirty="0" smtClean="0"/>
+              <a:t>Normalized numeric data</a:t>
+            </a:r>
+          </a:p>
+          <a:p>
+            <a:r>
+              <a:rPr lang="en-US" dirty="0" smtClean="0"/>
+              <a:t>Joined Panelist and Demo data</a:t>
+            </a:r>
+          </a:p>
+          <a:p>
+            <a:r>
+              <a:rPr lang="en-US" dirty="0" smtClean="0"/>
+              <a:t>K-Means with 12 clusters</a:t>
+            </a:r>
+          </a:p>
+          <a:p>
+            <a:r>
+              <a:rPr lang="en-US" dirty="0" smtClean="0"/>
+              <a:t>Applied cluster labels onto dataset</a:t>
+            </a:r>
+          </a:p>
+          <a:p>
+            <a:r>
+              <a:rPr lang="en-US" dirty="0" smtClean="0"/>
+              <a:t>Grouped dataset by cluster and identified most </a:t>
+            </a:r>
+            <a:r>
+              <a:rPr lang="en-US" dirty="0" err="1" smtClean="0"/>
+              <a:t>prevelant</a:t>
+            </a:r>
+            <a:r>
+              <a:rPr lang="en-US" dirty="0" smtClean="0"/>
+              <a:t> features</a:t>
+            </a:r>
+          </a:p>
+          <a:p>
+            <a:endParaRPr lang="en-US" dirty="0" smtClean="0"/>
+          </a:p>
+          <a:p>
+            <a:pPr lvl="1"/>
+            <a:endParaRPr lang="en-US" dirty="0" smtClean="0"/>
+          </a:p>
+        </p:txBody>
+      </p:sp>
+    </p:spTree>
+    <p:extLst>
+      <p:ext uri="{BB962C8B-B14F-4D97-AF65-F5344CB8AC3E}">
+        <p14:creationId xmlns:p14="http://schemas.microsoft.com/office/powerpoint/2010/main" val="2078521049"/>
+      </p:ext>
+    </p:extLst>
+  </p:cSld>
+  <p:clrMapOvr>
+    <a:masterClrMapping/>
+  </p:clrMapOvr>
+</p:sld>
+</file>
+
+<file path=ppt/slides/slide15.xml><?xml version="1.0" encoding="utf-8"?>
 <p:sld xmlns:a="http://schemas.openxmlformats.org/drawingml/2006/main" xmlns:r="http://schemas.openxmlformats.org/officeDocument/2006/relationships" xmlns:p="http://schemas.openxmlformats.org/presentationml/2006/main">
   <p:cSld>
     <p:spTree>
@@ -45158,7 +45765,7 @@
 </p:sld>
 </file>
 
-<file path=ppt/slides/slide14.xml><?xml version="1.0" encoding="utf-8"?>
+<file path=ppt/slides/slide16.xml><?xml version="1.0" encoding="utf-8"?>
 <p:sld xmlns:a="http://schemas.openxmlformats.org/drawingml/2006/main" xmlns:r="http://schemas.openxmlformats.org/officeDocument/2006/relationships" xmlns:p="http://schemas.openxmlformats.org/presentationml/2006/main">
   <p:cSld>
     <p:spTree>
@@ -45205,7 +45812,7 @@
             <a:picLocks noGrp="1" noChangeAspect="1"/>
           </p:cNvPicPr>
           <p:nvPr>
-            <p:ph idx="1"/>
+            <p:ph sz="half" idx="1"/>
           </p:nvPr>
         </p:nvPicPr>
         <p:blipFill>
@@ -45216,15 +45823,14 @@
               </a:ext>
             </a:extLst>
           </a:blip>
-          <a:srcRect/>
           <a:stretch>
             <a:fillRect/>
           </a:stretch>
         </p:blipFill>
         <p:spPr bwMode="auto">
           <a:xfrm>
-            <a:off x="2737005" y="1444061"/>
-            <a:ext cx="6107265" cy="4572000"/>
+            <a:off x="838200" y="2061778"/>
+            <a:ext cx="5181600" cy="3879031"/>
           </a:xfrm>
           <a:prstGeom prst="rect">
             <a:avLst/>
@@ -45235,6 +45841,60 @@
           </a:ln>
         </p:spPr>
       </p:pic>
+      <p:sp>
+        <p:nvSpPr>
+          <p:cNvPr id="8" name="Content Placeholder 7"/>
+          <p:cNvSpPr>
+            <a:spLocks noGrp="1"/>
+          </p:cNvSpPr>
+          <p:nvPr>
+            <p:ph sz="half" idx="2"/>
+          </p:nvPr>
+        </p:nvSpPr>
+        <p:spPr/>
+        <p:txBody>
+          <a:bodyPr/>
+          <a:lstStyle/>
+          <a:p>
+            <a:r>
+              <a:rPr lang="en-US" dirty="0" smtClean="0"/>
+              <a:t>Store Descriptors</a:t>
+            </a:r>
+          </a:p>
+          <a:p>
+            <a:r>
+              <a:rPr lang="en-US" dirty="0" smtClean="0"/>
+              <a:t>US County Codes (FIPS)</a:t>
+            </a:r>
+          </a:p>
+          <a:p>
+            <a:r>
+              <a:rPr lang="en-US" dirty="0" smtClean="0"/>
+              <a:t>Panelist Demographics</a:t>
+            </a:r>
+          </a:p>
+          <a:p>
+            <a:r>
+              <a:rPr lang="en-US" smtClean="0"/>
+              <a:t>Panelist Sales</a:t>
+            </a:r>
+            <a:endParaRPr lang="en-US" dirty="0" smtClean="0"/>
+          </a:p>
+          <a:p>
+            <a:r>
+              <a:rPr lang="en-US" dirty="0" smtClean="0"/>
+              <a:t>Store Sales Data</a:t>
+            </a:r>
+          </a:p>
+          <a:p>
+            <a:r>
+              <a:rPr lang="en-US" dirty="0" smtClean="0"/>
+              <a:t>Product Descriptors</a:t>
+            </a:r>
+            <a:endParaRPr lang="en-US" dirty="0"/>
+          </a:p>
+        </p:txBody>
+      </p:sp>
       <p:sp>
         <p:nvSpPr>
           <p:cNvPr id="6" name="TextBox 5"/>
@@ -45276,7 +45936,7 @@
     </p:spTree>
     <p:extLst>
       <p:ext uri="{BB962C8B-B14F-4D97-AF65-F5344CB8AC3E}">
-        <p14:creationId xmlns:p14="http://schemas.microsoft.com/office/powerpoint/2010/main" val="971953282"/>
+        <p14:creationId xmlns:p14="http://schemas.microsoft.com/office/powerpoint/2010/main" val="1995238015"/>
       </p:ext>
     </p:extLst>
   </p:cSld>
@@ -45286,7 +45946,7 @@
 </p:sld>
 </file>
 
-<file path=ppt/slides/slide15.xml><?xml version="1.0" encoding="utf-8"?>
+<file path=ppt/slides/slide17.xml><?xml version="1.0" encoding="utf-8"?>
 <p:sld xmlns:a="http://schemas.openxmlformats.org/drawingml/2006/main" xmlns:r="http://schemas.openxmlformats.org/officeDocument/2006/relationships" xmlns:p="http://schemas.openxmlformats.org/presentationml/2006/main">
   <p:cSld>
     <p:spTree>
@@ -45380,7 +46040,7 @@
 </p:sld>
 </file>
 
-<file path=ppt/slides/slide16.xml><?xml version="1.0" encoding="utf-8"?>
+<file path=ppt/slides/slide18.xml><?xml version="1.0" encoding="utf-8"?>
 <p:sld xmlns:a="http://schemas.openxmlformats.org/drawingml/2006/main" xmlns:r="http://schemas.openxmlformats.org/officeDocument/2006/relationships" xmlns:p="http://schemas.openxmlformats.org/presentationml/2006/main">
   <p:cSld>
     <p:spTree>
@@ -46022,7 +46682,7 @@
 </p:sld>
 </file>
 
-<file path=ppt/slides/slide17.xml><?xml version="1.0" encoding="utf-8"?>
+<file path=ppt/slides/slide19.xml><?xml version="1.0" encoding="utf-8"?>
 <p:sld xmlns:a="http://schemas.openxmlformats.org/drawingml/2006/main" xmlns:r="http://schemas.openxmlformats.org/officeDocument/2006/relationships" xmlns:p="http://schemas.openxmlformats.org/presentationml/2006/main">
   <p:cSld>
     <p:spTree>
@@ -46130,7 +46790,81 @@
 </p:sld>
 </file>
 
-<file path=ppt/slides/slide18.xml><?xml version="1.0" encoding="utf-8"?>
+<file path=ppt/slides/slide2.xml><?xml version="1.0" encoding="utf-8"?>
+<p:sld xmlns:a="http://schemas.openxmlformats.org/drawingml/2006/main" xmlns:r="http://schemas.openxmlformats.org/officeDocument/2006/relationships" xmlns:p="http://schemas.openxmlformats.org/presentationml/2006/main">
+  <p:cSld>
+    <p:spTree>
+      <p:nvGrpSpPr>
+        <p:cNvPr id="1" name=""/>
+        <p:cNvGrpSpPr/>
+        <p:nvPr/>
+      </p:nvGrpSpPr>
+      <p:grpSpPr>
+        <a:xfrm>
+          <a:off x="0" y="0"/>
+          <a:ext cx="0" cy="0"/>
+          <a:chOff x="0" y="0"/>
+          <a:chExt cx="0" cy="0"/>
+        </a:xfrm>
+      </p:grpSpPr>
+      <p:graphicFrame>
+        <p:nvGraphicFramePr>
+          <p:cNvPr id="4" name="Diagram 3"/>
+          <p:cNvGraphicFramePr/>
+          <p:nvPr>
+            <p:extLst>
+              <p:ext uri="{D42A27DB-BD31-4B8C-83A1-F6EECF244321}">
+                <p14:modId xmlns:p14="http://schemas.microsoft.com/office/powerpoint/2010/main" val="1174036082"/>
+              </p:ext>
+            </p:extLst>
+          </p:nvPr>
+        </p:nvGraphicFramePr>
+        <p:xfrm>
+          <a:off x="351692" y="719666"/>
+          <a:ext cx="11535508" cy="4045765"/>
+        </p:xfrm>
+        <a:graphic>
+          <a:graphicData uri="http://schemas.openxmlformats.org/drawingml/2006/diagram">
+            <dgm:relIds xmlns:dgm="http://schemas.openxmlformats.org/drawingml/2006/diagram" xmlns:r="http://schemas.openxmlformats.org/officeDocument/2006/relationships" r:dm="rId2" r:lo="rId3" r:qs="rId4" r:cs="rId5"/>
+          </a:graphicData>
+        </a:graphic>
+      </p:graphicFrame>
+      <p:graphicFrame>
+        <p:nvGraphicFramePr>
+          <p:cNvPr id="6" name="Diagram 5"/>
+          <p:cNvGraphicFramePr/>
+          <p:nvPr>
+            <p:extLst>
+              <p:ext uri="{D42A27DB-BD31-4B8C-83A1-F6EECF244321}">
+                <p14:modId xmlns:p14="http://schemas.microsoft.com/office/powerpoint/2010/main" val="815968651"/>
+              </p:ext>
+            </p:extLst>
+          </p:nvPr>
+        </p:nvGraphicFramePr>
+        <p:xfrm>
+          <a:off x="3966308" y="3647503"/>
+          <a:ext cx="3559908" cy="2831123"/>
+        </p:xfrm>
+        <a:graphic>
+          <a:graphicData uri="http://schemas.openxmlformats.org/drawingml/2006/diagram">
+            <dgm:relIds xmlns:dgm="http://schemas.openxmlformats.org/drawingml/2006/diagram" xmlns:r="http://schemas.openxmlformats.org/officeDocument/2006/relationships" r:dm="rId7" r:lo="rId8" r:qs="rId9" r:cs="rId10"/>
+          </a:graphicData>
+        </a:graphic>
+      </p:graphicFrame>
+    </p:spTree>
+    <p:extLst>
+      <p:ext uri="{BB962C8B-B14F-4D97-AF65-F5344CB8AC3E}">
+        <p14:creationId xmlns:p14="http://schemas.microsoft.com/office/powerpoint/2010/main" val="960302610"/>
+      </p:ext>
+    </p:extLst>
+  </p:cSld>
+  <p:clrMapOvr>
+    <a:masterClrMapping/>
+  </p:clrMapOvr>
+</p:sld>
+</file>
+
+<file path=ppt/slides/slide20.xml><?xml version="1.0" encoding="utf-8"?>
 <p:sld xmlns:a="http://schemas.openxmlformats.org/drawingml/2006/main" xmlns:r="http://schemas.openxmlformats.org/officeDocument/2006/relationships" xmlns:p="http://schemas.openxmlformats.org/presentationml/2006/main">
   <p:cSld>
     <p:spTree>
@@ -46237,7 +46971,7 @@
 </p:sld>
 </file>
 
-<file path=ppt/slides/slide19.xml><?xml version="1.0" encoding="utf-8"?>
+<file path=ppt/slides/slide21.xml><?xml version="1.0" encoding="utf-8"?>
 <p:sld xmlns:a="http://schemas.openxmlformats.org/drawingml/2006/main" xmlns:r="http://schemas.openxmlformats.org/officeDocument/2006/relationships" xmlns:p="http://schemas.openxmlformats.org/presentationml/2006/main">
   <p:cSld>
     <p:spTree>
@@ -46332,7 +47066,7 @@
 </p:sld>
 </file>
 
-<file path=ppt/slides/slide2.xml><?xml version="1.0" encoding="utf-8"?>
+<file path=ppt/slides/slide22.xml><?xml version="1.0" encoding="utf-8"?>
 <p:sld xmlns:a="http://schemas.openxmlformats.org/drawingml/2006/main" xmlns:r="http://schemas.openxmlformats.org/officeDocument/2006/relationships" xmlns:p="http://schemas.openxmlformats.org/presentationml/2006/main">
   <p:cSld>
     <p:spTree>
@@ -46349,92 +47083,92 @@
           <a:chExt cx="0" cy="0"/>
         </a:xfrm>
       </p:grpSpPr>
-      <p:graphicFrame>
-        <p:nvGraphicFramePr>
-          <p:cNvPr id="4" name="Diagram 3"/>
-          <p:cNvGraphicFramePr/>
-          <p:nvPr>
-            <p:extLst>
-              <p:ext uri="{D42A27DB-BD31-4B8C-83A1-F6EECF244321}">
-                <p14:modId xmlns:p14="http://schemas.microsoft.com/office/powerpoint/2010/main" val="1174036082"/>
-              </p:ext>
-            </p:extLst>
-          </p:nvPr>
-        </p:nvGraphicFramePr>
-        <p:xfrm>
-          <a:off x="351692" y="719666"/>
-          <a:ext cx="11535508" cy="4045765"/>
-        </p:xfrm>
-        <a:graphic>
-          <a:graphicData uri="http://schemas.openxmlformats.org/drawingml/2006/diagram">
-            <dgm:relIds xmlns:dgm="http://schemas.openxmlformats.org/drawingml/2006/diagram" xmlns:r="http://schemas.openxmlformats.org/officeDocument/2006/relationships" r:dm="rId2" r:lo="rId3" r:qs="rId4" r:cs="rId5"/>
-          </a:graphicData>
-        </a:graphic>
-      </p:graphicFrame>
       <p:sp>
         <p:nvSpPr>
-          <p:cNvPr id="5" name="TextBox 4"/>
-          <p:cNvSpPr txBox="1"/>
+          <p:cNvPr id="2" name="Title 1"/>
+          <p:cNvSpPr>
+            <a:spLocks noGrp="1"/>
+          </p:cNvSpPr>
+          <p:nvPr>
+            <p:ph type="title"/>
+          </p:nvPr>
+        </p:nvSpPr>
+        <p:spPr/>
+        <p:txBody>
+          <a:bodyPr/>
+          <a:lstStyle/>
+          <a:p>
+            <a:r>
+              <a:rPr lang="en-US" dirty="0" smtClean="0"/>
+              <a:t>Data Quality – Data </a:t>
+            </a:r>
+            <a:r>
+              <a:rPr lang="en-US" dirty="0" smtClean="0"/>
+              <a:t>Preparation K-Means</a:t>
+            </a:r>
+            <a:endParaRPr lang="en-US" dirty="0"/>
+          </a:p>
+        </p:txBody>
+      </p:sp>
+      <p:sp>
+        <p:nvSpPr>
+          <p:cNvPr id="3" name="Content Placeholder 2"/>
+          <p:cNvSpPr>
+            <a:spLocks noGrp="1"/>
+          </p:cNvSpPr>
+          <p:nvPr>
+            <p:ph idx="1"/>
+          </p:nvPr>
+        </p:nvSpPr>
+        <p:spPr/>
+        <p:txBody>
+          <a:bodyPr/>
+          <a:lstStyle/>
+          <a:p>
+            <a:r>
+              <a:rPr lang="en-US" dirty="0" smtClean="0"/>
+              <a:t>Sample cluster:</a:t>
+            </a:r>
+          </a:p>
+          <a:p>
+            <a:endParaRPr lang="en-US" dirty="0" smtClean="0"/>
+          </a:p>
+        </p:txBody>
+      </p:sp>
+      <p:pic>
+        <p:nvPicPr>
+          <p:cNvPr id="4" name="Picture 3"/>
+          <p:cNvPicPr>
+            <a:picLocks noChangeAspect="1"/>
+          </p:cNvPicPr>
           <p:nvPr/>
-        </p:nvSpPr>
+        </p:nvPicPr>
+        <p:blipFill>
+          <a:blip r:embed="rId2">
+            <a:extLst>
+              <a:ext uri="{28A0092B-C50C-407E-A947-70E740481C1C}">
+                <a14:useLocalDpi xmlns:a14="http://schemas.microsoft.com/office/drawing/2010/main" val="0"/>
+              </a:ext>
+            </a:extLst>
+          </a:blip>
+          <a:stretch>
+            <a:fillRect/>
+          </a:stretch>
+        </p:blipFill>
         <p:spPr>
           <a:xfrm>
-            <a:off x="158263" y="585492"/>
-            <a:ext cx="10498014" cy="1754326"/>
+            <a:off x="4051300" y="1825625"/>
+            <a:ext cx="7302500" cy="4546600"/>
           </a:xfrm>
           <a:prstGeom prst="rect">
             <a:avLst/>
           </a:prstGeom>
-          <a:noFill/>
         </p:spPr>
-        <p:txBody>
-          <a:bodyPr wrap="square" rtlCol="0">
-            <a:spAutoFit/>
-          </a:bodyPr>
-          <a:lstStyle/>
-          <a:p>
-            <a:r>
-              <a:rPr lang="en-US" sz="3600" dirty="0" smtClean="0">
-                <a:solidFill>
-                  <a:srgbClr val="FF0000"/>
-                </a:solidFill>
-              </a:rPr>
-              <a:t>To Do:  Add the arrows that show “iteration” and make it look like sub box is “coming out” of arrow (do on all section break slides)</a:t>
-            </a:r>
-            <a:endParaRPr lang="en-US" sz="3600" dirty="0">
-              <a:solidFill>
-                <a:srgbClr val="FF0000"/>
-              </a:solidFill>
-            </a:endParaRPr>
-          </a:p>
-        </p:txBody>
-      </p:sp>
-      <p:graphicFrame>
-        <p:nvGraphicFramePr>
-          <p:cNvPr id="6" name="Diagram 5"/>
-          <p:cNvGraphicFramePr/>
-          <p:nvPr>
-            <p:extLst>
-              <p:ext uri="{D42A27DB-BD31-4B8C-83A1-F6EECF244321}">
-                <p14:modId xmlns:p14="http://schemas.microsoft.com/office/powerpoint/2010/main" val="815968651"/>
-              </p:ext>
-            </p:extLst>
-          </p:nvPr>
-        </p:nvGraphicFramePr>
-        <p:xfrm>
-          <a:off x="3966308" y="3647503"/>
-          <a:ext cx="3559908" cy="2831123"/>
-        </p:xfrm>
-        <a:graphic>
-          <a:graphicData uri="http://schemas.openxmlformats.org/drawingml/2006/diagram">
-            <dgm:relIds xmlns:dgm="http://schemas.openxmlformats.org/drawingml/2006/diagram" xmlns:r="http://schemas.openxmlformats.org/officeDocument/2006/relationships" r:dm="rId7" r:lo="rId8" r:qs="rId9" r:cs="rId10"/>
-          </a:graphicData>
-        </a:graphic>
-      </p:graphicFrame>
+      </p:pic>
     </p:spTree>
     <p:extLst>
       <p:ext uri="{BB962C8B-B14F-4D97-AF65-F5344CB8AC3E}">
-        <p14:creationId xmlns:p14="http://schemas.microsoft.com/office/powerpoint/2010/main" val="960302610"/>
+        <p14:creationId xmlns:p14="http://schemas.microsoft.com/office/powerpoint/2010/main" val="1641161786"/>
       </p:ext>
     </p:extLst>
   </p:cSld>
@@ -46444,7 +47178,7 @@
 </p:sld>
 </file>
 
-<file path=ppt/slides/slide20.xml><?xml version="1.0" encoding="utf-8"?>
+<file path=ppt/slides/slide23.xml><?xml version="1.0" encoding="utf-8"?>
 <p:sld xmlns:a="http://schemas.openxmlformats.org/drawingml/2006/main" xmlns:r="http://schemas.openxmlformats.org/officeDocument/2006/relationships" xmlns:p="http://schemas.openxmlformats.org/presentationml/2006/main">
   <p:cSld>
     <p:spTree>
@@ -46556,7 +47290,7 @@
 </p:sld>
 </file>
 
-<file path=ppt/slides/slide21.xml><?xml version="1.0" encoding="utf-8"?>
+<file path=ppt/slides/slide24.xml><?xml version="1.0" encoding="utf-8"?>
 <p:sld xmlns:a="http://schemas.openxmlformats.org/drawingml/2006/main" xmlns:r="http://schemas.openxmlformats.org/officeDocument/2006/relationships" xmlns:p="http://schemas.openxmlformats.org/presentationml/2006/main">
   <p:cSld>
     <p:spTree>
@@ -46668,7 +47402,7 @@
 </p:sld>
 </file>
 
-<file path=ppt/slides/slide22.xml><?xml version="1.0" encoding="utf-8"?>
+<file path=ppt/slides/slide25.xml><?xml version="1.0" encoding="utf-8"?>
 <p:sld xmlns:a="http://schemas.openxmlformats.org/drawingml/2006/main" xmlns:r="http://schemas.openxmlformats.org/officeDocument/2006/relationships" xmlns:p="http://schemas.openxmlformats.org/presentationml/2006/main">
   <p:cSld>
     <p:spTree>
@@ -46703,7 +47437,7 @@
         </p:xfrm>
         <a:graphic>
           <a:graphicData uri="http://schemas.openxmlformats.org/drawingml/2006/diagram">
-            <dgm:relIds xmlns:dgm="http://schemas.openxmlformats.org/drawingml/2006/diagram" xmlns:r="http://schemas.openxmlformats.org/officeDocument/2006/relationships" r:dm="rId2" r:lo="rId3" r:qs="rId4" r:cs="rId5"/>
+            <dgm:relIds xmlns:dgm="http://schemas.openxmlformats.org/drawingml/2006/diagram" xmlns:r="http://schemas.openxmlformats.org/officeDocument/2006/relationships" r:dm="rId3" r:lo="rId4" r:qs="rId5" r:cs="rId6"/>
           </a:graphicData>
         </a:graphic>
       </p:graphicFrame>
@@ -46725,7 +47459,7 @@
         </p:xfrm>
         <a:graphic>
           <a:graphicData uri="http://schemas.openxmlformats.org/drawingml/2006/diagram">
-            <dgm:relIds xmlns:dgm="http://schemas.openxmlformats.org/drawingml/2006/diagram" xmlns:r="http://schemas.openxmlformats.org/officeDocument/2006/relationships" r:dm="rId7" r:lo="rId8" r:qs="rId9" r:cs="rId10"/>
+            <dgm:relIds xmlns:dgm="http://schemas.openxmlformats.org/drawingml/2006/diagram" xmlns:r="http://schemas.openxmlformats.org/officeDocument/2006/relationships" r:dm="rId8" r:lo="rId9" r:qs="rId10" r:cs="rId11"/>
           </a:graphicData>
         </a:graphic>
       </p:graphicFrame>
@@ -46780,7 +47514,7 @@
 </p:sld>
 </file>
 
-<file path=ppt/slides/slide23.xml><?xml version="1.0" encoding="utf-8"?>
+<file path=ppt/slides/slide26.xml><?xml version="1.0" encoding="utf-8"?>
 <p:sld xmlns:a="http://schemas.openxmlformats.org/drawingml/2006/main" xmlns:r="http://schemas.openxmlformats.org/officeDocument/2006/relationships" xmlns:p="http://schemas.openxmlformats.org/presentationml/2006/main">
   <p:cSld>
     <p:spTree>
@@ -47889,7 +48623,11 @@
           <a:p>
             <a:r>
               <a:rPr lang="en-US" dirty="0" smtClean="0"/>
-              <a:t>Data Exploration - Demographics</a:t>
+              <a:t>Data Exploration </a:t>
+            </a:r>
+            <a:r>
+              <a:rPr lang="en-US" dirty="0" smtClean="0"/>
+              <a:t>– Demographics Random</a:t>
             </a:r>
             <a:endParaRPr lang="en-US" dirty="0"/>
           </a:p>

</xml_diff>

<commit_message>
added h5 file image
</commit_message>
<xml_diff>
--- a/Current_Powerpoint/Froyo_v2.pptx
+++ b/Current_Powerpoint/Froyo_v2.pptx
@@ -5,7 +5,7 @@
     <p:sldMasterId id="2147483768" r:id="rId1"/>
   </p:sldMasterIdLst>
   <p:notesMasterIdLst>
-    <p:notesMasterId r:id="rId29"/>
+    <p:notesMasterId r:id="rId28"/>
   </p:notesMasterIdLst>
   <p:sldIdLst>
     <p:sldId id="256" r:id="rId2"/>
@@ -17,24 +17,23 @@
     <p:sldId id="261" r:id="rId8"/>
     <p:sldId id="275" r:id="rId9"/>
     <p:sldId id="276" r:id="rId10"/>
-    <p:sldId id="281" r:id="rId11"/>
-    <p:sldId id="285" r:id="rId12"/>
-    <p:sldId id="277" r:id="rId13"/>
-    <p:sldId id="280" r:id="rId14"/>
-    <p:sldId id="278" r:id="rId15"/>
-    <p:sldId id="282" r:id="rId16"/>
-    <p:sldId id="279" r:id="rId17"/>
-    <p:sldId id="284" r:id="rId18"/>
-    <p:sldId id="264" r:id="rId19"/>
-    <p:sldId id="272" r:id="rId20"/>
-    <p:sldId id="273" r:id="rId21"/>
-    <p:sldId id="274" r:id="rId22"/>
-    <p:sldId id="265" r:id="rId23"/>
-    <p:sldId id="283" r:id="rId24"/>
-    <p:sldId id="266" r:id="rId25"/>
-    <p:sldId id="267" r:id="rId26"/>
-    <p:sldId id="268" r:id="rId27"/>
-    <p:sldId id="269" r:id="rId28"/>
+    <p:sldId id="285" r:id="rId11"/>
+    <p:sldId id="277" r:id="rId12"/>
+    <p:sldId id="280" r:id="rId13"/>
+    <p:sldId id="278" r:id="rId14"/>
+    <p:sldId id="282" r:id="rId15"/>
+    <p:sldId id="279" r:id="rId16"/>
+    <p:sldId id="284" r:id="rId17"/>
+    <p:sldId id="264" r:id="rId18"/>
+    <p:sldId id="272" r:id="rId19"/>
+    <p:sldId id="273" r:id="rId20"/>
+    <p:sldId id="274" r:id="rId21"/>
+    <p:sldId id="265" r:id="rId22"/>
+    <p:sldId id="283" r:id="rId23"/>
+    <p:sldId id="266" r:id="rId24"/>
+    <p:sldId id="267" r:id="rId25"/>
+    <p:sldId id="268" r:id="rId26"/>
+    <p:sldId id="269" r:id="rId27"/>
   </p:sldIdLst>
   <p:sldSz cx="12192000" cy="6858000"/>
   <p:notesSz cx="6858000" cy="9144000"/>
@@ -15001,19 +15000,19 @@
     </dgm:pt>
   </dgm:ptLst>
   <dgm:cxnLst>
-    <dgm:cxn modelId="{A501AB1F-C48B-CF4A-B99B-4AA5D3EFA962}" type="presOf" srcId="{4DB998AD-7927-5B4C-AF89-5EC4A18A0E00}" destId="{7A1517E1-0C42-0D4D-98F3-06E91C77CB05}" srcOrd="0" destOrd="0" presId="urn:microsoft.com/office/officeart/2005/8/layout/chevron1"/>
+    <dgm:cxn modelId="{F2BBE171-C299-F84A-AF45-099B9FB001DC}" srcId="{C342DEE3-523F-F042-BEFB-F64A1DCBA45E}" destId="{57E707D1-F904-3C4D-A97D-6344FC1412CE}" srcOrd="5" destOrd="0" parTransId="{35C4A167-B549-0641-BB3E-8676FD9856A0}" sibTransId="{C502865C-5A96-DE48-8F6A-474069216E46}"/>
+    <dgm:cxn modelId="{36784185-354A-3D4D-9012-9F185ADE69E0}" srcId="{C342DEE3-523F-F042-BEFB-F64A1DCBA45E}" destId="{6C924822-371E-0743-AFA9-944C89D688C1}" srcOrd="4" destOrd="0" parTransId="{2103148D-D9C9-544C-B4BC-5161440FB982}" sibTransId="{FBD03F35-4A8D-9143-BBCF-051998EFEB7C}"/>
+    <dgm:cxn modelId="{AC1B6D78-1ACA-4545-AF88-5850E52918E4}" srcId="{C342DEE3-523F-F042-BEFB-F64A1DCBA45E}" destId="{863EAE21-0F44-0945-BE24-14E4AABC434B}" srcOrd="0" destOrd="0" parTransId="{EA52A9BA-4055-DF4C-B700-7421C53B81CD}" sibTransId="{31727A54-5C06-2D40-97C1-9233089A8746}"/>
+    <dgm:cxn modelId="{1E9F67E7-8E1A-D64E-A014-9D0E3F7459B9}" type="presOf" srcId="{863EAE21-0F44-0945-BE24-14E4AABC434B}" destId="{6E009E9B-8246-3F40-8AC3-5B38E276B2E5}" srcOrd="0" destOrd="0" presId="urn:microsoft.com/office/officeart/2005/8/layout/chevron1"/>
     <dgm:cxn modelId="{B8CCD691-FA78-8A40-A4CB-AD1A416DCD69}" type="presOf" srcId="{6C924822-371E-0743-AFA9-944C89D688C1}" destId="{533FC013-F1B4-4A4E-B674-EA2CDC4961EC}" srcOrd="0" destOrd="0" presId="urn:microsoft.com/office/officeart/2005/8/layout/chevron1"/>
-    <dgm:cxn modelId="{36784185-354A-3D4D-9012-9F185ADE69E0}" srcId="{C342DEE3-523F-F042-BEFB-F64A1DCBA45E}" destId="{6C924822-371E-0743-AFA9-944C89D688C1}" srcOrd="4" destOrd="0" parTransId="{2103148D-D9C9-544C-B4BC-5161440FB982}" sibTransId="{FBD03F35-4A8D-9143-BBCF-051998EFEB7C}"/>
-    <dgm:cxn modelId="{B549CA95-87FD-C54F-B73B-8B3C79D9AC26}" type="presOf" srcId="{57E707D1-F904-3C4D-A97D-6344FC1412CE}" destId="{C7F9B645-B258-904C-9D96-0FA22C0437A5}" srcOrd="0" destOrd="0" presId="urn:microsoft.com/office/officeart/2005/8/layout/chevron1"/>
-    <dgm:cxn modelId="{C5C4388B-8DE2-B341-ADD5-C669514F6A19}" srcId="{C342DEE3-523F-F042-BEFB-F64A1DCBA45E}" destId="{5A14CE9C-E1CE-DE41-BDF2-3CBF4DA264D3}" srcOrd="2" destOrd="0" parTransId="{5796F029-A6DC-0640-BD44-36CFEC161F77}" sibTransId="{1F252E0E-FABC-5D46-AC00-04EE83115A0B}"/>
-    <dgm:cxn modelId="{AC1B6D78-1ACA-4545-AF88-5850E52918E4}" srcId="{C342DEE3-523F-F042-BEFB-F64A1DCBA45E}" destId="{863EAE21-0F44-0945-BE24-14E4AABC434B}" srcOrd="0" destOrd="0" parTransId="{EA52A9BA-4055-DF4C-B700-7421C53B81CD}" sibTransId="{31727A54-5C06-2D40-97C1-9233089A8746}"/>
     <dgm:cxn modelId="{8AEDE119-DE46-004E-A59F-36ACF39BB122}" srcId="{C342DEE3-523F-F042-BEFB-F64A1DCBA45E}" destId="{4DB998AD-7927-5B4C-AF89-5EC4A18A0E00}" srcOrd="1" destOrd="0" parTransId="{03434AE9-AC8A-D244-B7A2-368B3EC34B6A}" sibTransId="{24B0A873-889B-5B48-A0E7-28E5941CF1AF}"/>
     <dgm:cxn modelId="{D1E78733-E6DB-054F-AECE-C0799200DD21}" srcId="{C342DEE3-523F-F042-BEFB-F64A1DCBA45E}" destId="{CBC5D955-9480-C34A-9992-5AEB203E5BC9}" srcOrd="3" destOrd="0" parTransId="{02C25EEB-A6CF-7240-AAF8-7BE8B400F120}" sibTransId="{02FE6EA8-38A5-C644-9C11-BEC99916A05B}"/>
-    <dgm:cxn modelId="{F2BBE171-C299-F84A-AF45-099B9FB001DC}" srcId="{C342DEE3-523F-F042-BEFB-F64A1DCBA45E}" destId="{57E707D1-F904-3C4D-A97D-6344FC1412CE}" srcOrd="5" destOrd="0" parTransId="{35C4A167-B549-0641-BB3E-8676FD9856A0}" sibTransId="{C502865C-5A96-DE48-8F6A-474069216E46}"/>
+    <dgm:cxn modelId="{B549CA95-87FD-C54F-B73B-8B3C79D9AC26}" type="presOf" srcId="{57E707D1-F904-3C4D-A97D-6344FC1412CE}" destId="{C7F9B645-B258-904C-9D96-0FA22C0437A5}" srcOrd="0" destOrd="0" presId="urn:microsoft.com/office/officeart/2005/8/layout/chevron1"/>
+    <dgm:cxn modelId="{A501AB1F-C48B-CF4A-B99B-4AA5D3EFA962}" type="presOf" srcId="{4DB998AD-7927-5B4C-AF89-5EC4A18A0E00}" destId="{7A1517E1-0C42-0D4D-98F3-06E91C77CB05}" srcOrd="0" destOrd="0" presId="urn:microsoft.com/office/officeart/2005/8/layout/chevron1"/>
+    <dgm:cxn modelId="{84D2DF09-D179-1D41-8303-4FD5483057D5}" type="presOf" srcId="{C342DEE3-523F-F042-BEFB-F64A1DCBA45E}" destId="{8898722C-92A5-0841-BFAE-36271E307C60}" srcOrd="0" destOrd="0" presId="urn:microsoft.com/office/officeart/2005/8/layout/chevron1"/>
     <dgm:cxn modelId="{67BC749B-F74A-B74B-BAF8-66EA23CE86CB}" type="presOf" srcId="{5A14CE9C-E1CE-DE41-BDF2-3CBF4DA264D3}" destId="{FE2950AF-BECC-C943-BCDF-474567D4A57C}" srcOrd="0" destOrd="0" presId="urn:microsoft.com/office/officeart/2005/8/layout/chevron1"/>
     <dgm:cxn modelId="{C12A230D-499A-F24C-9D16-7C6595636BD9}" type="presOf" srcId="{CBC5D955-9480-C34A-9992-5AEB203E5BC9}" destId="{603CE2A6-86A6-1C4A-A190-ECE2FFE685A6}" srcOrd="0" destOrd="0" presId="urn:microsoft.com/office/officeart/2005/8/layout/chevron1"/>
-    <dgm:cxn modelId="{1E9F67E7-8E1A-D64E-A014-9D0E3F7459B9}" type="presOf" srcId="{863EAE21-0F44-0945-BE24-14E4AABC434B}" destId="{6E009E9B-8246-3F40-8AC3-5B38E276B2E5}" srcOrd="0" destOrd="0" presId="urn:microsoft.com/office/officeart/2005/8/layout/chevron1"/>
-    <dgm:cxn modelId="{84D2DF09-D179-1D41-8303-4FD5483057D5}" type="presOf" srcId="{C342DEE3-523F-F042-BEFB-F64A1DCBA45E}" destId="{8898722C-92A5-0841-BFAE-36271E307C60}" srcOrd="0" destOrd="0" presId="urn:microsoft.com/office/officeart/2005/8/layout/chevron1"/>
+    <dgm:cxn modelId="{C5C4388B-8DE2-B341-ADD5-C669514F6A19}" srcId="{C342DEE3-523F-F042-BEFB-F64A1DCBA45E}" destId="{5A14CE9C-E1CE-DE41-BDF2-3CBF4DA264D3}" srcOrd="2" destOrd="0" parTransId="{5796F029-A6DC-0640-BD44-36CFEC161F77}" sibTransId="{1F252E0E-FABC-5D46-AC00-04EE83115A0B}"/>
     <dgm:cxn modelId="{EF53FCA2-888B-8D48-8FBA-7FB9EC88D2DC}" type="presParOf" srcId="{8898722C-92A5-0841-BFAE-36271E307C60}" destId="{6E009E9B-8246-3F40-8AC3-5B38E276B2E5}" srcOrd="0" destOrd="0" presId="urn:microsoft.com/office/officeart/2005/8/layout/chevron1"/>
     <dgm:cxn modelId="{D8445EB8-A7A8-EF42-9571-2543A8236074}" type="presParOf" srcId="{8898722C-92A5-0841-BFAE-36271E307C60}" destId="{2BFA86B6-15A1-9F4F-B58C-6929C70F588F}" srcOrd="1" destOrd="0" presId="urn:microsoft.com/office/officeart/2005/8/layout/chevron1"/>
     <dgm:cxn modelId="{0B5D938C-5432-CB47-A347-68B089FBF3EF}" type="presParOf" srcId="{8898722C-92A5-0841-BFAE-36271E307C60}" destId="{7A1517E1-0C42-0D4D-98F3-06E91C77CB05}" srcOrd="2" destOrd="0" presId="urn:microsoft.com/office/officeart/2005/8/layout/chevron1"/>
@@ -41157,7 +41156,7 @@
           <a:p>
             <a:fld id="{CA401026-7639-C740-8F27-B502A4A06F60}" type="datetimeFigureOut">
               <a:rPr lang="en-US" smtClean="0"/>
-              <a:t>6/9/16</a:t>
+              <a:t>6/10/16</a:t>
             </a:fld>
             <a:endParaRPr lang="en-US"/>
           </a:p>
@@ -41583,7 +41582,7 @@
     </p:spTree>
     <p:extLst>
       <p:ext uri="{BB962C8B-B14F-4D97-AF65-F5344CB8AC3E}">
-        <p14:creationId xmlns:p14="http://schemas.microsoft.com/office/powerpoint/2010/main" val="406021203"/>
+        <p14:creationId xmlns:p14="http://schemas.microsoft.com/office/powerpoint/2010/main" val="369741780"/>
       </p:ext>
     </p:extLst>
   </p:cSld>
@@ -41594,90 +41593,6 @@
 </file>
 
 <file path=ppt/notesSlides/notesSlide3.xml><?xml version="1.0" encoding="utf-8"?>
-<p:notes xmlns:a="http://schemas.openxmlformats.org/drawingml/2006/main" xmlns:r="http://schemas.openxmlformats.org/officeDocument/2006/relationships" xmlns:p="http://schemas.openxmlformats.org/presentationml/2006/main">
-  <p:cSld>
-    <p:spTree>
-      <p:nvGrpSpPr>
-        <p:cNvPr id="1" name=""/>
-        <p:cNvGrpSpPr/>
-        <p:nvPr/>
-      </p:nvGrpSpPr>
-      <p:grpSpPr>
-        <a:xfrm>
-          <a:off x="0" y="0"/>
-          <a:ext cx="0" cy="0"/>
-          <a:chOff x="0" y="0"/>
-          <a:chExt cx="0" cy="0"/>
-        </a:xfrm>
-      </p:grpSpPr>
-      <p:sp>
-        <p:nvSpPr>
-          <p:cNvPr id="2" name="Slide Image Placeholder 1"/>
-          <p:cNvSpPr>
-            <a:spLocks noGrp="1" noRot="1" noChangeAspect="1"/>
-          </p:cNvSpPr>
-          <p:nvPr>
-            <p:ph type="sldImg"/>
-          </p:nvPr>
-        </p:nvSpPr>
-        <p:spPr/>
-      </p:sp>
-      <p:sp>
-        <p:nvSpPr>
-          <p:cNvPr id="3" name="Notes Placeholder 2"/>
-          <p:cNvSpPr>
-            <a:spLocks noGrp="1"/>
-          </p:cNvSpPr>
-          <p:nvPr>
-            <p:ph type="body" idx="1"/>
-          </p:nvPr>
-        </p:nvSpPr>
-        <p:spPr/>
-        <p:txBody>
-          <a:bodyPr/>
-          <a:lstStyle/>
-          <a:p>
-            <a:endParaRPr lang="en-US" dirty="0"/>
-          </a:p>
-        </p:txBody>
-      </p:sp>
-      <p:sp>
-        <p:nvSpPr>
-          <p:cNvPr id="4" name="Slide Number Placeholder 3"/>
-          <p:cNvSpPr>
-            <a:spLocks noGrp="1"/>
-          </p:cNvSpPr>
-          <p:nvPr>
-            <p:ph type="sldNum" sz="quarter" idx="10"/>
-          </p:nvPr>
-        </p:nvSpPr>
-        <p:spPr/>
-        <p:txBody>
-          <a:bodyPr/>
-          <a:lstStyle/>
-          <a:p>
-            <a:fld id="{2809900D-ACB1-E548-A354-1DF8B52F2E15}" type="slidenum">
-              <a:rPr lang="en-US" smtClean="0"/>
-              <a:t>11</a:t>
-            </a:fld>
-            <a:endParaRPr lang="en-US"/>
-          </a:p>
-        </p:txBody>
-      </p:sp>
-    </p:spTree>
-    <p:extLst>
-      <p:ext uri="{BB962C8B-B14F-4D97-AF65-F5344CB8AC3E}">
-        <p14:creationId xmlns:p14="http://schemas.microsoft.com/office/powerpoint/2010/main" val="369741780"/>
-      </p:ext>
-    </p:extLst>
-  </p:cSld>
-  <p:clrMapOvr>
-    <a:masterClrMapping/>
-  </p:clrMapOvr>
-</p:notes>
-</file>
-
-<file path=ppt/notesSlides/notesSlide4.xml><?xml version="1.0" encoding="utf-8"?>
 <p:notes xmlns:a="http://schemas.openxmlformats.org/drawingml/2006/main" xmlns:r="http://schemas.openxmlformats.org/officeDocument/2006/relationships" xmlns:p="http://schemas.openxmlformats.org/presentationml/2006/main">
   <p:cSld>
     <p:spTree>
@@ -41750,7 +41665,7 @@
           <a:p>
             <a:fld id="{81852EEE-C031-0240-809B-A214BD9EDE38}" type="slidenum">
               <a:rPr lang="en-US" smtClean="0"/>
-              <a:t>17</a:t>
+              <a:t>16</a:t>
             </a:fld>
             <a:endParaRPr lang="en-US"/>
           </a:p>
@@ -41769,7 +41684,7 @@
 </p:notes>
 </file>
 
-<file path=ppt/notesSlides/notesSlide5.xml><?xml version="1.0" encoding="utf-8"?>
+<file path=ppt/notesSlides/notesSlide4.xml><?xml version="1.0" encoding="utf-8"?>
 <p:notes xmlns:a="http://schemas.openxmlformats.org/drawingml/2006/main" xmlns:r="http://schemas.openxmlformats.org/officeDocument/2006/relationships" xmlns:p="http://schemas.openxmlformats.org/presentationml/2006/main">
   <p:cSld>
     <p:spTree>
@@ -41863,7 +41778,7 @@
           <a:p>
             <a:fld id="{81852EEE-C031-0240-809B-A214BD9EDE38}" type="slidenum">
               <a:rPr lang="en-US" smtClean="0"/>
-              <a:t>26</a:t>
+              <a:t>25</a:t>
             </a:fld>
             <a:endParaRPr lang="en-US"/>
           </a:p>
@@ -42013,7 +41928,7 @@
           <a:p>
             <a:fld id="{E7A71149-2CB9-4E49-866B-8310B95B75FD}" type="datetimeFigureOut">
               <a:rPr lang="en-US" smtClean="0"/>
-              <a:t>6/9/16</a:t>
+              <a:t>6/10/16</a:t>
             </a:fld>
             <a:endParaRPr lang="en-US"/>
           </a:p>
@@ -42183,7 +42098,7 @@
           <a:p>
             <a:fld id="{E7A71149-2CB9-4E49-866B-8310B95B75FD}" type="datetimeFigureOut">
               <a:rPr lang="en-US" smtClean="0"/>
-              <a:t>6/9/16</a:t>
+              <a:t>6/10/16</a:t>
             </a:fld>
             <a:endParaRPr lang="en-US"/>
           </a:p>
@@ -42363,7 +42278,7 @@
           <a:p>
             <a:fld id="{E7A71149-2CB9-4E49-866B-8310B95B75FD}" type="datetimeFigureOut">
               <a:rPr lang="en-US" smtClean="0"/>
-              <a:t>6/9/16</a:t>
+              <a:t>6/10/16</a:t>
             </a:fld>
             <a:endParaRPr lang="en-US"/>
           </a:p>
@@ -42533,7 +42448,7 @@
           <a:p>
             <a:fld id="{E7A71149-2CB9-4E49-866B-8310B95B75FD}" type="datetimeFigureOut">
               <a:rPr lang="en-US" smtClean="0"/>
-              <a:t>6/9/16</a:t>
+              <a:t>6/10/16</a:t>
             </a:fld>
             <a:endParaRPr lang="en-US"/>
           </a:p>
@@ -42779,7 +42694,7 @@
           <a:p>
             <a:fld id="{E7A71149-2CB9-4E49-866B-8310B95B75FD}" type="datetimeFigureOut">
               <a:rPr lang="en-US" smtClean="0"/>
-              <a:t>6/9/16</a:t>
+              <a:t>6/10/16</a:t>
             </a:fld>
             <a:endParaRPr lang="en-US"/>
           </a:p>
@@ -43011,7 +42926,7 @@
           <a:p>
             <a:fld id="{E7A71149-2CB9-4E49-866B-8310B95B75FD}" type="datetimeFigureOut">
               <a:rPr lang="en-US" smtClean="0"/>
-              <a:t>6/9/16</a:t>
+              <a:t>6/10/16</a:t>
             </a:fld>
             <a:endParaRPr lang="en-US"/>
           </a:p>
@@ -43378,7 +43293,7 @@
           <a:p>
             <a:fld id="{E7A71149-2CB9-4E49-866B-8310B95B75FD}" type="datetimeFigureOut">
               <a:rPr lang="en-US" smtClean="0"/>
-              <a:t>6/9/16</a:t>
+              <a:t>6/10/16</a:t>
             </a:fld>
             <a:endParaRPr lang="en-US"/>
           </a:p>
@@ -43496,7 +43411,7 @@
           <a:p>
             <a:fld id="{E7A71149-2CB9-4E49-866B-8310B95B75FD}" type="datetimeFigureOut">
               <a:rPr lang="en-US" smtClean="0"/>
-              <a:t>6/9/16</a:t>
+              <a:t>6/10/16</a:t>
             </a:fld>
             <a:endParaRPr lang="en-US"/>
           </a:p>
@@ -43591,7 +43506,7 @@
           <a:p>
             <a:fld id="{E7A71149-2CB9-4E49-866B-8310B95B75FD}" type="datetimeFigureOut">
               <a:rPr lang="en-US" smtClean="0"/>
-              <a:t>6/9/16</a:t>
+              <a:t>6/10/16</a:t>
             </a:fld>
             <a:endParaRPr lang="en-US"/>
           </a:p>
@@ -43868,7 +43783,7 @@
           <a:p>
             <a:fld id="{E7A71149-2CB9-4E49-866B-8310B95B75FD}" type="datetimeFigureOut">
               <a:rPr lang="en-US" smtClean="0"/>
-              <a:t>6/9/16</a:t>
+              <a:t>6/10/16</a:t>
             </a:fld>
             <a:endParaRPr lang="en-US"/>
           </a:p>
@@ -44121,7 +44036,7 @@
           <a:p>
             <a:fld id="{E7A71149-2CB9-4E49-866B-8310B95B75FD}" type="datetimeFigureOut">
               <a:rPr lang="en-US" smtClean="0"/>
-              <a:t>6/9/16</a:t>
+              <a:t>6/10/16</a:t>
             </a:fld>
             <a:endParaRPr lang="en-US"/>
           </a:p>
@@ -44339,7 +44254,7 @@
           <a:p>
             <a:fld id="{E7A71149-2CB9-4E49-866B-8310B95B75FD}" type="datetimeFigureOut">
               <a:rPr lang="en-US" smtClean="0"/>
-              <a:t>6/9/16</a:t>
+              <a:t>6/10/16</a:t>
             </a:fld>
             <a:endParaRPr lang="en-US"/>
           </a:p>
@@ -44839,230 +44754,17 @@
   <p:clrMapOvr>
     <a:masterClrMapping/>
   </p:clrMapOvr>
+  <p:timing>
+    <p:tnLst>
+      <p:par>
+        <p:cTn id="1" dur="indefinite" restart="never" nodeType="tmRoot"/>
+      </p:par>
+    </p:tnLst>
+  </p:timing>
 </p:sld>
 </file>
 
 <file path=ppt/slides/slide10.xml><?xml version="1.0" encoding="utf-8"?>
-<p:sld xmlns:a="http://schemas.openxmlformats.org/drawingml/2006/main" xmlns:r="http://schemas.openxmlformats.org/officeDocument/2006/relationships" xmlns:p="http://schemas.openxmlformats.org/presentationml/2006/main">
-  <p:cSld>
-    <p:spTree>
-      <p:nvGrpSpPr>
-        <p:cNvPr id="1" name=""/>
-        <p:cNvGrpSpPr/>
-        <p:nvPr/>
-      </p:nvGrpSpPr>
-      <p:grpSpPr>
-        <a:xfrm>
-          <a:off x="0" y="0"/>
-          <a:ext cx="0" cy="0"/>
-          <a:chOff x="0" y="0"/>
-          <a:chExt cx="0" cy="0"/>
-        </a:xfrm>
-      </p:grpSpPr>
-      <p:sp>
-        <p:nvSpPr>
-          <p:cNvPr id="2" name="Title 1"/>
-          <p:cNvSpPr>
-            <a:spLocks noGrp="1"/>
-          </p:cNvSpPr>
-          <p:nvPr>
-            <p:ph type="title"/>
-          </p:nvPr>
-        </p:nvSpPr>
-        <p:spPr/>
-        <p:txBody>
-          <a:bodyPr/>
-          <a:lstStyle/>
-          <a:p>
-            <a:r>
-              <a:rPr lang="en-US" dirty="0" smtClean="0"/>
-              <a:t>Data Exploration – Demographics K-Means</a:t>
-            </a:r>
-            <a:endParaRPr lang="en-US" dirty="0"/>
-          </a:p>
-        </p:txBody>
-      </p:sp>
-      <p:sp>
-        <p:nvSpPr>
-          <p:cNvPr id="5" name="Text Placeholder 4"/>
-          <p:cNvSpPr>
-            <a:spLocks noGrp="1"/>
-          </p:cNvSpPr>
-          <p:nvPr>
-            <p:ph type="body" idx="1"/>
-          </p:nvPr>
-        </p:nvSpPr>
-        <p:spPr/>
-        <p:txBody>
-          <a:bodyPr/>
-          <a:lstStyle/>
-          <a:p>
-            <a:r>
-              <a:rPr lang="en-US" dirty="0" smtClean="0"/>
-              <a:t>K-Means</a:t>
-            </a:r>
-            <a:endParaRPr lang="en-US" dirty="0"/>
-          </a:p>
-        </p:txBody>
-      </p:sp>
-      <p:sp>
-        <p:nvSpPr>
-          <p:cNvPr id="3" name="Content Placeholder 2"/>
-          <p:cNvSpPr>
-            <a:spLocks noGrp="1"/>
-          </p:cNvSpPr>
-          <p:nvPr>
-            <p:ph sz="half" idx="2"/>
-          </p:nvPr>
-        </p:nvSpPr>
-        <p:spPr/>
-        <p:txBody>
-          <a:bodyPr/>
-          <a:lstStyle/>
-          <a:p>
-            <a:r>
-              <a:rPr lang="en-US" dirty="0" smtClean="0"/>
-              <a:t>Can we identify groups of people who purchase yogurt?</a:t>
-            </a:r>
-          </a:p>
-          <a:p>
-            <a:pPr lvl="1"/>
-            <a:r>
-              <a:rPr lang="en-US" dirty="0" smtClean="0"/>
-              <a:t>Identified 12 clusters</a:t>
-            </a:r>
-          </a:p>
-          <a:p>
-            <a:pPr lvl="1"/>
-            <a:r>
-              <a:rPr lang="en-US" dirty="0" smtClean="0"/>
-              <a:t>Clusters were not stable</a:t>
-            </a:r>
-          </a:p>
-          <a:p>
-            <a:pPr lvl="1"/>
-            <a:endParaRPr lang="en-US" dirty="0" smtClean="0"/>
-          </a:p>
-        </p:txBody>
-      </p:sp>
-      <p:sp>
-        <p:nvSpPr>
-          <p:cNvPr id="12" name="Text Placeholder 11"/>
-          <p:cNvSpPr>
-            <a:spLocks noGrp="1"/>
-          </p:cNvSpPr>
-          <p:nvPr>
-            <p:ph type="body" sz="quarter" idx="3"/>
-          </p:nvPr>
-        </p:nvSpPr>
-        <p:spPr/>
-        <p:txBody>
-          <a:bodyPr/>
-          <a:lstStyle/>
-          <a:p>
-            <a:r>
-              <a:rPr lang="en-US" smtClean="0"/>
-              <a:t>Elbow Curve</a:t>
-            </a:r>
-            <a:endParaRPr lang="en-US"/>
-          </a:p>
-        </p:txBody>
-      </p:sp>
-      <p:pic>
-        <p:nvPicPr>
-          <p:cNvPr id="11" name="Content Placeholder 10"/>
-          <p:cNvPicPr>
-            <a:picLocks noGrp="1" noChangeAspect="1"/>
-          </p:cNvPicPr>
-          <p:nvPr>
-            <p:ph sz="quarter" idx="4"/>
-          </p:nvPr>
-        </p:nvPicPr>
-        <p:blipFill>
-          <a:blip r:embed="rId3">
-            <a:extLst>
-              <a:ext uri="{28A0092B-C50C-407E-A947-70E740481C1C}">
-                <a14:useLocalDpi xmlns:a14="http://schemas.microsoft.com/office/drawing/2010/main" val="0"/>
-              </a:ext>
-            </a:extLst>
-          </a:blip>
-          <a:stretch>
-            <a:fillRect/>
-          </a:stretch>
-        </p:blipFill>
-        <p:spPr bwMode="auto">
-          <a:xfrm>
-            <a:off x="6172200" y="2984071"/>
-            <a:ext cx="5183188" cy="2726595"/>
-          </a:xfrm>
-          <a:prstGeom prst="rect">
-            <a:avLst/>
-          </a:prstGeom>
-          <a:noFill/>
-          <a:extLst>
-            <a:ext uri="{909E8E84-426E-40DD-AFC4-6F175D3DCCD1}">
-              <a14:hiddenFill xmlns:a14="http://schemas.microsoft.com/office/drawing/2010/main">
-                <a:solidFill>
-                  <a:srgbClr val="FFFFFF"/>
-                </a:solidFill>
-              </a14:hiddenFill>
-            </a:ext>
-          </a:extLst>
-        </p:spPr>
-      </p:pic>
-      <p:sp>
-        <p:nvSpPr>
-          <p:cNvPr id="10" name="AutoShape 6" descr="data:image/png;base64,iVBORw0KGgoAAAANSUhEUgAABJMAAAJoCAYAAADS9qBkAAAABHNCSVQICAgIfAhkiAAAAAlwSFlzAAALEgAACxIB0t1+/AAAIABJREFUeJzs3XuUXHWV//33JgHC1QAKCiIRuRrQgIo/bySgEIJBYDICA+IgNy/cRhSH+DgiiqKAiKCMERVFdLwAIoIToigBRlEEooCDZkZhIka5yiUYhbCfP6oamtCd/p5Knz5V3e/XWrW6z6nTVbvTH9Ya95y9KzITSZIkSZIkqcQqTRcgSZIkSZKk3mEzSZIkSZIkScVsJkmSJEmSJKmYzSRJkiRJkiQVs5kkSZIkSZKkYjaTJEmSJEmSVMxmkiRJWqGI+OeIuLbf8RMRsfkI13BKRNwTEX8cyfftZRHx44g4tAvqeG1E/HfTdUiSpOFjM0mSJBERd0TEoxHxUEQ83P56dr9LcpDvR6K2TYHjgW0yc+Nhes2nNcQi4r0RcVdEbBsRU9vPX7zcz7ykff5Hw1FDL1i+kdiJzLwuM7cdrpokSVLzxjddgCRJ6goJvDEzf1xwbdRdzHI2A+7NzPuq/mBEjMvMZQM8lf2u+QBwJLBzZv5vRGwI3AO8KiLWy8wH2pf+M/Cb6uX3tGAlmocr+PeXJEk9zDuTJElSnypNojdGxP9GxN0RcdqTL9DygfadTn+KiC9HxDrt574cEe9uf79x+y6fd7aPXxQRz2gWRcTrgXnAxu27pb7UPv+miLg1Iu6PiB9FxDb9fub3EfG+iPgl8EhEDPR/70T72lOAQ4HXZeb/9nv+78ClwD+1r1sF2B/42nL1bRMR8yLivoj474h4c7/n9oyImyLiwYi4MyJO6vfcZu3f/63t5+6OiPf3e/4VEXFD+2cXR8QZg/0hImLviLi5fe3CiNh9gGtOioivDvD+q7SPD2n/PR9qf/2n9r/pv9Nqqj0cEfe3r10tIs5o1704Is6NiNXbz02NiEXtf//FwJf6zi3393lPRPwyIh6IiP+IiNX6Pf++iPhjRPwhIg5b/i4ySZLUPJtJkiSpE/sAO7Yfe/fbzfM24K3AVGBzYB3gM+3n5gPT2t9PBf4X2Ll9vDNwzfJvkplXATOAP2bmupl5aERsBXwdOBZ4DvCfwPciov8d1we0f25iZj4xyO/wCeDNtBpJdy7/1sAF7d8FYDpwC7C474KIWJNWo+tC4Nnt9/xsv8bWI8DBmfks4I3AOyLiTcu9z2uALYE3AB+MiK3b5z8NnNX+2RcB3xroF4iInYCvAO9pX7szcMcgv+/ydxhlv9/j08D0zFwXeDWwIDNvB94B/DQz18nM9ds/9wlgC+Al7a+bAB/s97rPBSYCL6B1x9dA7/1mYHfghcBLgUPatewB/Auwa/u1pw3ws5IkqWE2kyRJUp9L23f6PND+etgKrv14Zj6YmX8AzqJ9Bw9wIHBmZt6ZmY8Cs4F/at8BMx94bfu6nYHTaDVToNVcml9Y537A5Zn5o/YI1RnAGrSaIH0+nZl/zMy/reB1dgPmZuZdAz2ZmdcD67WbV2+l1Vzqbybw+8y8IFt+CVxCq1FCZl6Tmbe1v78V+Eb793zyLYAPZebfM/NXwC9pNVagdWfUFhGxQWY+mpk/H+R3OBT4Ymb+qP0+izPztyv4nQezDNg+IiZk5p8zc0ULs48A3t3++y8BPs5Tf/++1zopMx9bwb//p9vv8xfge8CU9vk3A+dn5u2ZuRT4UAe/iyRJqpnNJEmS1GfvzFw/M9drf/3iCq79Q7/v7wT6FmNv3D7u/9x4YKPM/B2wJCJ2AF4HXA78sd2sqdJMetp7ZGYCi2jdITNQfYM5AHhzRHxoBdd8FTia1h0y31nuuc2A/9duvN0fEQ/QaqZtBBARr2yP4N0dEX8B3k7rDqb+/tzv+0eBtdvfHwZsDdweET+LiDcOUt+mtO7w6li76bc/8E5gcUR8r98dUk8TEc8B1gRu7Pu9ad0ZtkG/y+7JzMeGeNvBfu+Naf0t+yxi5Hd0SZKkIdhMkiRJfar8j/ZN+32/GfDH9vd/bB/3f+4xnmoezAf+EVg1MxfTGm37Z1pjUQsK33v59+irp38DqWQ06re0xsveGRH/Osg1FwLvAq5o3ynT3yLg6nbjra8Jt25mHt1+/mu09i5tkpkTgTkU/htn5v9m5oGZ+Rxad3BdFBFrDHDpIlpjcENZQqsJ1Od5y73fDzJzd1ojar8BPt/31HKvcy+t5s/kfr/3xPaIHYP8TBWLgef3O37BSr6eJEmqgc0kSZLUiRMiYmJEbEprd9E32uf/A3h3REyKiLWBjwLf6Le36Bpad/r07Ue6un18XfsOoxLforUAfJeIGB8R7wWWAj+t+ktk5q9pjbu9NyKOG+D5O2iN5H1ggB+/HNgqIt7SrmPViHh5v7t61gYeyMzH2ruNDlzu5wdtLEXEQRHRdxfTg7QaKgPtfvoi8Lb2v0VEa7H5VgNctwDYOSI2jYhnASf2e68No7XQfE1ajb9H+r3Xn4HnR8Sq7X+PBM4DzmrfpUREbDLQ0u8Ofav9+2zTrmegf3dJktQwm0mSJKnP99qf5tX3uHiQ6xL4LnAjcBOtnTdfaj/3JVqjYdfQGr96lFazqc98Wk2WvpG262jtOyodcaO9E+gttBZ730NrufVemfl4v/qGfJl+r/crYA9aC7CPfMaFmT/JzD8NcP4RWkukD6B1t9Qfae0PWr19ybuAj0TEg7SaIt8crIYBjvcAbouIh4BPAfsPtH8oM2+gtfT8LFpNp6t56q6t/r/jD9vv/yvgBlp/sz6rAMcDd9G682hnWiNvAD8CbgP+FBF3t8+dCPwPcH17fG8eMFADazCD/n0ycy5wNvBjWneO9TUIV7T7SpIkjbAo/38CSpIkSSOn/cl4twCrr+BT+SRJ0gjzziRJkiR1jYjYJyJWi4j1gE8Al9lIkiSpu9hMkiRJUjd5O3A3sJDWDqd3NVuOJElanmNukiRJkiRJKuadSZIkSZIkSSo2vukCSkWEt1BJkiRJkiQNs8yMKtf3TDMJwJE8lTrkkEP48pe/3HQZ6gFmRVWYF5UyK6rCvKiUWVEV5kWlIir1kQDH3CRJkiRJklSBzSSNSpMmTWq6BPUIs6IqzItKmRVVYV5UyqyoCvOiOtlM0qg0bdq0pktQjzArqsK8qJRZURXmRaXMiqowL6qTzSRJkiRJkiQVs5kkSZIkSZKkYtErn5AWEdkrtUqSJEmSJPWCiCAzK32km3cmSZIkSZIkqZjNJI1KV199ddMlqEeYFVVhXlTKrKgK86JSZkVVmBfVyWaSJEmSJEmSirkzSZIkSZIkaYxyZ5IkSZIkSZJqZTNJo5LzwSplVlSFeVEps6IqzItKmRVVYV5UJ5tJkiRJkiRJKubOJEmSJEmSpDHKnUmSJEmSJEmqlc0kjUrOB6uUWVEV5kWlzIqqMC8qZVZUhXlRnWwmSZIkSZIkqZg7kyRJkiRJksYodyZJkiRJkiSpVjaTNCo5H6xSZkVVmBeVMiuqwryolFlRFeZFdbKZJEmSJEmSpGLuTJIkSZIkSRqj3JkkSZIkSZKkWtlM0qjkfLBKmRVVYV5UyqyoCvOiUmZFVZgX1clmkiRJkiRJkoq5M0mSJEmSJGmMcmeSJEmSJEmSamUzSaOS88EqZVZUhXlRKbOiKsyLSpkVVWFeVCebSZIkSZIkSSrmzqQBZCazZ5/OqaeeQESlsUFJkiRJkqSe4c6kYXLxxVdy7rmLueSSeU2XIkmSJEmS1FVsJvUzZ86FTJ48k3/5l2t5+OEzmT37GiZPnsmcORc2XZoqcj5YpcyKqjAvKmVWVIV5USmzoirMi+o0vukCusmRRx7E+utvwNFHXwMES5c+wcc+djSzZk1vujRJkiRJkqSu4M6k5Vx00VwOPfRKHnkkWHvtJzj//Bk2kyRJkiRJ0qjUyc4k70xazsKFizj//D0466zdmTZtHgsXLmq6JEmSJEmSpK7hzqTlzJ59BLNmTWeXXYJly6Zz4omHN12SOuB8sEqZFVVhXlTKrKgK86JSZkVVmBfVyWbSIKZNA//bkyRJkiRJejp3Jg3i0Udhww3hT3+CtdcesbeVJEmSJEkaMZ3sTPLOpEGsuSbssAP85CdNVyJJkiRJktQ9bCatgKNuvcv5YJUyK6rCvKiUWVEV5kWlzIqqMC+qk82kFbCZJEmSJEmS9HTuTFqBRx+F5zwH7r4b1lprRN9akiRJkiSpdu5MGmZrrgk77ujeJEmSJEmSpD42k4bgqFtvcj5YpcyKqjAvKmVWVIV5USmzoirMi+pkM2kINpMkSZIkSZKe4s6kIbg3SZIkSZIkjVbuTKrBmmvCDju4N0mSJEmSJAlsJhVx1K33OB+sUmZFVZgXlTIrqsK8qJRZURXmRXWymVTAZpIkSZIkSVKLO5MKLFkCG20Ef/6ze5MkSZIkSdLo4c6kmqy1FkyZAj/9adOVSJIkSZIkNctmUiFH3XqL88EqZVZUhXlRKbOiKsyLSpkVVWFeVCebSYWmTrWZJEmSJEmS5M6kQkuWwIYbwt13uzdJkiRJkiSNDu5MqpF7kyRJkiRJkmpuJkXE8yPiRxFxW0TcEhHHDnLdtIi4OSJujYgf11nTypg2DebPb7oKlXA+WKXMiqowLyplVlSFeVEps6IqzIvqVPedSY8Dx2fmZOBVwFERsU3/CyLiWcBngZmZuR3w5ppr6phLuCVJkiRJ0lg3ojuTIuJS4JzMvKrfuXcCz8vMDw7xs43uTILW3qSNNmrtTVpzzUZLkSRJkiRJWmldvTMpIiYBU4CfLffUVsD6EfHjiLghIg4eqZqqWmsteOlL3ZskSZIkSZLGrhFpJkXE2sBFwHGZ+chyT48HdgRmAHsA/xYRW4xEXZ2YOtVRt17gfLBKmRVVYV5UyqyoCvOiUmZFVZgX1Wl83W8QEeNpNZK+mpnfHeCSPwD3ZuZSYGlEXAO8FPif5S885JBDmDRpEgATJ05kypQpTJs2DXjqP5SROP7IR0b2/TyufrxgwYKuqsdjjz322OOxddynW+rxuLuP+3RLPR537/GCBQu6qh6Pu/vYvHg82PFZZ53FggULnuyvdKL2nUkRcQGtZtHxgzy/DXAOrbuSVqc1Brd/Zv56uesa35kE8Mgjrb1J99zj3iRJkiRJktTbOtmZVOudSRHxGuAg4JaIuBlI4P3AZkBm5ucz8/aIuBL4FbAM+PzyjaRusvbarb1J118Pu+7adDWSJEmSJEkja5U6Xzwz/yszx2XmlMzcITN3zMy5mTknMz/f77ozMnNyZr4kM8+ps6bhMG0aLHdXsrrM1f6BVMisqArzolJmRVWYF5UyK6rCvKhOtTaTRiubSZIkSZIkaayqfWfScOmWnUnQ2pv03OfC3Xe7N0mSJEmSJPWuTnYmeWdSB9ZeG7bfvrU3SZIkSZIkaSyxmdQhR926m/PBKmVWVIV5USmzoirMi0qZFVVhXlQnm0kdspkkSZIkSZLGIncmdahvb9I998AaazRdjSRJkiRJUnXuTBpB7k2SJEmSJEljkc2kleCoW/dyPlilzIqqMC8qZVZUhXlRKbOiKsyL6mQzaSXYTJIkSZIkSWONO5NWwsMPw/Oe594kSZIkSZLUm9yZNMLWWQe22869SZIkSZIkaeywmbSSpk2D+fObrkLLcz5YpcyKqjAvKmVWVIV5USmzoirMi+pkM2kluTdJkiRJkiSNJe5MWkl9e5PuvRcmTGi6GkmSJEmSpHLuTGqAe5MkSZIkSdJYYjNpGDjq1n2cD1Yps6IqzItKmRVVYV5UyqyoCvOiOtlMGgZTp9pMkiRJkiRJY4M7k4bBQw/Bxhu7N0mSJEmSJPUWdyY1ZN11YfJk+NnPmq5EkiRJkiSpXjaThol7k7qL88EqZVZUhXlRKbOiKsyLSpkVVWFeVCebScPEZpIkSZIkSRoL3Jk0TNybJEmSJEmSeo07kxrk3iRJkiRJkjQW2EwaRlOnOurWLZwPVimzoirMi0qZFVVhXlTKrKgK86I62UwaRu5NkiRJkiRJo507k4aRe5MkSZIkSVIvcWdSw9ZdF178Yvj5z5uuRJIkSZIkqR42k4aZo27dwflglTIrqsK8qJRZURXmRaXMiqowL6qTzaRhZjNJkiRJkiSNZu5MGmbuTZIkSZIkSb3CnUldYN11Ydtt3ZskSZIkSZJGJ5tJNZg2DebPb7qKsc35YJUyK6rCvKiUWVEV5kWlzIqqMC+qk82kGrg3SZIkSZIkjVbuTKrBgw/C85/f2pu0+upNVyNJkiRJkjQwdyZ1iWc9C7bZxr1JkiRJkiRp9LGZVBNH3ZrlfLBKmRVVYV5UyqyoCvOiUmZFVZgX1clmUk1sJkmSJEmSpNHInUk1efBB2GQTuO8+9yZJkiRJkqTu5M6kLtK3N+mGG5quRJIkSZIkafjYTKqRo27NcT5YpcyKqjAvKmVWVIV5USmzoirMi+pkM6lGNpMkSZIkSdJo486kGv3lL7DppnDvve5NkiRJkiRJ3cedSV1m4kTYemv3JkmSJEmSpNHDZlLNHHVrhvPBKmVWVIV5USmzoirMi0qZFVVhXlQnm0k1mzrVZpIkSZIkSRo93JlUs769SffdB6ut1nQ1kiRJkiRJT3FnUheaOBG22sq9SZIkSZIkaXSwmTQC3Js08pwPVimzoirMi0qZFVVhXlTKrKgK86I62UwaATaTJEmSJEnSaOHOpBHg3iRJkiRJktSN3JnUpdybJEmSJEmSRgubSSNk6lRH3UaS88EqZVZUhXlRKbOiKsyLSpkVVWFeVCebSSNk2jSYP7/pKiRJkiRJklaOO5NGyAMPwAte4N4kSZIkSZLUPdyZ1MXWWw+23BJ+8YumK5EkSZIkSeqczaQRNG2ae5NGivPBKmVWVIV5USmzoirMi0qZFVVhXlQnm0kjyGaSJEmSJEnqde5MGkF9e5Puvx9WXbXpaiRJkiRJ0ljnzqQut956sMUW7k2SJEmSJEm9y2bSCHPUbWQ4H6xSZkVVmBeVMiuqwryolFlRFeZFdbKZNMJsJkmSJEmSpF7mzqQRdv/9MGkS3Hefe5MkSZIkSVKz3JnUA9ZfH170IvcmSZIkSZKk3mQzqQGOutXP+WCVMiuqwryolFlRFeZFpcyKqjAvqpPNpAbYTJIkSZIkSb3KnUkNcG+SJEmSJEnqBu5M6hHrrw+bbw433th0JZIkSZIkSdXYTGqIo271cj5YpcyKqjAvKmVWVIV5USmzoirMi+pkM6khNpMkSZIkSVIvcmdSQ9ybJEmSJEmSmubOpB7i3iRJkiRJktSLbCY1yFG3+jgfrFJmRVWYF5UyK6rCvKiUWVEV5kV1spnUoKlTYf78pquQJEmSJEkq586kBt13H7zwhe5NkiRJkiRJzXBnUo/ZYINWM+mmm5quRJIkSZIkqYzNpIa5N6kezgerlFlRFeZFpcyKqjAvKmVWVIV5UZ1sJjXMZpIkSZIkSeol7kxqWGtvUvKOd5zOJz5xAhGVxhQlSZIkSZI65s6kHrTBBrDeeldy7rmLueSSeU2XI0mSJEmStEI2kxo0Z86FTJ48k4ceupYlS85k9uxrmDx5JnPmXNh0aT3P+WCVMiuqwryolFlRFeZFpcyKqjAvqtP4pgsYy4488iDWX38DjjnmGiBYuvQJPvaxo5k1a3rTpUmSJEmSJA3InUkNu+iiuRx66JU89lgQ8QRf/eoMm0mSJEmSJGlEdLIzyTuTGrZw4SLOP38PHn10d04/fR4LFy5quiRJkiRJkqRBuTOpYbNnH8GsWdPZb7/g7runs/fehzdd0qjgfLBKmRVVYV5UyqyoCvOiUmZFVZgX1clmUpdYfXU44gj47GebrkSSJEmSJGlw7kzqInfdBdtvD3fcAeuu23Q1kiRJkiRptOtkZ5J3JnWRTTaB3XaDL3+56UokSZIkSZIGZjOpyxx9dGvU7Yknmq6ktzkfrFJmRVWYF5UyK6rCvKiUWVEV5kV1spnUZV77WlhjDfjBD5quRJIkSZIk6ZncmdSFvvhF+M534PLLm65EkiRJkiSNZp3sTLKZ1IX++ld4wQvg+uvhRS9quhpJkiRJkjRauYB7lFhjDXjb2+Dcc5uupHc5H6xSZkVVmBeVMiuqwryolFlRFeZFdbKZ1KXe9S74yldgyZKmK5EkSZIkSXqKY25dbJ99YMYMePvbm65EkiRJkiSNRo65jTLHHAOf+QyMsR6aJEmSJEnqYjaTutiuu8KyZTB/ftOV9B7ng1XKrKgK86JSZkVVmBeVMiuqwryoTjaTulgEHH00nHNO05VIkiRJkiS1uDOpyz3yCLzgBbBgQeurJEmSJEnScHFn0ii09tpw8MHwuc81XYkkSZIkSZLNpJ5w1FHwhS/A0qVNV9I7nA9WKbOiKsyLSpkVVWFeVMqsqArzojrZTOoBW20FL3sZfOMbTVciSZIkSZLGOncm9Yjvfx/+7d/gF79oLeaWJEmSJElaWe5MGsX22AMefBCuv77pSiRJkiRJ0lhmM6lHrLJKa3fSOec0XUlvcD5YpcyKqjAvKmVWVIV5USmzoirMi+pkM6mHvO1t8J//CYsXN12JJEmSJEkaq9yZ1GPe+U7YaCP40IearkSSJEmSJPW6TnYm2UzqMbfeCrvtBnfeCaut1nQ1kiRJkiSpl7mAewzYbjvYdlu4+OKmK+luzgerlFlRFeZFpcyKqjAvKmVWVIV5UZ1sJvWgY45xEbckSZIkSWqGY2496PHH4UUvgksugZe9rOlqJEmSJElSr3LMbYwYP761iPszn2m6EkmSJEmSNNbYTOpRhx8Ol14K99zTdCXdyflglTIrqsK8qJRZURXmRaXMiqowL6qTzaQe9exnw777whe+0HQlkiRJkiRpLHFnUg+76SbYZx/43e9ao2+SJEmSJElVuDNpjNlxR9h0U7jssqYrkSRJkiRJY0WtzaSIeH5E/CgibouIWyLi2BVc+4qIeCwi/qHOmkabY46Bc85puoru43ywSpkVVWFeVMqsqArzolJmRVWYF9Wp7juTHgeOz8zJwKuAoyJim+UviohVgI8DV9Zcz6gzaxb89rdwyy1NVyJJkiRJksaCEd2ZFBGXAudk5lXLnT8O+DvwCuDyzLxkgJ91Z9IgPvxh+OMf4XOfa7oSSZIkSZLUS2rZmRQRa7XvHCIitoqIN0XEqh0UNwmYAvxsufMbA/tk5r8DlYpXy5FHwje/CQ880HQlkiRJkiRptCsZc7sGmBARmwDzgIOBL1d5k4hYG7gIOC4zH1nu6bOAf+1/eZXXFjz3ubDnnnD++U1X0j2cD1Yps6IqzItKmRVVYV5UyqyoCvOiOpV8oHxk5qMRcRhwbmaeFhELSt8gIsbTaiR9NTO/O8AlLwe+EREBPBuYERGPZeYzPqPskEMOYdKkSQBMnDiRKVOmMG3aNOCp/1DG6vFrXnM1p5wCxx03jXHjmq+n6eMFCxZ0VT0ee+yxxx6PreM+3VKPx9193Kdb6vG4e48XLFjQVfV43N3H5sXjwY7POussFixY8GR/pRND7kyKiJuBdwGfAg7LzNsi4pbM3L7oDSIuAO7NzOMLrj0f+J47k6rLhJ12gg99CN74xqarkSRJkiRJvaCWnUnAvwCzge+0G0mbAz8uLOg1wEHArhFxc0TcFBF7RMTbI+LIAX7EblGHIuDoo+Gcc5quRJIkSZIkjWZDNpMyc35mvgk4p338u8w8tuTFM/O/MnNcZk7JzB0yc8fMnJuZczLz8wNcf+hAdyWpzP77w803w29+03Qlzeu7jU8aillRFeZFpcyKqjAvKmVWVIV5UZ2GbCZFxKsi4tfA7e3jl0bEubVXpsomTIDDD4fPfrbpSiRJkiRJ0mhVsjPpZ8A/Apdl5g7tc7dm5nYjUF//OtyZVGDRInjpS+HOO2GddZquRpIkSZIkdbO6diaRmYuWO7Wsypto5Gy6Key6K1xwQdOVSJIkSZKk0aikmbQoIl4NZESsGhHvBf675rq0Eo45Bj7zmdYnvI1VzgerlFlRFeZFpcyKqjAvKmVWVIV5UZ1KmknvAI4CNgHuAqa0j9Wldt4ZVl0VfvjDpiuRJEmSJEmjzQp3JkXEOODYzPzUyJU0aC3uTKrg85+HK66A73636UokSZIkSVK36mRnUskC7hsy8xUrVdkwsJlUzZIlsNlmcMMN8MIXNl2NJEmSJEnqRnUt4L4uIj4TEa+LiB37Hh3WqBGy1lpwyCFw7rlNV9IM54NVyqyoCvOiUmZFVZgXlTIrqsK8qE7jC66Z0v764X7nEth1+MvRcHrXu2CnneDkk2HNNZuuRpIkSZIkjQZDjrl1C8fcOrPXXrD33nD44U1XIkmSJEmSuk0tO5PaL/xGYDIwoe9cZn548J8YfjaTOjNvHpxwAixYAFEpGpIkSZIkabSrZWdSRHwO2B84BgjgzcBmHVWoEfeGN8Df/gbXXtt0JSPL+WCVMiuqwryolFlRFeZFpcyKqjAvqlPJAu5XZ+ZbgQcy82TgVcBW9Zal4bLKKnD00fCZzzRdiSRJkiRJGg2GHHOLiJ9l5isj4nrgH4D7gNsyc4uRKLBfHY65deihh2DSJPjVr+D5z2+6GkmSJEmS1C1qGXMDLo+IicDpwE3AHcB/VC9PTVl3XTjoIPjc55quRJIkSZIk9bohm0mZ+ZHM/EtmXkxrV9I2mflv9Zem4XT00XDeebB0adOVjAzng1XKrKgK86JSZkVVmBeVMiuqwryoTuOHuiAi3jrAOTLzgnpKUh223hqmTIFvfxsOPrjpaiRJkiRJUq8q2Zl0Tr/DCcDrgZsy8x/rLGyAOtyZtJK+9z34yEfg5z9vuhJJkiRJktQNOtmZNGQzaYA3mQh8IzP3qPSDK8lm0spbtgy23BK+/vXk0ktP59RTTyCiUl4kSZIkSdIoUtcC7uUtAV7Ywc+pYePGwVFHwfvedyXnnruYSy6Z13RJtXE+WKXMiqowLyplVlSFeVEps6IqzIvqNGQzKSK+FxGXtR+XA78BvlN/aRpuc+ZcyHnnzeS6667l4YfPZPaKCI/YAAAgAElEQVTsa5g8eSZz5lzYdGmSJEmSJKlHlOxMmtrv8HHgzsz8Q61VDVyHY24rKTO56KK5vO1t17BkyalsuulszjxzKrNmTXfcTZIkSZKkMaiTMbchP80tM+d3XpK6SUS0H0tZZZXjeeCBJ548J0mSJEmSVKJkzO3hiHhogMfDEfHQSBSp4bNw4SK+/OU9OPHET/Lyl89g4cJFTZdUC+eDVcqsqArzolJmRVWYF5UyK6rCvKhOQ96ZBJwFLAa+CgRwEPC8zPxgnYWpHrNnHwHAbrvBVltN56yzGi5IkiRJkiT1lJKdSb/MzJcOda5u7kwafp/9LFx2GVx5ZdOVSJIkSZKkJnSyM2nIMTdgSUQcFBHjImKViDgIWNJZieomRx4Jv/89zJvXdCWSJEmSJKlXlDSTDgT2A/7cfry5fU49btVV4eMfh/e9D5Yta7qa4eV8sEqZFVVhXlTKrKgK86JSZkVVmBfVachmUmbekZl7Z+azM/M5mblPZt4xArVpBOy7L6y1Flx4YdOVSJIkSZKkXlCyM+k04BTgr8Bc4CXAuzNzRNsP7kyqz09+AvvvD7/9LayxRtPVSJIkSZKkkVLXzqTdM/MhYCZwB7AFcEL18tStXv1q2Gkn+PSnm65EkiRJkiR1u5Jm0vj21zcC387MB2usRw059VQ44wy4556mKxkezgerlFlRFeZFpcyKqjAvKmVWVIV5UZ1KmkmXR8TtwMuAqyLiOcDSesvSSNtqKzjgADjllKYrkSRJkiRJ3WzInUkAEbE+8GBmLouItYB1MvNPtVf39BrcmVSzu++GF78Yrr8ettii6WokSZIkSVLdOtmZVNRM6gY2k0bGRz8Kv/wlfOtbTVciSZIkSZLqVtcCbo0h7343/PSnrbuTepnzwSplVlSFeVEps6IqzItKmRVVYV5Up0GbSRHxmvbX1UeuHDVtzTXhwx+GE04AbwSTJEmSJEnLG3TMLSJuzMyXRcRNmbnjCNc1UD2OuY2QZctghx1aTaV99mm6GkmSJEmSVJdh3ZkUEdcDvwL2Br65/POZeWwnRXbKZtLImjsXjjsObr0VVl216WokSZIkSVIdhntn0kzgR8BS4MYBHhrFpk+HTTeFL3yh6Uo643ywSpkVVWFeVMqsqArzolJmRVWYF9Vp/GBPZOa9wDci4r8z85cjWJO6QAScfjrsuSe85S2wzjpNVyRJkiRJkrrBoGNuT14Q8XzgHOA17VPXAsdl5h9qrm35Ohxza8DBB8MLX9janyRJkiRJkkaXYd2Z1O9FfwB8Hfhq+9RbgIMyc7eOquyQzaRm3Hkn7Lgj3HILbLxx09VIkiRJkqThNNw7k/psmJnnZ+bj7ceXged0VKF6zmabwWGHwUknNV1JNc4Hq5RZURXmRaXMiqowLyplVlSFeVGdSppJ90bEWyJiXPvxFuC+ugtT93j/++G734Xbbmu6EkmSJEmS1LSSMbfNaO1MehWQwE+AYzPz/+ov72l1OObWoE99Cq66Ci6/vOlKJEmSJEnScKllZ1K3sJnUrL/9DbbdFr74Rdhll6arkSRJkiRJw6GunUkSq68OH/sYnHACPPFE09UMzflglTIrqsK8qJRZURXmRaXMiqowL6qTzSQV228/WGUV+OY3m65EkiRJkiQ1xTE3VTJ/PhxyCNx+e+tuJUmSJEmS1Ltq2ZkUEROBtwKTgPF95zPz2A5q7JjNpO7xpjfBtGlw/PFNVyJJkiRJklZGXTuTvk+rkXQLcGO/h8aoT3wCPv5xeOCBpisZnPPBKmVWVIV5USmzoirMi0qZFVVhXlSn8UNfwoTM9B4UPWnbbWHffeGjH4Uzzmi6GkmSJEmSNJJKxtzeDTwCXA78re98Zt5fb2nPqMMxty7ypz/B5Mlw440waVLT1UiSJEmSpE7UtTPpKOCjwF+AvoszMzfvqMoO2UzqPh/6ECxcCF/7WtOVSJIkSZKkTtS1M+k9wBaZOSkzX9h+jGgjSd3pve+FH/+4dXdSt3E+WKXMiqowLyplVlSFeVEps6IqzIvqVNJM+h/g0boLUe9Ze2046SQ44QTwpjFJkiRJksaGkjG37wCTgR/z9J1Jx9Zb2jPqcMytCz3+OGy/PXzyk7Dnnk1XI0mSJEmSqqhrZ9I/D3Q+M79S5Y1Wls2k7nXZZfD+98OCBTC+5PMBJUmSJElSV6hlZ1JmfmWgR+dlarTZay/YYAP4ShelwvlglTIrqsK8qJRZURXmRaXMiqowL6rTkPeRRMTveepT3J7kEm71iYDTT4d994UDDoC11mq6IkmSJEmSVJeSMbcN+h1OAN4MrJ+ZH6yzsAHqcMytyx1wAGy3HXzgA01XIkmSJEmSStSyM2mQN7oxM19W+QdXgs2k7ve738FOO8Ftt8FGGzVdjSRJkiRJGkotO5MiYsd+j5dHxDsoGI/T2LP55nDwwfDhDzddifPBKmdWVIV5USmzoirMi0qZFVVhXlSnkqbQJ/t9/zhwB7BfLdWo533gA7DNNnDssbD11k1XI0mSJEmShltHY25NcMytd5x2Glx/PVxySdOVSJIkSZKkFalrzO24iFg3Wr4QETdFxO6dl6nR7thj4cYb4brrmq5EkiRJkiQNtyGbScChmfkQsDuwAXAw8PFaq1JPmzABTjkFTjgBmrqZzPlglTIrqsK8qJRZURXmRaXMiqowL6pTSTOp71anPYELMvO2fuekAR10ECxdChdf3HQlkiRJkiRpOA25Mykizgc2AV4IvBQYB1ydmS+rv7yn1eHOpB7zwx/CO98Jt96anHTS6Zx66glE2IeUJEmSJKlbdLIzqaSZtAowBfhdZv4lIjYANsnMX3VeanU2k3rTjBnwvOfN5aKLruT88/dg1qzpTZckSZIkSZLaalnAnZlPZOZNmfmX9vF9I91IUm+aM+dCfvvbmXzlK9fy8MNnMnv2NUyePJM5cy6s/b2dD1Yps6IqzItKmRVVYV5UyqyoCvOiOo1vugCNXkceeRDrr78Bhx56DY88Evz1r0/wsY8d7d1JkiRJkiT1sCHH3LqFY2696aKL5nLooVcSESxZ8gRf+9oM9t/fZpIkSZIkSd1g2MfcImJcRNy+cmVpLFu4cBHnn78H99zzSaZMmcFHP7qIxx9vuipJkiRJktSpFTaTMnMZ8JuIeMEI1aNRZvbsI5g1azqrrRZcd910nvvcwznsMHjiiXrf1/lglTIrqsK8qJRZURXmRaXMiqowL6rTkAu4gfWA2yLiqoi4rO9Rd2EafSZMgEsvhd//Ho46CpxalCRJkiSp9wy5Mykipg50PjPn11LR4HW4M2mUeOgh2G03eO1r4YwzICpNZkqSJEmSpOHSyc6kogXcEbEZsGVm/jAi1gTGZebDHdbZEZtJo8v998Ouu8Kb3gQf/nDT1UiSJEmSNDYN+wLu9oseAVwEzGmf2gS4tHp50lPWXx/mzYNvfxs+/vHhf33ng1XKrKgK86JSZkVVmBeVMiuqwryoTuMLrjkK2An4GUBmLoyIDWutSmPChhvCD38IO+8Ma64Jxx7bdEWSJEmSJGkoJTuTfpaZr4yImzNzh4gYD9yUmS8ZmRKfrMMxt1Hqjjtg6lT44AfhsMOarkaSJEmSpLGjkzG3kjuT5kfE+4E1ImI34F3A9zopUBrIpEmtO5SmTYM11oADD2y6IkmSJEmSNJghdyYBJwL3ALcAbwe+n5n/X61VaczZcsvWDqXjj4fvfGflX8/5YJUyK6rCvKiUWVEV5kWlzIqqMC+qU8mdScdk5qeB8/pORMRx7XPSsJk8Gb7/fdhjD5gwAWbMaLoiSZIkSZK0vJKdSTdl5o7Lnbs5M3eotbJn1uHOpDHipz+FvfeGb32rNfomSZIkSZLq0cnOpEGbSRHxT8CBwGuBa/s9tS6wLDNf32mhnbCZNLZcfTXstx9897vwqlc1XY0kSZIkSaNTJ82kFe1M+gnwSeD29te+x/HA9E6LlEpMmwYXXNC6Q+mmm6r/vPPBKmVWVIV5USmzoirMi0qZFVVhXlSnQZtJmXlnZl4NvAG4NjPnA4uB5wOVOlZSJ/bYA+bMgT33hFtvbboaSZIkSZIEZTuTbgReB6wH/BdwA/D3zDyo/vKeVodjbmPU178OJ5zQGn3bcsumq5EkSZIkafToZMyt5NPcIjMfjYjDgHMz87SIWNBZiVJ1Bx4If/0rvOENMH8+TJrUdEWSJEmSJI1dK9qZ1Cci4lXAQcAV7XPj6itJeqbDDoP3vhde/3q4666hr3c+WKXMiqowLyplVlSFeVEps6IqzIvqVHJn0r8As4HvZOZtEbE58ON6y5Ke6Zhj4NFHn7pDacMNm65IkiRJkqSxZ8idSd3CnUnq88EPwmWXwY9+BOuv33Q1kiRJkiT1rk52JpUs4P4x8IyLMnPXauWtHJtJ6pPZGnm77jr4wQ9g3XWbrkiSJEmSpN7USTOpZGfSe4ET2o9/AxYAv6henjQ8IuCMM2DHHWHmTFiy5JnXOB+sUmZFVZgXlTIrqsK8qJRZURXmRXUaspmUmTf2e/xXZh4PTKu/NGlwEfDZz8Lmm8O++8LSpU1XJEmSJEnS2FAy5tZ/K80qwMuAszNz6zoLG6AOx9z0DI8/Dgce2GomXXwxrLpq0xVJkiRJktQ76hpzu5HWWNuNwE+B9wCHVS9PGn7jx8OFF7b2KL3lLbBsGWQmJ554GjYfJUmSJEkafiVjbi/MzM3bX7fMzN0z87qRKE4qsdpq8O1vw/33w2GHwUUXXcnZZ/+cSy6Z13Rp6gHOkqsK86JSZkVVmBeVMiuqwryoToM2kyLiH1b0GMkipaFMmAB77XUh3/rWTI444lr++tejmD37GiZPnsmcORc2XZ4kSZIkSaPGoDuTIuL8FfxcZuah9ZQ0MHcmaSiZyQUXzOXII6/h738/lU03nc2ZZ05l1qzpRFQa/5QkSZIkaUzoZGfS+MGeyMy3rXxJ0siJCNZaK1h99aWMH388ixc/wbJlYSNJkiRJkqRhNOTOpIj4WERM7He8XkScUm9ZUmcWLlzE+efvwcUX78X228/g5JMXsXRp01WpmzlLrirMi0qZFVVhXlTKrKgK86I6lXya24zM/EvfQWY+AOxZX0lS52bPPoJZs6YzYUJw/fXT2W67w5k5Ex55pOnKJEmSJEkaHQbdmfTkBRG/Al6RmX9rH68B/CIzJ49Aff3rcGeSKlu2DN7+dvj1r+GKK2C99ZquSJIkSZKk7tHJzqSSO5O+BlwVEYdFxGHAD4CvdFKgNNLGjYPzzoNXvhJ22QXuvrvpiiRJkiRJ6m1DNpMy8xPAKcC27cdHMvO0uguTVkb/+eAIOPNM2GcfeN3rYNGi5upS93GWXFWYF5UyK6rCvKiUWVEV5kV1GvTT3PrLzLnA3IiYmZlX1lyTNOwi4EMfgnXXbTWUfvAD2HLLpquSJEmSJKn3DLkz6WkXR9yUmTvWWM+K3tudSRoW553XaizNnQvbb990NZIkSZIkNaeTnUlFdyb1f4+K10td54gjYJ11YLfd4LLLYKedmq5IkiRJkqTeUbKAu7+311KFNMyGmg8+4AD4whdg5kxwlHhsc5ZcVZgXlTIrqsK8qJRZURXmRXUqaiZFxKsj4kBgm4h4a0S8tea6pNrNnAnf/Cbstx9ccUXT1UiSJEmS1BuG3JkUEV8FXgQsAJa1T2dmHltzbcvX4c4k1eJnP4M3vQnOPhv237/paiRJkiRJGjl17Ux6OfBiOzkarV75ytanu82YAQ8/DIcf3nRFkiRJkiR1r5Ixt1uB53by4hHx/Ij4UUTcFhG3RMQz7maKiAMj4pftx3UR4edraaVVnQ9+yUtau5NOOQXOPLOWktSlnCVXFeZFpcyKqjAvKmVWVIV5UZ1K7kx6NvDriPg58Le+k5n5poKffRw4PjMXRMTawI0RMS8zb+93ze+AnTPzwYjYAzgP+H/lv4I0PLbcEq65Bt7wBnjoITjpJAg/v1CSJEmSpKcp2Zk0daDzmTm/8ptFXAqck5lXDfL8ROCWzNx0gOectNOI+POfYffd4fWvh09+0oaSJEmSJGn06mRn0pDNpOESEZOAq4HtMvORQa55L7BVZh45wHM2kzRiHngA9twTJk+GOXNg3LimK5IkSZIkafh10kwadGdSRFzX/vpwRDzU7/FwRDxUsbC1gYuA41bQSNoFeBvwr1VeWxrIys4Hr7deayn3738PBx4If//78NSl7uMsuaowLyplVlSFeVEps6IqzIvqNOjOpMx8bfvrOivzBhExnlYj6auZ+d1BrnkJ8Hlgj8x8YLDXOuSQQ5g0aRIAEydOZMqUKUybNg146j8Ujz0GWLBgwbC83hVXTGO//WDnna/m5JNh+vTu+P089thjjz3u7uM+3VKPx9193Kdb6vG4e48XLFjQVfV43N3H5sXjwY7POussFixY8GR/pRNFY24RMQ7YiH7Np8z8v6I3iLgAuDczjx/k+RcAVwEHZ+b1K3gdx9zUiMceg0MOgbvugssug3XXbboiSZIkSZKGRy07kyLiGOAk4M/AE+3TmZkvKSjoNcA1wC1Ath/vBzZrv8bnI+I84B+AO4EAHsvMnQZ4LZtJasyyZfCud8HNN8N//idssEHTFUmSJEmStPKGdWdSP8cBW2fm5Mzcvv0YspEEkJn/lZnjMnNKZu6QmTtm5tzMnJOZn29fc0RmbtB+boeBGklSVX238Q2XcePgc5+DadNaj8WLh/Xl1aDhzopGN/OiUmZFVZgXlTIrqsK8qE6D7kzqZxHwYN2FSN0uAj7xCXjWs+B1r4Mf/hBWYsRUkiRJkqSeNOiYW0T07TiaDGwNXAH8re/5zDyz9uqeXo9jbuoaZ58NZ5wB8+bB1lsns2efzqmnnkBEpTsDJUmSJElqVCdjbiu6M6nvU9z+r/1Yrf2A1u4jacw69lhYZx3YZRc4/vgrOffcxbziFfOYNWt606VJkiRJklSrQXcmZebJmXky8Ou+7/ud+++RK1GqbiTmg//+9wsZP34mJ554LQ8/fCazZ1/D5MkzmTPnwtrfW8PHWXJVYV5UyqyoCvOiUmZFVZgX1alkAffswnPSmHLkkQdx5plHscEGTwDBAw88wcknH82RRx7UdGmSJEmSJNVmRTuTZgB7AvsB3+z31LrAi0f6U9fcmaRudNFFczn00CvZYIPgjjue4JhjZnD22Y66SZIkSZJ6Qyc7k1Z0Z9IfgV8AS4Eb+z0uA/xfyxKwcOEizj9/D373u09y5pkz+MpXFnH22U1XJUmSJElSfQa9M+nJCyLGZ+bjI1TPiurwziQVu/rqq5k2bdqIv+8dd8Duu8MBB8DJJ4Mf7tb9msqKepN5USmzoirMi0qZFVVhXlRqWD/NLSK+lZn7ATdHxDO6OJn5kg5qlEa1SZPg2mthxgy491445xwYN67pqiRJkiRJGj4r2pn0vMxcHBGbDfR8Zt5Za2XPrMc7k9QzHnwQ9t4bnvtcuOACWG21piuSJEmSJOmZhnVnUmYubn/7BmC1zLyz/2NlCpVGu2c9C+bOhaVLYa+9YMmSpiuSJEmSJGl4rGgBd58XAHMi4ncR8e2IOCYiptRdmLQyrr766qZLYMIEuOgi2HhjeMMb4P77m65IA+mGrKh3mBeVMiuqwryolFlRFeZFdRqymZSZJ2XmrsBk4FrgBFqf6iZpCOPHw5e+BK99Ley8M9x1V9MVSZIkSZK0cko+ze0DwGuAtYGbgeuAa/uNwY0Idyap1512Gvz7v8O8ebDllk1XI0mSJEnSMH+aWz//ADwOXAHMB36amX/roD5pTHvf+2D99WHqVLjiCthhh6YrkiRJkiSpupIxtx1pLeH+ObAbcEtEXFd3YdLK6Nb54MMPh3POgenToUtLHHO6NSvqTuZFpcyKqjAvKmVWVIV5UZ2GvDMpIrYDXgdMBV4OLKK1O0lSB2bNgvXWgze/Gb7wBdh776YrkiRJkiSpXMnOpMuBa2jtSrohMx8bicIGqMOdSRpVfvEL2GsvOPVUOOSQpquRJEmSJI1FnexMGrKZ1C1sJmk0uv321sjbscfCe97TdDWSJEmSpLGmk2bSkDuTpF7UK/PB22wD113XGnebPRvsl468XsmKuoN5USmzoirMi0qZFVVhXlQnm0lSwzbdFK69Fq66Co48EpYta7oiSZIkSZIGVzzmFhFrZuajNdezovd3zE2j2sMPw777wrOeBV/7GkyY0HRFkiRJkqTRrpYxt4h4dUT8Gri9ffzSiDi3wxolDWKddeCKKyAC3vjGVnNJkiRJkqRuUzLm9ilgOnAfQGb+Eti5zqKkldWr88Grrw7f/CZssQXsuivce2/TFY1+vZoVNcO8qJRZURXmRaXMiqowL6pT0c6kzFy03Cm3ukg1GTcOPvc52H13eN3r4P/+r+mKJEmSJEl6ypA7kyLiIuBM4DPAK4HjgJdn5gH1l/e0OtyZpDHnzDPh05+GuXNh222brkaSJEmSNNrUsjMJeAdwFLAJcBcwpX0sqWbHHw8f+QjssgvccEPrXGZy4omnYXNVkiRJktSEIZtJmXlvZh6UmRtl5oaZ+ZbMvG8kipM6NZrmg9/6VjjvvNZS7quugosvvpJzz13MJZfMa7q0UWE0ZUX1My8qZVZUhXlRKbOiKsyL6jR+qAsi4uwBTj8I/CIzvzv8JUla3l57/f/s3XmclXX9///HGxh2FQFxQVBRSNHCjVIzQTMG1FyYLApyIZEMxDD9yRRpljapaZqJHzWb1PEjX0VKWwRcGFHL7aMgYOq4wbCEyqKDss/798d1RgYY4JyBM2eWx/12u25zrjNn5rwOn+fnkl68368LzjmnhPz8iXTp0oeKipsoLBzPlVfeypgxQxg5cliuS5QkSZIkNRHpzEy6EzgYeCj1VAHwHtAJeDfG+OOsVrixDmcmqUmLMXLDDVMoLJxBZWUR++xTyC239KOgIJ8QMtreKkmSJEkSULuZSdtdmQR8CfhqjHFD6k1uB54BjgdmZ1ylpFoJIdCjR6Bdu9W0bHkpixZV8o9/BM44I5CXl+vqJEmSJElNRToDuHcH2lc7bwd0TDWX1mSlKmkHNdb9wWVl5RQXD+TDD2/kllsG8eyz5RxxBEyfnuvKGq7GmhVlh3lRusyKMmFelC6zokyYF2VTOiuTrgdmhhBKgQCcAPw6hNAOeCKLtUnaTGHhiM8fjxmTz8UXw1//CuefD8ccA7/9Ley7bw4LlCRJkiQ1etudmQQQQtgb+HLq9KUY46KsVlVzDc5Mkrbis8/guuvgttvgJz+BSy+FVq1yXZUkSZIkqb6rzcykdLa5AawGFgPLgYNCCCdkWpyk7GnbFq6+Gl58EZ5/Hg47DB57LNdVSZIkSZIao+02k0IIFwAzgKnA1amvv8huWdKOaar7g3v0gEcegd//Hi65BM44A959N9dV1W9NNSuqHfOidJkVZcK8KF1mRZkwL8qmdFYmXQL0BebFGE8EjgBWZLUqSTtk0CCYPRuOPRa+/GW48spkK5wkSZIkSTtquzOTQggvxRj7hhBmAl+JMa4JIcyNMR5aNyV+Xoczk6RaWLAALrss2f52001w1lkQMtoNK0mSJElqrGozMymdZtJfgPOBHwMnkcxNyosxnlLbQmvDZpK0Y6ZPh4svhn32SbbBHXxwriuSJEmSJOVaVgZwxxjPijGuiDH+Avg5cDdwZu1KlOqG+4O3dOKJ8OqrcOqp8LWvweWXQ0VFrqvKPbOiTJgXpcusKBPmRekyK8qEeVE2bbOZFEJoHkJ4o+o8xvh0jPHRGOPa7JcmaWfLy0sGc8+ZA0uXJquT7r8fXPQnSZIkSUpXOtvcHgEujjHOr5uStlqH29yknez552HUKGjbFm69FQ4/PNcVSZIkSZLqUla2uQG7A3NDCE+GEB6tOmpXoqT65Jhj4MUX4fvfh/x8GD0ali3LdVWSJEmSpPosnWbSz4HTgF8CN1Y7pHrL/cHpa94cLrwQXn8dKiuhd2/44x+TxzFGxo27nsa8KtCsKBPmRekyK8qEeVG6zIoyYV6UTekM4H4aeJ/kDm5PAy8Br2S5Lkl1rFMnmDABHnsMiouTVUu/+c1UJkxYzOTJ03JdniRJkiSpnkhnZtII4EKgY4zxwBBCT+B/Yoxfr4sCq9XhzCSpjtxxRwm//OVElizpw4YN13DggeNp1WoWY8YMYeTIYbkuT5IkSZK0k2RrZtIo4KvAJwAxxjKgS+blSWooLrxwKDffPIq9964EAvPmVXLBBaO58MKhuS5NkiRJkpRj6TST1sQY11adhBBaAC4RUr3m/uAdE0IghMDHH6+md+9LadFiFVdeGSgpyahZ3SCYFWXCvChdZkWZMC9Kl1lRJsyLsimdZtLTIYSfAm1CCN8AHgL+lt2yJOVaWVk5xcUDmTPnRkpKBvGDH5Rz7bUwYgSsWpXr6iRJkiRJuZLOzKRmwA+AAUAApgJ/rOsBRs5MknKvoiK589sbb8BDD8FBB+W6IkmSJEnSjqjNzKR0mkmDgX/EGNfsSHE7ymaSVD/ECLffDr/4RfK1oCDXFUmSJEmSaitbA7i/CbwVQrgvhHBaamaSVK+5Pzh7QoAf/Qj++U+47DL48Y9h7drt/1x9ZVaUCfOidJkVZcK8KF1mRZkwL8qm7TaTYoznAweRzEr6LvBOCOGP2S5MUv129NHwyivw3ntwwgkwf36uK5IkSZIk1YXtbnP7/IUh5AEDgfOBE2KMnbNZWA3v7zY3qR6KEW68EX77W/jTn+CUU3JdkSRJkiQpXdmamTQI+A7QHygFHgSmxRjX167M2rGZJNVvzz0HQ4bA978Pv/wltHBDrCRJkiTVe9mamXQO8FfgCzHG82KM/6zrRpKUKfcH172vfjXZ9vbyy3DyybB4ca4rSo9ZUSbMi9JlVpQJ86J0mRVlwrwom9KZmfTdGONfq+7mFkI4PoRwW/ZLk9TQ7LEHPOIn4IQAACAASURBVPYYnHgiHHUUTJ+e64okSZIkSTtbWjOTQghHAN8DzgbeAybHGG/Ncm2b1+A2N6kBeeKJZMvbqFHw059Cs3TWQUqSJEmS6tROnZkUQuhFcve27wIfAf8PuCzGuN+OFlobNpOkhmfhwmSOUvv2cN990LlOx/ZLkiRJkrZnZ89MegM4CTgtxnh8aiXShh0pUKor7g+uH7p2Tba69ekDRx4J//53rivakllRJsyL0mVWlAnzonSZFWXCvCibttVMGgwsBqaHEO4KIXwdyKhTJUktWsBvfgO33QZnngm/+x24yFCSJEmSGq7tzkwKIbQDziDZ7nYScC/wlxjjtOyXt0kdbnOTGrj334ezz4Zu3eBPf4IOHXJdkSRJkiQ1bTt7mxsAMcZPY4z/G2P8JrAv8CpwRS1rlNSE7b8/PPtssv3t6KPh1VdzXZEkSZIkKVMZ3V8pxrg8xnhnjPHr2SpI2hncH1x/tWoFt94K114LAwbAHXfkdtubWVEmzIvSZVaUCfOidJkVZcK8KJu8WbeknPjOd+C555JZSt//PqxcCTFGxo27Hre0SpIkSVL9td2ZSfWFM5Okxumzz2D0aHj+eRgxYgpXXTWV4uKBFBTk57o0SZIkSWr0sjIzSZKyqW1b+MpXSvj449O47LJnqKi4icLCGRx66GnccUdJrsuTJEmSJG3GZpIaJfcHNywXXjiUm28eRZculUBg/vxKRo4czYUXDs36e5sVZcK8KF1mRZkwL0qXWVEmzIuyyWaSpJwLIRBC4NNPV3PIIZcCq/jZzwJXXhlYtSrX1UmSJEmSqnNmkqR6oajoLnr16s7gwQOYPHka//d/5bz77gW89FJy97dTTsl1hZIkSZLU+NRmZpLNJEn12rRpMGoUfPGLcMst0K1briuSJEmSpMbDAdxSivuDG48BA2D2bOjTB444An77W1i3buf9frOiTJgXpcusKBPmRekyK8qEeVE22UySVO+1bg1XXQXPPw9PPAFHHgnPPpvrqiRJkiSpaXKbm6QGJUaYNAnGjk1WLV13HeyxR66rkiRJkqSGyW1ukhq9EODss+H116FDBzjsMLjrLqiszHVlkiRJktQ02ExSo+T+4MZv113hppuSAd3FxXD88TBrVua/x6woE+ZF6TIryoR5UbrMijJhXpRNNpMkNWh9+iTzk4YPT7a9jR0LFRW5rkqSJEmSGi9nJklqND78EK64IlmtdNNNyXa4kNHOX0mSJElqWmozM8lmkqRG59ln4aKLYJ994Lbb4KCDcl2RJEmSJNVPDuCWUtwf3LQdfzy88gp84xtwzDHwi1/A6tU1v9asKBPmRekyK8qEeVG6zIoyYV6UTTaTJDVKeXlw2WXw6qswezZ88YvJ9jdJkiRJ0o5xm5ukJuGf/4TRo+Hoo+F3v4OuXSHGSGHhDRQVXU5wuJIkSZKkJshtbpK0FaecAnPmQK9eyR3gbr4ZHnxwKhMmLGbyZJcsSZIkSVK6bCapUXJ/sGrSti1ccw2MGVPCz352Guec8wwVFadTWDiDQw89jTvuKMl1iarnvLYoXWZFmTAvSpdZUSbMi7LJZpKkJufnPx9KcfEodtmlEgi8804l++03mkMOGUplZa6rkyRJkqT6zZlJkpqkSZOmMHz4VLp1C8ybV8k3vzmIuXPzWboUvvUtOPtsOO44aGbLXZIkSVIj5swkSUpTWVk5xcUDmTPnRu65ZxB9+pTz2mvw5JPQuTNcdBF07w4//jE89xyuWJIkSZKkFFcmqVEqLS2lf//+uS5DDcC2svKf/8BDDyXH8uXJiqVvfxuOOcYVS02V1xaly6woE+ZF6TIryoR5UbpcmSRJO9Ehh8CVV8Ls2fD449CxI1x4YbJiaexY+Ne/XLEkSZIkqelxZZIkZej115PVSg8+CJ98ksxXOvts+MpXXLEkSZIkqWGpzcokm0mStAPmzt3YWFq5ctPGUsjocixJkiRJdc9tblJKaWlprktQA7GjWTn0UPjFL5LVSo89Bu3bw/nnw/77w09+Ai+8AFV98Bgj48Zdj43xhstri9JlVpQJ86J0mRVlwrwom2wmSdJOcuihcPXVSWPpH/+Adu3g3HOTxtJll8FvfjOVCRMWM3nytFyXKkmSJEm15jY3ScqiGOGqq0q4/faJfPxxH9atu4YuXcbTseMsfvzjIYwcOSzXJUqSJElqwtzmJkn1TAhw9dVDmTBhFHvtVQkEKioqWbBgNO+8M5Ty8lxXKEmSJEmZsZmkRsn9wUpXXWQlhEAIgRUrVtO796W0aLGK664LrF0b6NMHhgxJZiup/vPaonSZFWXCvChdZkWZMC/KJptJklQHysrKKS4eyJw5N1JcPIhPPinn5pvhvfeSO78NGQLHHZfcGW79+lxXK0mSJElb58wkSaoHNmyARx6B3/0O5s+Hiy+GCy6ADh1yXZkkSZKkxsyZSZLUQDVvDoMHwzPPwMMPw8yZ0KNH0lR6++1cVydJkiRJG9lMUqPk/mClqz5m5eijoaQEZs+GXXaBY4+FM86A6dOTu8Mpd+pjXlQ/mRVlwrwoXWZFmTAvyiabSZJUT3XtCr/+NcybB6ecAj/6ERx5JNxzD6xZk+vqJEmSJDVVzkySpAaishKmTUvmKr32Glx0Efzwh9ClS64rkyRJktRQOTNJkhqxZs1g4ECYOhWeeALKy+ELX0gGdc+Zk+vqJEmSJDUVNpPUKLk/WOlqqFk59FC46y546y3Yf38YMAC+8Q345z+TFUwAMUbGjbseV3XuPA01L6p7ZkWZMC9Kl1lRJsyLsslmkiQ1YHvsAePHw/vvwznnJI9794bbb4f775/KhAmLmTx5Wq7LlCRJktSIODNJkhqRGOHyy0u4886JfPppHyorr2G//cbTrt0sxowZwsiRw3JdoiRJkqR6xJlJktTEhQA33DCUu+8exZ57VgKBBQsq+fTT0Xz22VA++CDXFUqSJElq6GwmqVFyf7DS1RizEkIghMDKlavp3ftS2rZdxXnnBV59NdCrF5x+Ojz8MKxZk+tKG57GmBdlh1lRJsyL0mVWlAnzomyymSRJjVBZWTnFxQOZM+dGiosH0bp1Offem9wBbvBg+MMfoGtXGDUKXnwx2R4nSZIkSelwZpIkNVHvvw/33Qf33AN5eXDuufD97ydNJkmSJElNQ21mJtlMkqQmLkb417+SptKkSXD00Ulj6ayzoG3bXFcnSZIkKZscwC2luD9Y6TIrydDur34V7rwTFi6E4cOhpCRZofSDH8CMGW6Dq2JelC6zokyYF6XLrCgT5kXZZDNJkvS5Nm1gyBB47DGYOxcOPhh+9CM48ED4xS/g3XdzXaEkSZKkXHObmyRpm2KEV15JtsE98AAcckiyDe7ss2HXXau/LlJYeANFRZcTQkarZCVJkiTliNvcJEk7XQhw1FHw+98n2+DGjoW//x26d4ehQ2HaNNiwAR5+eCoTJixm8uRpuS5ZkiRJUhZltZkUQtg3hPBUCGFuCGF2CGHMVl73+xBCWQhhZgjh8GzWpKbB/cFKl1nJTMuWyWDuv/wF3n4bjjkGRowooXXr07jwwmeoqLiJyy+fwaGHnsYdd5TkutydzrwoXWZFmTAvSpdZUSbMi7KpRZZ//3rg0hjjzBBCe+D/QgjTYoxvVL0ghDAIODDG2DOE8BXgf4BjslyXJGkHde4MF18Mo0cP5aabOnH11TOAwLx5lTRvPpo//CGfxx+HXr2So2fP5GvnzslqJ0mSJEkNU53OTAoh/BW4Ncb4ZLXn/geYHmP8f6nz/wD9Y4xLNvtZZyZJUj01adIUhg+fSrdugfLySiZMGETv3vmUlcFbb216wMYGU/VGU8+esMsu6b+nM5okSZKkHVebmUnZXpn0uRDC/sDhwAubfasrUF7tfGHquSVIkhqEsrJyiosHMnjwACZPnkZZWTnDhsGRR276uhjho4/YpMn00EPJ17ffhg4dtmwy9eoFPXpAq1ab/q6qGU19+06joCC/7j6sJEmS1MTVycqk1Ba3UuBXMcZHNvve34CiGOO/UudPAP9fjPGVzV7nyiSlrbS0lP79++e6DDUAZqX+qKxMBnxvvpLprbegvBy6dk0aS2vWlPCf/0ykefM+LFx4DT17jicvbxZjxgxh5MhhWa3RvChdZkWZMC9Kl1lRJsyL0lUvVyaFEFoAk4D7Nm8kpSwEulU73zf13BbOO+889t9/fwA6dOjA4Ycf/vn/c1QNF/Pcc4CZM2fWq3o899zz9M67dYN33inlkEPgoos2fn/9eujevT9vvQX/+EdXPv74a8yZswIILFz4HhdddAIXXjg05/V77nnVeZX6Uo/n9fu8Sn2px/P6ez5z5sx6VY/n9fvcvHi+tfObb76ZmTNnft5fqY2sr0wKIdwLfBRjvHQr3z8FGBVjPDWEcAxwc4xxiwHcrkySJFWpmtHUpUtg/vxK8vIGMXhwPmPHbrm1TpIkSdLW1buVSSGErwJDgdkhhFeBCPwU2A+IMcY7Y4z/DCGcEkJ4G/gUOD+bNUmSGr7NZzS99lo57drBGWck85XGjoVvfhOaN891pZIkSVLjU6d3c9sRrkxSJkpLSz9fwidti1lpXNatg4cfht/9DpYuhTFj4PzzM7tL3LaYF6XLrCgT5kXpMivKhHlRumqzMqlZtoqRJKmu5eXBkCHw/PNw773wzDOw//5w2WUwb16uq5MkSZIaB1cmSZIatfffh1tvhT//Gb7+9WQL3LHH5roqSZIkqX6ozcokm0mSpCahogL+9Ce45Rbo0iVpKhUUQIus39dUkiRJqr/c5ialVN36UNoes9J07LILXHIJlJXBFVfAbbclw7pvuAFWrEjvd5gXpcusKBPmRekyK8qEeVE22UySJDUpzZvDWWfBjBnwl7/Aa68lTaWLL4a33851dZIkSVL95zY3SVKTt2hRslLpzjuTeUpjx0L//hAyWuwrSZIkNTxuc5MkqRb22QeuvTa549upp8KPfgRHHgn33ANr1iSviTEybtz1+A8bkiRJaupsJqlRcn+w0mVWVF3btjByJMydC7/+Ndx/PxxwAPzqV1BcPJXf//5FJk+elusy1QB4bVEmzIvSZVaUCfOibLKZJEnSZpo1g0GDYNo0GDGihJtuOo0LLniGVatGcdFFM+jZ8zTuuKMk12VKkiRJOeHMJEmStiHGyKRJUxg7dgYLFxbRrl0heXn96Ngxn0GDAoMGJfOV2rXLdaWSJElS5pyZJEnSThZCIITAJ5+spnfvS2nWbBV33RWYPDnQrRv89rew117wjW/AjTcmW+T8tw9JkiQ1ZjaT1Ci5P1jpMitKR1lZOcXFA/nDH75JcfEg3n67nD594IorYPp0WLgQRo+Gt99OBnh37w4jRsDDD8OKFbmuXrngtUWZMC9Kl1lRJsyLsqlFrguQJKm+KywcASR/KSsoyN/i+7vuCmeckRwxwptvwpQpcNddcN55cPjhyQymgQOTx838pxxJkiQ1YM5MkiQpiz77DGbMSJpLU6bA8uWQn580lgYMgM6da/65GCOFhTdQVHQ5IWS0hV2SJElKW21mJtlMkiSpDr37LkydmjSWSkvhC19IGkuDBkHfvtAitWZ40qQpDB8+leLigTWuhpIkSZJ2BgdwSynuD1a6zIoysTPy0qMHXHQRPPIIfPghXHcdrFkDP/whdOkCRx9dQteup3HFFc9QUXEThYUzOPTQ07jjjpId/wCqM15blAnzonSZFWXCvCibbCZJkpQjLVvCiScmDaVZs2D2bLjooqF07z6K996rBAKLF1cyaNBoCgqG5rpcSZIkCXCbmyRJ9U7VFrfOnQOLFlXSu/cg3n47nx49kubTSSfBCSfAbrvlulJJkiQ1dG5zkySpESgrK6e4eCDvvHMj998/iG9/u5ylS+H225OB3bfcAl27wpe/DFdckcxg+vTTXFctSZKkpsKVSWqUSktL6d+/f67LUANgVpSJ+pSX1avhhRfgqadg+nR45RU4/PCNK5eOPRZat851lU1XfcqK6j/zonSZFWXCvChdtVmZ1CJbxUiSpOxp3Rr69UuOq69OVib9619Jc6mwEObMSVYuVTWX+vZNZjRJkiRJO8qVSZIkNUKffALPPJOsWnrqKXj7bTjuuI3NpSOOgBbV/kkpxkhh4Q0UFV1OCBn9w5QkSZIasNqsTLKZJElSE7BsGTz99Mbm0oIFyRDvqubSW29N4Qc/mEpx8UAKCvKzWouNK0mSpPrDZpKU4v5gpcusKBONKS9LlkBpKdx2WwnPPz+R9ev7EOM1tGo1nhYtZtGr1xCOOmoYHTrw+bHbbmxyXvVc+/aQSU+o6m51ddG4ypXGlBVln3lRusyKMmFelC5nJkmSpLTsuSd85zvw7W8PZdKkTowdO4OFCwMdOlQyYsRoDjssn48/hhUrkmPRoo2PV6xgk++tXr1po2lrTadXXy3hqacmEmMfKipuorBwPFdeeStjxgxh5Mhhuf4jkSRJUppcmSRJUhNXtVKoW7dAeXklxcWDMloxtG5d0lyq3mDavOGUHJH//GcKs2fPYM2aIlq0KORb3+rHtdfm06OH290kSZJywZVJkiQpY2Vl5RQXD2Tw4AFMnjyNsrLyjH4+Lw86d06ObQtMmhQYPnw1Bx54Ke+/X8ny5YFjjgkcdBB873vw7W9Dly61/iiSJEmqA81yXYCUDaWlpbkuQQ2EWVEmGmteCgtHUFCQTwiBgoJ8xo27IGvvVdW4mjPnRu69dxD9+5ezcCH8/Ofw/PPQqxcMGgT33QcVFVkrI+saa1aUHeZF6TIryoR5UTa5MkmSJNWZwsIRnz+uvpVu0KDk+PRT+Nvf4P77YfTo5LnvfQ8GDoSWLXNRsSRJkjbnzCRJklQvLV0KDz0E//u/8PrrUFCQNJa+9jVo5tpqSZKknaI2M5NsJkmSpHpv/nx44IGksbRsGXz3u0ljqU8fCM7uliRJqrXaNJP8dz01Su4PVrrMijJhXnKne3e44gqYNQseewxatIAzz4TDDoNrr4V33811hZsyK8qEeVG6zIoyYV6UTTaTJElSg3LYYfDrX8N778Gdd8KiRXDMMXDccfCHP8AHH2z6+hgj48ZdjyucJUmSdg63uUmSpAZv3Tp4/PFkG9zf/w7HHptsgzvzTJg6dQrDh0+luHjgJkO/JUmS5MwkSZIkPv0UHn0UiopKmDt3Im3b9mHlyms48MDxtGo1izFjhjBy5LBclylJklQvODNJSnF/sNJlVpQJ89IwtGuXDOieNWsod901iry8SiDwzjuVrF07mvnzh1JaCmvWZK8Gs6JMmBely6woE+ZF2WQzSZIkNUohBHbdNbB+/Wp6976UXXZZxdChAQhccQV07gz5+XDDDfDqq1BZmeuKJUmSGga3uUmSpEarqOguevXqzuDBA5g8eRplZeWMG3cBAMuXQ2kpPPkkPPEEfPQRnHQSnHxycvTokdvaJUmS6oIzkyRJkmppwYKNjaUnnoDWrTc2lk46CfbYI9cVSpIk7XzOTJJS3B+sdJkVZcK8NG777gvnngv33QeLFsE//gFf/CLcfz8cdBAcfjhcdhk89lgy5HtbzIoyYV6ULrOiTJgXZZPNJEmSpM2EAL17w5gxyZ3hPvoIbr8ddtsNfvMb2HNP6NcPfvUr+Ne/YN26jT8bY+TOOx/AFdWSJKmxcpubJElShj79FJ55JtkO9+ST8N57cMIJ8PWvQ2XlFK66airFxQMpKMjPdamSJEnb5MwkSZKkHPjwQ/jpT0uYNGkiK1f2Yf36a8jLG09e3iwOOWQIxx8/jL32gr33hr322nh07gzNm+/Ye8cYKSy8gaKiywkho78HSpIk2UySqpSWltK/f/9cl6EGwKwoE+ZF2xJjZNKkKfzkJzMoL89nr72mMnJkP3r2zGfJksB//8vnx+LFydcVK5LB3tUbTDU1nfbaC3bZpeb3nTRpCsOHuxKqIfPaonSZFWXCvChdtWkmtchWMZIkSU1JCIEQAitWrGa//W5j2bKufPGLgYKCrf/dbN06+OCDLZtMb74JTz+98bnFi6FZs02bSx99VMLrr0+kWbM+VFTcxLhx47nyylsZM2YII0cOq8NPLkmSmhpXJkmSJO0kRUV30atXdwYPHsDkydMoKytn3LgLdvj3xggrV27adFq8OFJaOoXHH5/Bp58WAYV84Qv9OOusfPr1Cxx3HOy6645/JkmS1Li5zU2SJKkJqdri1q1boLy8krFjBxFjPs88Ay+9BF/4QjIY/GtfS4499sh1xZIkqb6pTTOpWbaKkXKptLQ01yWogTAryoR5UbrqKitlZeUUFw9kzpwbKS4eRJs25fzylzB9OixdCr//Pey5J/zxj3DQQdC7N4wcCfffD+XldVKi0uC1RekyK8qEeVE2OTNJkiSpgSosHPH5482Hb7dqBV/9anKMGwcbNsCsWfDMMzB5MowdC+3aJSuWTjghOXr2BG8IJ0mStsdtbpIkSU1QjMmg7xkzkgbT00/D2rUbm0tf+xp88YvQvPnmPxcpLLyBoqLLCXaeJElq8JyZJEmSpFqbNy9pLM2YkRxLliQrm6oaTEcdBY8+msxpKi4euMVqKEmS1PA4M0lKcX+w0mVWlAnzonQ11Kzstx8MGwZ33glvvJEc558PixbBt79dQuvWp3HOOc9QUXETY8bM4OCDT+OOO0pyXXaD11DzorpnVpQJ86JsspkkSZKkGu25JxQUwC23wPz5Q/nTn0bRvn0lEFi6tJJ580Zz441DOe88+J//SWYyrV+f66olSVK2uc1NkiRJaZk0Kdni1q1boLy8krvvHsTBB+fz73/D88/Dv/8NCxbA0UfDscfCMcckR5cuua5ckiRtjTOTJEmSlDVFRXfRq1d3Bg8ewOTJ0ygrK2fcuAs2ec3y5fDii3zeYHrhBejYMWkqVTWY+vSBvLwcfQhJkrQJm0lSSmlpKf379891GWoAzIoyYV6ULrOyUWVlcte4qpVLzz8P774LRxyxaYNpn31q/vmmcPc486J0mRVlwrwoXbVpJrXIVjGSJElSs2ZwyCHJcf75yXOffAIvvZQ0loqLYeRIaNNm061xRx4JrVrBww9PZcKExfTtO827x0mSVE+4MkmSJEk5FSO8886mq5dmzy6hefOJtG7dhxUrrmHvvcfTqtUsRowYwtixw2jTJtdVS5LUOLjNTZIkSY3CypWRG2+cws03z2DFiiJaty6ka9d+rF2bz5IlgTZtYK+9aj723nvj486doXnz9N+3KWyrkySpOre5SSnuD1a6zIoyYV6ULrOy49q3Dxx6aGDDhtX07n0p5eWVXHddoKAgECOsWAGLF8N//7vp8frrm54vX540lLbWeKp+7LprbrbVmRely6woE+ZF2WQzSZIkSfVSWVk5xcUDN7l7HEAIsPvuydG797Z/x7p18OGHWzad3nkHnntu4/n8+SWsXTuR5s37sH79TZx33nguvPBWTjxxCAUFw+jalc+P1q3r4MNLklSPuc1NkiRJTV6MkZKSKVxxxQwWLy6iU6dCTj21H7vvns+iRYGFC2HhwmQ1VPv2sO++bNJg2vzo1ClpeqXzvm6rkyTlktvcJEmSpFoIIdCmTWDlyo3b6k4/PdlWV11lJXz0EZ83l6qOf/970/PVq2GffbbdcNpnH3j0Ue9WJ0lqeFyZpEbJ/cFKl1lRJsyL0mVWGqaiorvo1av7Jtvqxo27oFa/67PPtmw4VR0LFsCbb5awYsVEmjXrQ2XlybRu/QR5ebM47LAhHHfcMDp2TFY3dey48ag6b9cuvVVPNXElVMPmtUWZMC9KlyuTJEmSpFoqLBzx+eMdXSXUti307JkcNYlxKA8+2IlLL53BokWBXXet5NxzR9OrVz7Ll8OyZTBvHixdmjyuOpYuTeZAbavZtLXz9u1zM2BcktT4uDJJkiRJyoFJk6YwfPhUunULlJdXUlw8KK0Gz+rVfN5wqqnZVNP5kiUbB4xv2HANXbuOZ9ddZ3HJJUMYOXJYHXxaSVJ95cokSZIkqYHY2t3qtqd1a9h77+RIV4xDeeCBTlx22QwWLw588EElFRWjee21fJ57Do49Fpo1q+UHkSQ1Of4nQ41SaWlprktQA2FWlAnzonSZFaWjsHAEBQX5PP300xQU5Nd6PlM6Qgi0bLlxwHjr1qu49trAXnsFRoyAAw6AK66AmTPBzQD1l9cWZcK8KJtsJkmSJElNQNVKqDlzbqS4eBArV5bz85/D3Lnwt78lK5POOgt694Zf/hLeeivXFUuS6itnJkmSJEkCklVJzz8PDzwADz4IXbvCd78L3/kOdOuW6+okSdlQm5lJNpMkSZIkbWH9eigtTRpLf/kLHHZY0lj61rdgjz1yXZ0kaWepTTPJbW5qlNwfrHSZFWXCvChdZkWZqK95adECTj4Z7r4bFi+Gyy6DGTOgZ08YNAjuvRc++STXVTYt9TUrqp/Mi7LJZpIkSZKkbWrVCk4/PVmltHAhnHMOTJqUbH0rKEger1q15c/FGBk37nrcYSBJjYvb3CRJkiTVyrJlMHly0mR65RX45jeTrXAnnwx5eTBp0hSGD59KcfFACgryc12uJKkGzkySJEmSlBOLF8NDDyWNpdmzS2jZciJt2/Zh4cJr6NlzPHl5sxgzZggjRw7LdamSpGqcmSSluD9Y6TIryoR5UbrMijLRWPKy994wZgz8+9/w2mtDGThwFB9+WAkEysoqWbRoNHfdNZSzzoLRo6GoCO67D556Ct58E1au3LH3bwpb6hpLVlQ3zIuyqUWuC5AkSZLUuPToERg8OPD3v6/moIMupby8kuuuC3zpS4GFC/n8mDNn4+MFC5LZTF27wr77Jl83f9y1K3TuDM1q+Cfxhx+eyoQJi+nbd1qdbKmLMVJYeANFRZcTQkb/oC9JDZ7b3CRJkiTtdEVFd9GrV3cGDx7A5MnTKCsrZ9y4C7b6+hhhqehwjgAAFXBJREFU+fJNm0s1PV65MlkFVdVo+uijEubMmUgIffjvf6+hW7dkS9255w7h3HOH0bp10qSqOmpqRNWG86AkNRbOTJIkSZLUqK1aBYsWbWwulZdHnn56CtOnz2DVqiLy8grZa69+tGqVz9q1gdWrYc2ajUeLFmzSYKrp8ba+P3duCS+/PJEY+/DRR9ewzz7jad16FhdfPIQf/9h5UJIaHptJUkppaSn9+/fPdRlqAMyKMmFelC6zokyYlx1XtUqoW7dAeXklxcWDalwtFCOsW8cmDaaqxzU9V9P3V6+OzJw5hccfn0FFRRGtWxfSuXM/li/Pp3nzQPfubHLst9/Gx/vskzSzaiPGyNChP+T++//HbXVKi9cWpas2zSRnJkmSJElq0MrKyikuHrjJlrqahAAtWyZH7QUmTQo8/vhqevdO5kHdfHMyI+rjj2H+fJg3L/k6fz689trGx0uWwF57bb3Z1L077LZbze/68MNT+etflzJ5ct3MhJKkbXFlkiRJkiRlINN5UFXWrUu25lU1lzY/5s1LZjpVby4tXpxsqwuhDwsWXEPPnslMqDFjhjBypNvqJO04t7lJkiRJUgMVI6xYsXmDKfLcc1N4+eUZrF2bzIQaNKgfY8bkc/zxgVatcl21pIauNs2knXQvA6l+KS0tzXUJaiDMijJhXpQus6JMmBdVCQF23x369IFvfhNGjYLrrw+MHRto1Wo13bufTV7eKlq2DPzsZ4E99oBTT4Xf/x7efDNpRklVvLYom5yZJEmSJEn1WNVMqI4dW7Js2VrKysp56CFYtgyeeAKmToXrr0+Gew8YAPn58PWvQ4cOua5cUmPlNjdJkiRJauBihP/8J2ksTZ0Kzz0HX/pS0lgaMAD69oXmzXNdpaT6yJlJkiRJkiRWrYJnn93YXFq0KFmtlJ+fHPvum+sKJdUXzkySUtwfrHSZFWXCvChdZkWZMC9KVyZZadMGvvEN+O1vYfZseO01GDQo2RZ3+OFw6KEwdixMmQKffbblz8cYGTfuevwH/YbLa4uyyWaSJEmSJDVyXbvC+efDAw/AkiXw5z9Dp05w7bWw557JVriqxlOM8PDDU5kwYTGTJ0/LdemS6iG3uUmSJElSE/bJJ/DUU8l2uIceKuHjjyfSpk0fKiquYa+9xtOy5Sy+970hDB8+jI4dk8HeO3v+UoyRwsIbKCq6nBAy2m0jaQc5M0mSJEmSVGuVlZHbbpvClVfOYMWKItq0KeSgg/rRsmU+K1YEli+Hjz+Gdu1g992To2PHjY+399xuu0GzGvbHTJo0heHDp1JcPJCCgvy6/+BSE+bMJCnF/cFKl1lRJsyL0mVWlAnzonTVRVaaNQvsvXdgw4bV9O59KS1arOKqqwIvvxx4+21YuhTWroV582D6dLj7bvjpT+E730nuGNepU9JseuUVeOghuO46GDkymd/Uowe0bJk0lnr0gKOOgkMOKWHXXU/jBz94hoqKm/jhD2fQtetpXHxxCS+9BO+9BxUVyda7nakpzITy2qJsapHrAiRJkiRJ9UdZWTnFxQMZPHgAkydPo6ysfJPvN2uWbHXr0AEOOCCz371hQ9JsWr48OZYuHcqUKZ24554ZQGD16koOOWQ0ZWX5XHQRfPRRcqxfD507J8cee2x8vLXzTp2SxtXWVM2E6tt3miuhpFpwm5skSZIkKWeqtrh16xYoL6+kuHjQFg2eVas2Npaqjg8/rPlx1dG27ZaNpkWLSpg1ayIh9GHJkms44IDxtGkzizFjhjBy5LAc/QlIuVWbbW6uTJIkSZIk5cz2VkIBtGkD3bolRzpiTFZAbd5s+vDDobRp04knn0xWQs2bV0le3mhuvz2f6dPhC1+Agw9OvvbqBe3b79zPWlccaK5sc2WSGqXS0lL69++f6zLUAJgVZcK8KF1mRZkwL0qXWdk5Nl8JddttgzjkkHzeeAPefHPjUVaWDA2v3mCqOrp3r3mQ+NbUdXNn0qQpnHPOH7nvvhFu49N2uTJJkiRJkqRtqGkl1Pe/D0cfvenrKith/vxNG0yPPgpvvAHLlkHPnps2mKqOXXfd8j1rO6MpRvjss2S+1IoVG2dNVX9c/fz110tYsGAiGzb0Yf36UYwa9QQ/+9mtjB3rNj7tXK5MkiRJkiQpAytXwltvbWwyVa1qeust2G23jY2lZctKeP75iTRv3of337+G7t3HE8Is8vOH0LfvsG02hqoeN2+e3AGv6ujQoebHu+8Ou+0WefnlKdx00wwWLy6iTZtCoB99++Zz5pmBM85I7qQnVefKJEmSJEmSsqx9ezjyyOSorrISFi7c2GB6442hdOjQiddfT2Y0LV5cSc+eo1myJJ9//WtjE2jvvWtuGHXoAK1bZ1JZ4KOPAitXrqZ370spL6/kjjsC7dsHHnkEfvMb6NIFzjwTzjgDjjoKHKmk2nBlkhol95MrXWZFmTAvSpdZUSbMi9JlVhqmdO5WtzMVFd1Fr17d6dixJcuWraWsrJxx4y4AYMMGeOEFeOSR5Fi5Ek4/PWksnXgitGyZtbJUj7kySZIkSZKkeiSdu9XtTIWFI4Ck+bh506p5czjuuOS47rpkBdUjj8AvfwlDhsCAAUlj6ZRTklVR0ta4MkmSJEmSpCZuyRL429+S5tLTT8NXvpI0lk4/Pbl7nRqv2qxMyuBmhpIkSZIkqTHac0+44IKkobR4MfzoR/DyyxtnQ119NcycmdxhbnMxRsaNu566WgBS1++nLdlMUqNUWlqa6xLUQJgVZcK8KF1mRZkwL0qXWVEmdiQv7drBWWfBn/8M//0v/O538PHHUFAABxwAl1wCTz0F69Ylr3/44alMmLCYyZOn7ZTat6eu309bcmaSJEmSJEmqUYsW0K9fctx4I8ydm2yFGzcO5s4tIS9vIm3a9KGi4iYuuWQ8P/nJrXzrW0M466xhNG8OzZqx3a/pvKZ5c/jTn0q47baJrF+fvF9h4XiuvPJWxowZwsiRw3L9R9WkODNJkiRJkiRlbMGCyC9+MYX775/B6tVFtGpVSI8e/ejYMZ/KykBlZXIHuR35Wv3x+vWRDRumEOMMoIg2bQo59dR+nH12PocdFujZE/Lycv2n0vB4NzdJkiRJklQn9t03MHBg4MEHV9Ojx6WUl1fyq18FCgoy6ktkIDBpUmD48NXsscelLFpUSYyBBx4IzJ0L5eVw0EFw2GHJceihydcDDkhWNmnncWaSGiX3kytdZkWZMC9Kl1lRJsyL0mVWlIm6yktZWTnFxQOZM+dGiosHUVZWXifv9/bbN1JSMoijjy7nL3+Bt96CZcvg3nvhlFOgogL++Ec4+WTYdVc46ig45xy4/nr4xz9g3ryah4lvzmHfNXNlkiRJkiRJqpXCwhGfPy4oyM/p+7VpA0cckRzVVVTA668n857mzIEnn0y+fvJJsnqpagVT1de994aQWlxVNey7b99pdfL5YowUFt5AUdHlhJCtFV47zplJkiRJkiSpyVm+PGkwVTWZqo7166FTpxKWLp1IXl4fPvzwGvbddzx5ebMYOnQI3/3uMFq2pMYjL29jI6o2Jk2awvDhUykuHlgnzSuo3cwkm0mSJEmSJEkpH3wAc+ZESkqm8OCDM/j00yJatiykW7d+tG+fz7p1gbVrYc0aWLt202PduqShtLVm09aOBQtKeOedicTYh4qKa+jZM2le1cWd6hzALaWUlpbSv3//XJehBsCsKBPmRekyK8qEeVG6zIoyYV5qr0sXOOmkwLJlgUmTVtO7dzJc/Lrrtj9cPMakobR5k2lrR1VDas2aoTz7bCfuv38GEFi9upJf/3p0na1OypTNJEmSJEmSpM1UDfsePHgAkydPS2u4eAgbVxtlJtCsWeDPf97YvAoh1Nu5SW5zkyRJkiRJyrGiorvo1av7Js2rceMuyPr7OjNJkiRJkiRJaatNM6lZtooBCCHcHUJYEkJ4bSvf3zWE8GgIYWYIYXYI4bxs1qOmo7S0NNclqIEwK8qEeVG6zIoyYV6ULrOiTJgXZVNWm0lAMbCtaVGjgLkxxsOBE4EbQwjOcdIOmzlzZq5LUANhVpQJ86J0mRVlwrwoXWZFmTAvyqasNpNijM8Cy7f1EmCX1ONdgKUxxvXZrElNw4oVK3JdghoIs6JMmBely6woE+ZF6TIryoR5UTblehXQH4BHQwiLgPbAd3JcjyRJkiRJkrYh29vcticfeDXGuA9wBHBbCKF9jmtSI/D+++/nugQ1EGZFmTAvSpdZUSbMi9JlVpQJ86Jsyvrd3EII+wF/izF+qYbv/R0oijE+lzp/ErgixvhyDa/1Vm6SJEmSJEk7WaZ3c6uLbW4hddRkHnAy8FwIYU+gF/BuTS/M9INJkiRJkiRp58vqyqQQwv8C/YFOwBLgKqAlEGOMd4YQ9gb+DOyd+pGiGOMDWStIkiRJkiRJOyTr29wkSZIkSZLUeOR6AHdaQggDQwhvhBDeCiFcket6VH+FEN4PIcwKIbwaQngx1/Wofgkh3B1CWBJCeK3ac7uHEKaFEN4MIUwNIeyWyxpVP2wlK1eFEBaEEF5JHQNzWaPqjxDCviGEp0IIc0MIs0MIY1LPe33RJmrIysWp572+aAshhFYhhBdSf6+dHUK4KvW81xZtYhtZ8dqiGoUQmqUy8WjqPOPrSr1fmRRCaAa8BXwdWAS8BAyJMb6R08JUL4UQ3gWOijEuz3Utqn9CCMcDK4F7q24KEEK4DlgaY7w+1azePcY4Lpd1Kve2kpWrgIoY4005LU71TghhL2CvGOPM1F1p/w84Azgfry+qZhtZ+Q5eX1SDEELbGONnIYTmwHPAGKAAry3azFayMgivLapBCGEscBSwa4zx9Nr8b6KGsDLpy0BZjHFejHEdMJHkP7pSTQINI9fKgRjjs8DmjcYzgHtSj+8BzqzTolQvbSUrsPUbSqgJizH+N8Y4M/V4JfAfYF+8vmgzW8lK19S3vb5oCzHGz1IPW5HcPCnitUU12EpWwGuLNhNC2Bc4Bfhjtaczvq40hP/R3RUor3a+gI3/0ZU2F4HHQwgvhRBG5LoYNQhdYoxLIPlLPtAlx/WofhsdQpgZQvij2wpUkxDC/sDhwPPAnl5ftDXVsvJC6imvL9pCaivKq8B/gcdjjC/htUU12EpWwGuLtvQ74HI2NhyhFteVhtBMkjLx1RjjkSSd1lGprSpSJur33l/l0gSgR4zxcJK/qLlkXJtIbVuaBFySWnWy+fXE64uAGrPi9UU1ijFWxhiPIFnt+OUQwqF4bVENashKb7y2aDMhhFOBJalVsttatbbd60pDaCYtBLpXO9839Zy0hRjj4tTXD4G/kGyTlLZlSQhhT/h8lsUHOa5H9VSM8cO4cdDgXUDfXNaj+iWE0IKkOXBfjPGR1NNeX7SFmrLi9UXbE2P8BCgFBuK1RdtQPSteW1SDrwKnp2YNPwCcFEK4D/hvpteVhtBMegk4KISwXwihJTAEeDTHNakeCiG0Tf1LHyGEdsAAYE5uq1I9FNi0C/8ocF7q8bnAI5v/gJqsTbKS+g9rlcF4fdGm/gS8HmO8pdpzXl9Uky2y4vVFNQkhdK7alhRCaAN8g2TOltcWbWIrWXnDa4s2F2P8aYyxe4yxB0lv5akY4/eBv5HhdaXe380NIHULw1tIml93xxh/k+OSVA+FEA4gWY0USYbO3W9WVF0I4X+B/kAnYAlwFfBX4CGgGzAP+HaMcUWualT9sJWsnEgy36QSeB8YWbW3XE1bCOGrwAxgNsl/gyLwU+BF4EG8vihlG1n5Hl5ftJkQwhdJBuE2Sx3/L8Z4bQihI15bVM02snIvXlu0FSGEfsBPUndzy/i60iCaSZIkSZIkSaofGsI2N0mSJEmSJNUTNpMkSZIkSZKUNptJkiRJkiRJSpvNJEmSJEmSJKXNZpIkSZIkSZLSZjNJkiRJkiRJabOZJEmS6q0QQmUI4YZq5z8JIVy5k353cQhh8M74Xdt5n2+FEF4PITyZzbpCCPuFEL6beYWSJEmZsZkkSZLqszXA4BBCx1wXUl0IoXkGL/8BcEGM8evZqiflAOB7mfxAhp9DkiQJsJkkSZLqt/XAncClm39j8xU8IYSK1Nd+IYTSEMJfQwhvhxCKQgjfCyG8EEKYFUI4oNqv+UYI4aUQwhshhFNTP98shHB96vUzQwgjqv3eGSGER4C5NdTz3RDCa6mjKPXcz4HjgbtDCNfV8DNXpF7/agjh1zV8/72qRloI4agQwvRqtbwaQnglhPB/IYR2QBFwfOq5S9L9HCGEtiGEv6d+32shhLPT+r+MJElqslrkugBJkqRtiMBtwOyamjE1vLbKl4CDgRXAu8BdMcavhBDGABezsTm1X4yxbwjhIGB6COFA4FxgRer1LYHnQgjTUq8/Ajg0xji/+huHEPYGfpP6/grg8RDC6THGX4UQTgIujTG+utnPDAS+CfSNMa4JIXTYzmeqfv4T4Ecxxn+HENoCq4FxwE9ijKenfv+IdD5HqiG3MMZ4WurndqnxT1eSJCnFlUmSJKleizGuBO4BLsngx16KMX4QY1wLvANUNVFmA/tXe92Dqfd4O/W6g4EBwDkhhFeBF4COQM/U61/cvJGU0heYHmNcFmOsBO4HTqj2/VDDz5wMFMcY16RqWFHDa2r6OYDngN+FEC4Gdk+95+bS/RyzSVZoFYUQjo8xVmzlPSVJkgCbSZIkqWG4hWT2ULtqz60n9XeZEEIAWlb73ppqjyurnVey6crs6it/Quo8ABfHGI9IHQfGGJ9IvebTbdS4tcbPjvj8MwKtq56MMV5H8ufRhmTFUa+t1LPdzxFjLAOOJGkqXRNCGJ+FzyFJkhoRm0mSJKk+CwAxxuUkq4h+UO177wNHpx6fAeTV4vefHRIHkgywfhOYCvwohNACIITQM7WVbFteBE4IIXRMDbX+LlC6nZ95HDg/hNAm9T671/Ca94CjUo8Lqp4MIfSIMc6NMV4PvESyoqoC2LXaz6b1OVJb9FbFGP8XuIGksSRJkrRVzkySJEn1WfWVQzcCo6o9dxfwSGob11S2vmpo87lD1c0naQTtAoyMMa4NIfyRZCvcK6kVTx8AZ26zyBj/G0IYx8YG0t9jjH/f1vvHGKeGEPoAL4cQ1gD/BMZv9vpfkgzv/phNm1M/DiGcCGwgGQb+WOrnNqT+PP4cY7wlhJDO5/gicEMIoRJYC1y0rc8qSZIUYtzW368kSZIkSZKkjdzmJkmSJEmSpLTZTJIkSZIkSVLabCZJkiRJkiQpbTaTJEmSJEmSlDabSZIkSZKk/78dOxAAAAAAEORvvcIAhRHAJpMAAAAA2GQSAAAAAJtMAgAAAGAL8fHayzR8PLkAAAAASUVORK5CYII="/>
-          <p:cNvSpPr>
-            <a:spLocks noChangeAspect="1" noChangeArrowheads="1"/>
-          </p:cNvSpPr>
-          <p:nvPr/>
-        </p:nvSpPr>
-        <p:spPr bwMode="auto">
-          <a:xfrm>
-            <a:off x="-1" y="-1"/>
-            <a:ext cx="1681163" cy="1681163"/>
-          </a:xfrm>
-          <a:prstGeom prst="rect">
-            <a:avLst/>
-          </a:prstGeom>
-          <a:noFill/>
-          <a:extLst>
-            <a:ext uri="{909E8E84-426E-40DD-AFC4-6F175D3DCCD1}">
-              <a14:hiddenFill xmlns:a14="http://schemas.microsoft.com/office/drawing/2010/main">
-                <a:solidFill>
-                  <a:srgbClr val="FFFFFF"/>
-                </a:solidFill>
-              </a14:hiddenFill>
-            </a:ext>
-          </a:extLst>
-        </p:spPr>
-        <p:txBody>
-          <a:bodyPr vert="horz" wrap="square" lIns="91440" tIns="45720" rIns="91440" bIns="45720" numCol="1" anchor="t" anchorCtr="0" compatLnSpc="1">
-            <a:prstTxWarp prst="textNoShape">
-              <a:avLst/>
-            </a:prstTxWarp>
-          </a:bodyPr>
-          <a:lstStyle/>
-          <a:p>
-            <a:endParaRPr lang="en-US"/>
-          </a:p>
-        </p:txBody>
-      </p:sp>
-    </p:spTree>
-    <p:extLst>
-      <p:ext uri="{BB962C8B-B14F-4D97-AF65-F5344CB8AC3E}">
-        <p14:creationId xmlns:p14="http://schemas.microsoft.com/office/powerpoint/2010/main" val="820200128"/>
-      </p:ext>
-    </p:extLst>
-  </p:cSld>
-  <p:clrMapOvr>
-    <a:masterClrMapping/>
-  </p:clrMapOvr>
-</p:sld>
-</file>
-
-<file path=ppt/slides/slide11.xml><?xml version="1.0" encoding="utf-8"?>
 <p:sld xmlns:a="http://schemas.openxmlformats.org/drawingml/2006/main" xmlns:r="http://schemas.openxmlformats.org/officeDocument/2006/relationships" xmlns:p="http://schemas.openxmlformats.org/presentationml/2006/main">
   <p:cSld>
     <p:spTree>
@@ -45439,6 +45141,66 @@
           </a:p>
         </p:txBody>
       </p:sp>
+      <p:sp>
+        <p:nvSpPr>
+          <p:cNvPr id="6" name="TextBox 5"/>
+          <p:cNvSpPr txBox="1"/>
+          <p:nvPr/>
+        </p:nvSpPr>
+        <p:spPr>
+          <a:xfrm rot="16200000">
+            <a:off x="5298827" y="3660536"/>
+            <a:ext cx="2198038" cy="246221"/>
+          </a:xfrm>
+          <a:prstGeom prst="rect">
+            <a:avLst/>
+          </a:prstGeom>
+          <a:noFill/>
+        </p:spPr>
+        <p:txBody>
+          <a:bodyPr wrap="none" rtlCol="0">
+            <a:spAutoFit/>
+          </a:bodyPr>
+          <a:lstStyle/>
+          <a:p>
+            <a:r>
+              <a:rPr lang="en-US" sz="1000" dirty="0" smtClean="0"/>
+              <a:t>Average within Cluster Sum of Squares</a:t>
+            </a:r>
+            <a:endParaRPr lang="en-US" sz="1000" dirty="0"/>
+          </a:p>
+        </p:txBody>
+      </p:sp>
+      <p:sp>
+        <p:nvSpPr>
+          <p:cNvPr id="12" name="TextBox 11"/>
+          <p:cNvSpPr txBox="1"/>
+          <p:nvPr/>
+        </p:nvSpPr>
+        <p:spPr>
+          <a:xfrm>
+            <a:off x="8456043" y="5100764"/>
+            <a:ext cx="1223412" cy="246221"/>
+          </a:xfrm>
+          <a:prstGeom prst="rect">
+            <a:avLst/>
+          </a:prstGeom>
+          <a:noFill/>
+        </p:spPr>
+        <p:txBody>
+          <a:bodyPr wrap="none" rtlCol="0">
+            <a:spAutoFit/>
+          </a:bodyPr>
+          <a:lstStyle/>
+          <a:p>
+            <a:r>
+              <a:rPr lang="en-US" sz="1000" dirty="0" smtClean="0"/>
+              <a:t>Number of Clusters</a:t>
+            </a:r>
+            <a:endParaRPr lang="en-US" sz="1000" dirty="0"/>
+          </a:p>
+        </p:txBody>
+      </p:sp>
     </p:spTree>
     <p:extLst>
       <p:ext uri="{BB962C8B-B14F-4D97-AF65-F5344CB8AC3E}">
@@ -45449,10 +45211,17 @@
   <p:clrMapOvr>
     <a:masterClrMapping/>
   </p:clrMapOvr>
+  <p:timing>
+    <p:tnLst>
+      <p:par>
+        <p:cTn id="1" dur="indefinite" restart="never" nodeType="tmRoot"/>
+      </p:par>
+    </p:tnLst>
+  </p:timing>
 </p:sld>
 </file>
 
-<file path=ppt/slides/slide12.xml><?xml version="1.0" encoding="utf-8"?>
+<file path=ppt/slides/slide11.xml><?xml version="1.0" encoding="utf-8"?>
 <p:sld xmlns:a="http://schemas.openxmlformats.org/drawingml/2006/main" xmlns:r="http://schemas.openxmlformats.org/officeDocument/2006/relationships" xmlns:p="http://schemas.openxmlformats.org/presentationml/2006/main">
   <p:cSld>
     <p:spTree>
@@ -45611,10 +45380,17 @@
   <p:clrMapOvr>
     <a:masterClrMapping/>
   </p:clrMapOvr>
+  <p:timing>
+    <p:tnLst>
+      <p:par>
+        <p:cTn id="1" dur="indefinite" restart="never" nodeType="tmRoot"/>
+      </p:par>
+    </p:tnLst>
+  </p:timing>
 </p:sld>
 </file>
 
-<file path=ppt/slides/slide13.xml><?xml version="1.0" encoding="utf-8"?>
+<file path=ppt/slides/slide12.xml><?xml version="1.0" encoding="utf-8"?>
 <p:sld xmlns:a="http://schemas.openxmlformats.org/drawingml/2006/main" xmlns:r="http://schemas.openxmlformats.org/officeDocument/2006/relationships" xmlns:p="http://schemas.openxmlformats.org/presentationml/2006/main">
   <p:cSld>
     <p:spTree>
@@ -45750,10 +45526,17 @@
   <p:clrMapOvr>
     <a:masterClrMapping/>
   </p:clrMapOvr>
+  <p:timing>
+    <p:tnLst>
+      <p:par>
+        <p:cTn id="1" dur="indefinite" restart="never" nodeType="tmRoot"/>
+      </p:par>
+    </p:tnLst>
+  </p:timing>
 </p:sld>
 </file>
 
-<file path=ppt/slides/slide14.xml><?xml version="1.0" encoding="utf-8"?>
+<file path=ppt/slides/slide13.xml><?xml version="1.0" encoding="utf-8"?>
 <p:sld xmlns:a="http://schemas.openxmlformats.org/drawingml/2006/main" xmlns:r="http://schemas.openxmlformats.org/officeDocument/2006/relationships" xmlns:p="http://schemas.openxmlformats.org/presentationml/2006/main">
   <p:cSld>
     <p:spTree>
@@ -45894,10 +45677,17 @@
   <p:clrMapOvr>
     <a:masterClrMapping/>
   </p:clrMapOvr>
+  <p:timing>
+    <p:tnLst>
+      <p:par>
+        <p:cTn id="1" dur="indefinite" restart="never" nodeType="tmRoot"/>
+      </p:par>
+    </p:tnLst>
+  </p:timing>
 </p:sld>
 </file>
 
-<file path=ppt/slides/slide15.xml><?xml version="1.0" encoding="utf-8"?>
+<file path=ppt/slides/slide14.xml><?xml version="1.0" encoding="utf-8"?>
 <p:sld xmlns:a="http://schemas.openxmlformats.org/drawingml/2006/main" xmlns:r="http://schemas.openxmlformats.org/officeDocument/2006/relationships" xmlns:p="http://schemas.openxmlformats.org/presentationml/2006/main">
   <p:cSld>
     <p:spTree>
@@ -46061,10 +45851,17 @@
   <p:clrMapOvr>
     <a:masterClrMapping/>
   </p:clrMapOvr>
+  <p:timing>
+    <p:tnLst>
+      <p:par>
+        <p:cTn id="1" dur="indefinite" restart="never" nodeType="tmRoot"/>
+      </p:par>
+    </p:tnLst>
+  </p:timing>
 </p:sld>
 </file>
 
-<file path=ppt/slides/slide16.xml><?xml version="1.0" encoding="utf-8"?>
+<file path=ppt/slides/slide15.xml><?xml version="1.0" encoding="utf-8"?>
 <p:sld xmlns:a="http://schemas.openxmlformats.org/drawingml/2006/main" xmlns:r="http://schemas.openxmlformats.org/officeDocument/2006/relationships" xmlns:p="http://schemas.openxmlformats.org/presentationml/2006/main">
   <p:cSld>
     <p:spTree>
@@ -46209,10 +46006,17 @@
   <p:clrMapOvr>
     <a:masterClrMapping/>
   </p:clrMapOvr>
+  <p:timing>
+    <p:tnLst>
+      <p:par>
+        <p:cTn id="1" dur="indefinite" restart="never" nodeType="tmRoot"/>
+      </p:par>
+    </p:tnLst>
+  </p:timing>
 </p:sld>
 </file>
 
-<file path=ppt/slides/slide17.xml><?xml version="1.0" encoding="utf-8"?>
+<file path=ppt/slides/slide16.xml><?xml version="1.0" encoding="utf-8"?>
 <p:sld xmlns:a="http://schemas.openxmlformats.org/drawingml/2006/main" xmlns:r="http://schemas.openxmlformats.org/officeDocument/2006/relationships" xmlns:p="http://schemas.openxmlformats.org/presentationml/2006/main">
   <p:cSld>
     <p:spTree>
@@ -46355,10 +46159,17 @@
   <p:clrMapOvr>
     <a:masterClrMapping/>
   </p:clrMapOvr>
+  <p:timing>
+    <p:tnLst>
+      <p:par>
+        <p:cTn id="1" dur="indefinite" restart="never" nodeType="tmRoot"/>
+      </p:par>
+    </p:tnLst>
+  </p:timing>
 </p:sld>
 </file>
 
-<file path=ppt/slides/slide18.xml><?xml version="1.0" encoding="utf-8"?>
+<file path=ppt/slides/slide17.xml><?xml version="1.0" encoding="utf-8"?>
 <p:sld xmlns:a="http://schemas.openxmlformats.org/drawingml/2006/main" xmlns:r="http://schemas.openxmlformats.org/officeDocument/2006/relationships" xmlns:p="http://schemas.openxmlformats.org/presentationml/2006/main">
   <p:cSld>
     <p:spTree>
@@ -46449,10 +46260,17 @@
   <p:clrMapOvr>
     <a:masterClrMapping/>
   </p:clrMapOvr>
+  <p:timing>
+    <p:tnLst>
+      <p:par>
+        <p:cTn id="1" dur="indefinite" restart="never" nodeType="tmRoot"/>
+      </p:par>
+    </p:tnLst>
+  </p:timing>
 </p:sld>
 </file>
 
-<file path=ppt/slides/slide19.xml><?xml version="1.0" encoding="utf-8"?>
+<file path=ppt/slides/slide18.xml><?xml version="1.0" encoding="utf-8"?>
 <p:sld xmlns:a="http://schemas.openxmlformats.org/drawingml/2006/main" xmlns:r="http://schemas.openxmlformats.org/officeDocument/2006/relationships" xmlns:p="http://schemas.openxmlformats.org/presentationml/2006/main">
   <p:cSld>
     <p:spTree>
@@ -47091,84 +46909,17 @@
   <p:clrMapOvr>
     <a:masterClrMapping/>
   </p:clrMapOvr>
+  <p:timing>
+    <p:tnLst>
+      <p:par>
+        <p:cTn id="1" dur="indefinite" restart="never" nodeType="tmRoot"/>
+      </p:par>
+    </p:tnLst>
+  </p:timing>
 </p:sld>
 </file>
 
-<file path=ppt/slides/slide2.xml><?xml version="1.0" encoding="utf-8"?>
-<p:sld xmlns:a="http://schemas.openxmlformats.org/drawingml/2006/main" xmlns:r="http://schemas.openxmlformats.org/officeDocument/2006/relationships" xmlns:p="http://schemas.openxmlformats.org/presentationml/2006/main">
-  <p:cSld>
-    <p:spTree>
-      <p:nvGrpSpPr>
-        <p:cNvPr id="1" name=""/>
-        <p:cNvGrpSpPr/>
-        <p:nvPr/>
-      </p:nvGrpSpPr>
-      <p:grpSpPr>
-        <a:xfrm>
-          <a:off x="0" y="0"/>
-          <a:ext cx="0" cy="0"/>
-          <a:chOff x="0" y="0"/>
-          <a:chExt cx="0" cy="0"/>
-        </a:xfrm>
-      </p:grpSpPr>
-      <p:graphicFrame>
-        <p:nvGraphicFramePr>
-          <p:cNvPr id="4" name="Diagram 3"/>
-          <p:cNvGraphicFramePr/>
-          <p:nvPr>
-            <p:extLst>
-              <p:ext uri="{D42A27DB-BD31-4B8C-83A1-F6EECF244321}">
-                <p14:modId xmlns:p14="http://schemas.microsoft.com/office/powerpoint/2010/main" val="1174036082"/>
-              </p:ext>
-            </p:extLst>
-          </p:nvPr>
-        </p:nvGraphicFramePr>
-        <p:xfrm>
-          <a:off x="351692" y="719666"/>
-          <a:ext cx="11535508" cy="4045765"/>
-        </p:xfrm>
-        <a:graphic>
-          <a:graphicData uri="http://schemas.openxmlformats.org/drawingml/2006/diagram">
-            <dgm:relIds xmlns:dgm="http://schemas.openxmlformats.org/drawingml/2006/diagram" xmlns:r="http://schemas.openxmlformats.org/officeDocument/2006/relationships" r:dm="rId2" r:lo="rId3" r:qs="rId4" r:cs="rId5"/>
-          </a:graphicData>
-        </a:graphic>
-      </p:graphicFrame>
-      <p:graphicFrame>
-        <p:nvGraphicFramePr>
-          <p:cNvPr id="6" name="Diagram 5"/>
-          <p:cNvGraphicFramePr/>
-          <p:nvPr>
-            <p:extLst>
-              <p:ext uri="{D42A27DB-BD31-4B8C-83A1-F6EECF244321}">
-                <p14:modId xmlns:p14="http://schemas.microsoft.com/office/powerpoint/2010/main" val="815968651"/>
-              </p:ext>
-            </p:extLst>
-          </p:nvPr>
-        </p:nvGraphicFramePr>
-        <p:xfrm>
-          <a:off x="3966308" y="3647503"/>
-          <a:ext cx="3559908" cy="2831123"/>
-        </p:xfrm>
-        <a:graphic>
-          <a:graphicData uri="http://schemas.openxmlformats.org/drawingml/2006/diagram">
-            <dgm:relIds xmlns:dgm="http://schemas.openxmlformats.org/drawingml/2006/diagram" xmlns:r="http://schemas.openxmlformats.org/officeDocument/2006/relationships" r:dm="rId7" r:lo="rId8" r:qs="rId9" r:cs="rId10"/>
-          </a:graphicData>
-        </a:graphic>
-      </p:graphicFrame>
-    </p:spTree>
-    <p:extLst>
-      <p:ext uri="{BB962C8B-B14F-4D97-AF65-F5344CB8AC3E}">
-        <p14:creationId xmlns:p14="http://schemas.microsoft.com/office/powerpoint/2010/main" val="960302610"/>
-      </p:ext>
-    </p:extLst>
-  </p:cSld>
-  <p:clrMapOvr>
-    <a:masterClrMapping/>
-  </p:clrMapOvr>
-</p:sld>
-</file>
-
-<file path=ppt/slides/slide20.xml><?xml version="1.0" encoding="utf-8"?>
+<file path=ppt/slides/slide19.xml><?xml version="1.0" encoding="utf-8"?>
 <p:sld xmlns:a="http://schemas.openxmlformats.org/drawingml/2006/main" xmlns:r="http://schemas.openxmlformats.org/officeDocument/2006/relationships" xmlns:p="http://schemas.openxmlformats.org/presentationml/2006/main">
   <p:cSld>
     <p:spTree>
@@ -47273,10 +47024,98 @@
   <p:clrMapOvr>
     <a:masterClrMapping/>
   </p:clrMapOvr>
+  <p:timing>
+    <p:tnLst>
+      <p:par>
+        <p:cTn id="1" dur="indefinite" restart="never" nodeType="tmRoot"/>
+      </p:par>
+    </p:tnLst>
+  </p:timing>
 </p:sld>
 </file>
 
-<file path=ppt/slides/slide21.xml><?xml version="1.0" encoding="utf-8"?>
+<file path=ppt/slides/slide2.xml><?xml version="1.0" encoding="utf-8"?>
+<p:sld xmlns:a="http://schemas.openxmlformats.org/drawingml/2006/main" xmlns:r="http://schemas.openxmlformats.org/officeDocument/2006/relationships" xmlns:p="http://schemas.openxmlformats.org/presentationml/2006/main">
+  <p:cSld>
+    <p:spTree>
+      <p:nvGrpSpPr>
+        <p:cNvPr id="1" name=""/>
+        <p:cNvGrpSpPr/>
+        <p:nvPr/>
+      </p:nvGrpSpPr>
+      <p:grpSpPr>
+        <a:xfrm>
+          <a:off x="0" y="0"/>
+          <a:ext cx="0" cy="0"/>
+          <a:chOff x="0" y="0"/>
+          <a:chExt cx="0" cy="0"/>
+        </a:xfrm>
+      </p:grpSpPr>
+      <p:graphicFrame>
+        <p:nvGraphicFramePr>
+          <p:cNvPr id="4" name="Diagram 3"/>
+          <p:cNvGraphicFramePr/>
+          <p:nvPr>
+            <p:extLst>
+              <p:ext uri="{D42A27DB-BD31-4B8C-83A1-F6EECF244321}">
+                <p14:modId xmlns:p14="http://schemas.microsoft.com/office/powerpoint/2010/main" val="1174036082"/>
+              </p:ext>
+            </p:extLst>
+          </p:nvPr>
+        </p:nvGraphicFramePr>
+        <p:xfrm>
+          <a:off x="351692" y="719666"/>
+          <a:ext cx="11535508" cy="4045765"/>
+        </p:xfrm>
+        <a:graphic>
+          <a:graphicData uri="http://schemas.openxmlformats.org/drawingml/2006/diagram">
+            <dgm:relIds xmlns:dgm="http://schemas.openxmlformats.org/drawingml/2006/diagram" xmlns:r="http://schemas.openxmlformats.org/officeDocument/2006/relationships" r:dm="rId2" r:lo="rId3" r:qs="rId4" r:cs="rId5"/>
+          </a:graphicData>
+        </a:graphic>
+      </p:graphicFrame>
+      <p:graphicFrame>
+        <p:nvGraphicFramePr>
+          <p:cNvPr id="6" name="Diagram 5"/>
+          <p:cNvGraphicFramePr/>
+          <p:nvPr>
+            <p:extLst>
+              <p:ext uri="{D42A27DB-BD31-4B8C-83A1-F6EECF244321}">
+                <p14:modId xmlns:p14="http://schemas.microsoft.com/office/powerpoint/2010/main" val="815968651"/>
+              </p:ext>
+            </p:extLst>
+          </p:nvPr>
+        </p:nvGraphicFramePr>
+        <p:xfrm>
+          <a:off x="3966308" y="3647503"/>
+          <a:ext cx="3559908" cy="2831123"/>
+        </p:xfrm>
+        <a:graphic>
+          <a:graphicData uri="http://schemas.openxmlformats.org/drawingml/2006/diagram">
+            <dgm:relIds xmlns:dgm="http://schemas.openxmlformats.org/drawingml/2006/diagram" xmlns:r="http://schemas.openxmlformats.org/officeDocument/2006/relationships" r:dm="rId7" r:lo="rId8" r:qs="rId9" r:cs="rId10"/>
+          </a:graphicData>
+        </a:graphic>
+      </p:graphicFrame>
+    </p:spTree>
+    <p:extLst>
+      <p:ext uri="{BB962C8B-B14F-4D97-AF65-F5344CB8AC3E}">
+        <p14:creationId xmlns:p14="http://schemas.microsoft.com/office/powerpoint/2010/main" val="960302610"/>
+      </p:ext>
+    </p:extLst>
+  </p:cSld>
+  <p:clrMapOvr>
+    <a:masterClrMapping/>
+  </p:clrMapOvr>
+  <p:timing>
+    <p:tnLst>
+      <p:par>
+        <p:cTn id="1" dur="indefinite" restart="never" nodeType="tmRoot"/>
+      </p:par>
+    </p:tnLst>
+  </p:timing>
+</p:sld>
+</file>
+
+<file path=ppt/slides/slide20.xml><?xml version="1.0" encoding="utf-8"?>
 <p:sld xmlns:a="http://schemas.openxmlformats.org/drawingml/2006/main" xmlns:r="http://schemas.openxmlformats.org/officeDocument/2006/relationships" xmlns:p="http://schemas.openxmlformats.org/presentationml/2006/main">
   <p:cSld>
     <p:spTree>
@@ -47380,10 +47219,17 @@
   <p:clrMapOvr>
     <a:masterClrMapping/>
   </p:clrMapOvr>
+  <p:timing>
+    <p:tnLst>
+      <p:par>
+        <p:cTn id="1" dur="indefinite" restart="never" nodeType="tmRoot"/>
+      </p:par>
+    </p:tnLst>
+  </p:timing>
 </p:sld>
 </file>
 
-<file path=ppt/slides/slide22.xml><?xml version="1.0" encoding="utf-8"?>
+<file path=ppt/slides/slide21.xml><?xml version="1.0" encoding="utf-8"?>
 <p:sld xmlns:a="http://schemas.openxmlformats.org/drawingml/2006/main" xmlns:r="http://schemas.openxmlformats.org/officeDocument/2006/relationships" xmlns:p="http://schemas.openxmlformats.org/presentationml/2006/main">
   <p:cSld>
     <p:spTree>
@@ -47475,10 +47321,17 @@
   <p:clrMapOvr>
     <a:masterClrMapping/>
   </p:clrMapOvr>
+  <p:timing>
+    <p:tnLst>
+      <p:par>
+        <p:cTn id="1" dur="indefinite" restart="never" nodeType="tmRoot"/>
+      </p:par>
+    </p:tnLst>
+  </p:timing>
 </p:sld>
 </file>
 
-<file path=ppt/slides/slide23.xml><?xml version="1.0" encoding="utf-8"?>
+<file path=ppt/slides/slide22.xml><?xml version="1.0" encoding="utf-8"?>
 <p:sld xmlns:a="http://schemas.openxmlformats.org/drawingml/2006/main" xmlns:r="http://schemas.openxmlformats.org/officeDocument/2006/relationships" xmlns:p="http://schemas.openxmlformats.org/presentationml/2006/main">
   <p:cSld>
     <p:spTree>
@@ -47583,10 +47436,17 @@
   <p:clrMapOvr>
     <a:masterClrMapping/>
   </p:clrMapOvr>
+  <p:timing>
+    <p:tnLst>
+      <p:par>
+        <p:cTn id="1" dur="indefinite" restart="never" nodeType="tmRoot"/>
+      </p:par>
+    </p:tnLst>
+  </p:timing>
 </p:sld>
 </file>
 
-<file path=ppt/slides/slide24.xml><?xml version="1.0" encoding="utf-8"?>
+<file path=ppt/slides/slide23.xml><?xml version="1.0" encoding="utf-8"?>
 <p:sld xmlns:a="http://schemas.openxmlformats.org/drawingml/2006/main" xmlns:r="http://schemas.openxmlformats.org/officeDocument/2006/relationships" xmlns:p="http://schemas.openxmlformats.org/presentationml/2006/main">
   <p:cSld>
     <p:spTree>
@@ -47695,10 +47555,17 @@
   <p:clrMapOvr>
     <a:masterClrMapping/>
   </p:clrMapOvr>
+  <p:timing>
+    <p:tnLst>
+      <p:par>
+        <p:cTn id="1" dur="indefinite" restart="never" nodeType="tmRoot"/>
+      </p:par>
+    </p:tnLst>
+  </p:timing>
 </p:sld>
 </file>
 
-<file path=ppt/slides/slide25.xml><?xml version="1.0" encoding="utf-8"?>
+<file path=ppt/slides/slide24.xml><?xml version="1.0" encoding="utf-8"?>
 <p:sld xmlns:a="http://schemas.openxmlformats.org/drawingml/2006/main" xmlns:r="http://schemas.openxmlformats.org/officeDocument/2006/relationships" xmlns:p="http://schemas.openxmlformats.org/presentationml/2006/main">
   <p:cSld>
     <p:spTree>
@@ -47807,10 +47674,17 @@
   <p:clrMapOvr>
     <a:masterClrMapping/>
   </p:clrMapOvr>
+  <p:timing>
+    <p:tnLst>
+      <p:par>
+        <p:cTn id="1" dur="indefinite" restart="never" nodeType="tmRoot"/>
+      </p:par>
+    </p:tnLst>
+  </p:timing>
 </p:sld>
 </file>
 
-<file path=ppt/slides/slide26.xml><?xml version="1.0" encoding="utf-8"?>
+<file path=ppt/slides/slide25.xml><?xml version="1.0" encoding="utf-8"?>
 <p:sld xmlns:a="http://schemas.openxmlformats.org/drawingml/2006/main" xmlns:r="http://schemas.openxmlformats.org/officeDocument/2006/relationships" xmlns:p="http://schemas.openxmlformats.org/presentationml/2006/main">
   <p:cSld>
     <p:spTree>
@@ -47919,10 +47793,17 @@
   <p:clrMapOvr>
     <a:masterClrMapping/>
   </p:clrMapOvr>
+  <p:timing>
+    <p:tnLst>
+      <p:par>
+        <p:cTn id="1" dur="indefinite" restart="never" nodeType="tmRoot"/>
+      </p:par>
+    </p:tnLst>
+  </p:timing>
 </p:sld>
 </file>
 
-<file path=ppt/slides/slide27.xml><?xml version="1.0" encoding="utf-8"?>
+<file path=ppt/slides/slide26.xml><?xml version="1.0" encoding="utf-8"?>
 <p:sld xmlns:a="http://schemas.openxmlformats.org/drawingml/2006/main" xmlns:r="http://schemas.openxmlformats.org/officeDocument/2006/relationships" xmlns:p="http://schemas.openxmlformats.org/presentationml/2006/main">
   <p:cSld>
     <p:spTree>
@@ -48031,6 +47912,13 @@
   <p:clrMapOvr>
     <a:masterClrMapping/>
   </p:clrMapOvr>
+  <p:timing>
+    <p:tnLst>
+      <p:par>
+        <p:cTn id="1" dur="indefinite" restart="never" nodeType="tmRoot"/>
+      </p:par>
+    </p:tnLst>
+  </p:timing>
 </p:sld>
 </file>
 
@@ -48153,6 +48041,13 @@
   <p:clrMapOvr>
     <a:masterClrMapping/>
   </p:clrMapOvr>
+  <p:timing>
+    <p:tnLst>
+      <p:par>
+        <p:cTn id="1" dur="indefinite" restart="never" nodeType="tmRoot"/>
+      </p:par>
+    </p:tnLst>
+  </p:timing>
 </p:sld>
 </file>
 
@@ -48439,6 +48334,13 @@
   <p:clrMapOvr>
     <a:masterClrMapping/>
   </p:clrMapOvr>
+  <p:timing>
+    <p:tnLst>
+      <p:par>
+        <p:cTn id="1" dur="indefinite" restart="never" nodeType="tmRoot"/>
+      </p:par>
+    </p:tnLst>
+  </p:timing>
 </p:sld>
 </file>
 
@@ -48549,6 +48451,13 @@
   <p:clrMapOvr>
     <a:masterClrMapping/>
   </p:clrMapOvr>
+  <p:timing>
+    <p:tnLst>
+      <p:par>
+        <p:cTn id="1" dur="indefinite" restart="never" nodeType="tmRoot"/>
+      </p:par>
+    </p:tnLst>
+  </p:timing>
 </p:sld>
 </file>
 
@@ -48694,6 +48603,13 @@
   <p:clrMapOvr>
     <a:masterClrMapping/>
   </p:clrMapOvr>
+  <p:timing>
+    <p:tnLst>
+      <p:par>
+        <p:cTn id="1" dur="indefinite" restart="never" nodeType="tmRoot"/>
+      </p:par>
+    </p:tnLst>
+  </p:timing>
 </p:sld>
 </file>
 
@@ -48816,6 +48732,13 @@
   <p:clrMapOvr>
     <a:masterClrMapping/>
   </p:clrMapOvr>
+  <p:timing>
+    <p:tnLst>
+      <p:par>
+        <p:cTn id="1" dur="indefinite" restart="never" nodeType="tmRoot"/>
+      </p:par>
+    </p:tnLst>
+  </p:timing>
 </p:sld>
 </file>
 
@@ -48846,7 +48769,12 @@
             <p:ph type="title"/>
           </p:nvPr>
         </p:nvSpPr>
-        <p:spPr/>
+        <p:spPr>
+          <a:xfrm>
+            <a:off x="351823" y="365125"/>
+            <a:ext cx="10515600" cy="1325563"/>
+          </a:xfrm>
+        </p:spPr>
         <p:txBody>
           <a:bodyPr/>
           <a:lstStyle/>
@@ -48873,9 +48801,16 @@
             <p:ph idx="1"/>
           </p:nvPr>
         </p:nvSpPr>
-        <p:spPr/>
+        <p:spPr>
+          <a:xfrm>
+            <a:off x="838200" y="1631075"/>
+            <a:ext cx="6379723" cy="4351338"/>
+          </a:xfrm>
+        </p:spPr>
         <p:txBody>
-          <a:bodyPr/>
+          <a:bodyPr>
+            <a:normAutofit fontScale="92500"/>
+          </a:bodyPr>
           <a:lstStyle/>
           <a:p>
             <a:r>
@@ -48984,6 +48919,41 @@
           </a:p>
         </p:txBody>
       </p:sp>
+      <p:pic>
+        <p:nvPicPr>
+          <p:cNvPr id="4" name="Picture 3"/>
+          <p:cNvPicPr>
+            <a:picLocks noChangeAspect="1"/>
+          </p:cNvPicPr>
+          <p:nvPr/>
+        </p:nvPicPr>
+        <p:blipFill>
+          <a:blip r:embed="rId2">
+            <a:extLst>
+              <a:ext uri="{28A0092B-C50C-407E-A947-70E740481C1C}">
+                <a14:useLocalDpi xmlns:a14="http://schemas.microsoft.com/office/drawing/2010/main" val="0"/>
+              </a:ext>
+            </a:extLst>
+          </a:blip>
+          <a:stretch>
+            <a:fillRect/>
+          </a:stretch>
+        </p:blipFill>
+        <p:spPr>
+          <a:xfrm>
+            <a:off x="7615206" y="1805818"/>
+            <a:ext cx="4312420" cy="3383280"/>
+          </a:xfrm>
+          <a:prstGeom prst="rect">
+            <a:avLst/>
+          </a:prstGeom>
+          <a:ln w="3175">
+            <a:solidFill>
+              <a:schemeClr val="tx1"/>
+            </a:solidFill>
+          </a:ln>
+        </p:spPr>
+      </p:pic>
     </p:spTree>
     <p:extLst>
       <p:ext uri="{BB962C8B-B14F-4D97-AF65-F5344CB8AC3E}">
@@ -48994,6 +48964,13 @@
   <p:clrMapOvr>
     <a:masterClrMapping/>
   </p:clrMapOvr>
+  <p:timing>
+    <p:tnLst>
+      <p:par>
+        <p:cTn id="1" dur="indefinite" restart="never" nodeType="tmRoot"/>
+      </p:par>
+    </p:tnLst>
+  </p:timing>
 </p:sld>
 </file>
 
@@ -49149,6 +49126,13 @@
   <p:clrMapOvr>
     <a:masterClrMapping/>
   </p:clrMapOvr>
+  <p:timing>
+    <p:tnLst>
+      <p:par>
+        <p:cTn id="1" dur="indefinite" restart="never" nodeType="tmRoot"/>
+      </p:par>
+    </p:tnLst>
+  </p:timing>
 </p:sld>
 </file>
 

</xml_diff>

<commit_message>
added Random Foresr Classifier 10k Cross Validation
</commit_message>
<xml_diff>
--- a/Current_Powerpoint/Froyo_v2.pptx
+++ b/Current_Powerpoint/Froyo_v2.pptx
@@ -5,7 +5,7 @@
     <p:sldMasterId id="2147483768" r:id="rId1"/>
   </p:sldMasterIdLst>
   <p:notesMasterIdLst>
-    <p:notesMasterId r:id="rId28"/>
+    <p:notesMasterId r:id="rId29"/>
   </p:notesMasterIdLst>
   <p:sldIdLst>
     <p:sldId id="256" r:id="rId2"/>
@@ -33,7 +33,8 @@
     <p:sldId id="266" r:id="rId24"/>
     <p:sldId id="267" r:id="rId25"/>
     <p:sldId id="268" r:id="rId26"/>
-    <p:sldId id="269" r:id="rId27"/>
+    <p:sldId id="286" r:id="rId27"/>
+    <p:sldId id="269" r:id="rId28"/>
   </p:sldIdLst>
   <p:sldSz cx="12192000" cy="6858000"/>
   <p:notesSz cx="6858000" cy="9144000"/>
@@ -15000,19 +15001,19 @@
     </dgm:pt>
   </dgm:ptLst>
   <dgm:cxnLst>
-    <dgm:cxn modelId="{F2BBE171-C299-F84A-AF45-099B9FB001DC}" srcId="{C342DEE3-523F-F042-BEFB-F64A1DCBA45E}" destId="{57E707D1-F904-3C4D-A97D-6344FC1412CE}" srcOrd="5" destOrd="0" parTransId="{35C4A167-B549-0641-BB3E-8676FD9856A0}" sibTransId="{C502865C-5A96-DE48-8F6A-474069216E46}"/>
+    <dgm:cxn modelId="{A501AB1F-C48B-CF4A-B99B-4AA5D3EFA962}" type="presOf" srcId="{4DB998AD-7927-5B4C-AF89-5EC4A18A0E00}" destId="{7A1517E1-0C42-0D4D-98F3-06E91C77CB05}" srcOrd="0" destOrd="0" presId="urn:microsoft.com/office/officeart/2005/8/layout/chevron1"/>
+    <dgm:cxn modelId="{B8CCD691-FA78-8A40-A4CB-AD1A416DCD69}" type="presOf" srcId="{6C924822-371E-0743-AFA9-944C89D688C1}" destId="{533FC013-F1B4-4A4E-B674-EA2CDC4961EC}" srcOrd="0" destOrd="0" presId="urn:microsoft.com/office/officeart/2005/8/layout/chevron1"/>
     <dgm:cxn modelId="{36784185-354A-3D4D-9012-9F185ADE69E0}" srcId="{C342DEE3-523F-F042-BEFB-F64A1DCBA45E}" destId="{6C924822-371E-0743-AFA9-944C89D688C1}" srcOrd="4" destOrd="0" parTransId="{2103148D-D9C9-544C-B4BC-5161440FB982}" sibTransId="{FBD03F35-4A8D-9143-BBCF-051998EFEB7C}"/>
+    <dgm:cxn modelId="{B549CA95-87FD-C54F-B73B-8B3C79D9AC26}" type="presOf" srcId="{57E707D1-F904-3C4D-A97D-6344FC1412CE}" destId="{C7F9B645-B258-904C-9D96-0FA22C0437A5}" srcOrd="0" destOrd="0" presId="urn:microsoft.com/office/officeart/2005/8/layout/chevron1"/>
+    <dgm:cxn modelId="{C5C4388B-8DE2-B341-ADD5-C669514F6A19}" srcId="{C342DEE3-523F-F042-BEFB-F64A1DCBA45E}" destId="{5A14CE9C-E1CE-DE41-BDF2-3CBF4DA264D3}" srcOrd="2" destOrd="0" parTransId="{5796F029-A6DC-0640-BD44-36CFEC161F77}" sibTransId="{1F252E0E-FABC-5D46-AC00-04EE83115A0B}"/>
     <dgm:cxn modelId="{AC1B6D78-1ACA-4545-AF88-5850E52918E4}" srcId="{C342DEE3-523F-F042-BEFB-F64A1DCBA45E}" destId="{863EAE21-0F44-0945-BE24-14E4AABC434B}" srcOrd="0" destOrd="0" parTransId="{EA52A9BA-4055-DF4C-B700-7421C53B81CD}" sibTransId="{31727A54-5C06-2D40-97C1-9233089A8746}"/>
-    <dgm:cxn modelId="{1E9F67E7-8E1A-D64E-A014-9D0E3F7459B9}" type="presOf" srcId="{863EAE21-0F44-0945-BE24-14E4AABC434B}" destId="{6E009E9B-8246-3F40-8AC3-5B38E276B2E5}" srcOrd="0" destOrd="0" presId="urn:microsoft.com/office/officeart/2005/8/layout/chevron1"/>
-    <dgm:cxn modelId="{B8CCD691-FA78-8A40-A4CB-AD1A416DCD69}" type="presOf" srcId="{6C924822-371E-0743-AFA9-944C89D688C1}" destId="{533FC013-F1B4-4A4E-B674-EA2CDC4961EC}" srcOrd="0" destOrd="0" presId="urn:microsoft.com/office/officeart/2005/8/layout/chevron1"/>
     <dgm:cxn modelId="{8AEDE119-DE46-004E-A59F-36ACF39BB122}" srcId="{C342DEE3-523F-F042-BEFB-F64A1DCBA45E}" destId="{4DB998AD-7927-5B4C-AF89-5EC4A18A0E00}" srcOrd="1" destOrd="0" parTransId="{03434AE9-AC8A-D244-B7A2-368B3EC34B6A}" sibTransId="{24B0A873-889B-5B48-A0E7-28E5941CF1AF}"/>
     <dgm:cxn modelId="{D1E78733-E6DB-054F-AECE-C0799200DD21}" srcId="{C342DEE3-523F-F042-BEFB-F64A1DCBA45E}" destId="{CBC5D955-9480-C34A-9992-5AEB203E5BC9}" srcOrd="3" destOrd="0" parTransId="{02C25EEB-A6CF-7240-AAF8-7BE8B400F120}" sibTransId="{02FE6EA8-38A5-C644-9C11-BEC99916A05B}"/>
-    <dgm:cxn modelId="{B549CA95-87FD-C54F-B73B-8B3C79D9AC26}" type="presOf" srcId="{57E707D1-F904-3C4D-A97D-6344FC1412CE}" destId="{C7F9B645-B258-904C-9D96-0FA22C0437A5}" srcOrd="0" destOrd="0" presId="urn:microsoft.com/office/officeart/2005/8/layout/chevron1"/>
-    <dgm:cxn modelId="{A501AB1F-C48B-CF4A-B99B-4AA5D3EFA962}" type="presOf" srcId="{4DB998AD-7927-5B4C-AF89-5EC4A18A0E00}" destId="{7A1517E1-0C42-0D4D-98F3-06E91C77CB05}" srcOrd="0" destOrd="0" presId="urn:microsoft.com/office/officeart/2005/8/layout/chevron1"/>
-    <dgm:cxn modelId="{84D2DF09-D179-1D41-8303-4FD5483057D5}" type="presOf" srcId="{C342DEE3-523F-F042-BEFB-F64A1DCBA45E}" destId="{8898722C-92A5-0841-BFAE-36271E307C60}" srcOrd="0" destOrd="0" presId="urn:microsoft.com/office/officeart/2005/8/layout/chevron1"/>
+    <dgm:cxn modelId="{F2BBE171-C299-F84A-AF45-099B9FB001DC}" srcId="{C342DEE3-523F-F042-BEFB-F64A1DCBA45E}" destId="{57E707D1-F904-3C4D-A97D-6344FC1412CE}" srcOrd="5" destOrd="0" parTransId="{35C4A167-B549-0641-BB3E-8676FD9856A0}" sibTransId="{C502865C-5A96-DE48-8F6A-474069216E46}"/>
     <dgm:cxn modelId="{67BC749B-F74A-B74B-BAF8-66EA23CE86CB}" type="presOf" srcId="{5A14CE9C-E1CE-DE41-BDF2-3CBF4DA264D3}" destId="{FE2950AF-BECC-C943-BCDF-474567D4A57C}" srcOrd="0" destOrd="0" presId="urn:microsoft.com/office/officeart/2005/8/layout/chevron1"/>
     <dgm:cxn modelId="{C12A230D-499A-F24C-9D16-7C6595636BD9}" type="presOf" srcId="{CBC5D955-9480-C34A-9992-5AEB203E5BC9}" destId="{603CE2A6-86A6-1C4A-A190-ECE2FFE685A6}" srcOrd="0" destOrd="0" presId="urn:microsoft.com/office/officeart/2005/8/layout/chevron1"/>
-    <dgm:cxn modelId="{C5C4388B-8DE2-B341-ADD5-C669514F6A19}" srcId="{C342DEE3-523F-F042-BEFB-F64A1DCBA45E}" destId="{5A14CE9C-E1CE-DE41-BDF2-3CBF4DA264D3}" srcOrd="2" destOrd="0" parTransId="{5796F029-A6DC-0640-BD44-36CFEC161F77}" sibTransId="{1F252E0E-FABC-5D46-AC00-04EE83115A0B}"/>
+    <dgm:cxn modelId="{1E9F67E7-8E1A-D64E-A014-9D0E3F7459B9}" type="presOf" srcId="{863EAE21-0F44-0945-BE24-14E4AABC434B}" destId="{6E009E9B-8246-3F40-8AC3-5B38E276B2E5}" srcOrd="0" destOrd="0" presId="urn:microsoft.com/office/officeart/2005/8/layout/chevron1"/>
+    <dgm:cxn modelId="{84D2DF09-D179-1D41-8303-4FD5483057D5}" type="presOf" srcId="{C342DEE3-523F-F042-BEFB-F64A1DCBA45E}" destId="{8898722C-92A5-0841-BFAE-36271E307C60}" srcOrd="0" destOrd="0" presId="urn:microsoft.com/office/officeart/2005/8/layout/chevron1"/>
     <dgm:cxn modelId="{EF53FCA2-888B-8D48-8FBA-7FB9EC88D2DC}" type="presParOf" srcId="{8898722C-92A5-0841-BFAE-36271E307C60}" destId="{6E009E9B-8246-3F40-8AC3-5B38E276B2E5}" srcOrd="0" destOrd="0" presId="urn:microsoft.com/office/officeart/2005/8/layout/chevron1"/>
     <dgm:cxn modelId="{D8445EB8-A7A8-EF42-9571-2543A8236074}" type="presParOf" srcId="{8898722C-92A5-0841-BFAE-36271E307C60}" destId="{2BFA86B6-15A1-9F4F-B58C-6929C70F588F}" srcOrd="1" destOrd="0" presId="urn:microsoft.com/office/officeart/2005/8/layout/chevron1"/>
     <dgm:cxn modelId="{0B5D938C-5432-CB47-A347-68B089FBF3EF}" type="presParOf" srcId="{8898722C-92A5-0841-BFAE-36271E307C60}" destId="{7A1517E1-0C42-0D4D-98F3-06E91C77CB05}" srcOrd="2" destOrd="0" presId="urn:microsoft.com/office/officeart/2005/8/layout/chevron1"/>
@@ -41797,6 +41798,90 @@
 </p:notes>
 </file>
 
+<file path=ppt/notesSlides/notesSlide5.xml><?xml version="1.0" encoding="utf-8"?>
+<p:notes xmlns:a="http://schemas.openxmlformats.org/drawingml/2006/main" xmlns:r="http://schemas.openxmlformats.org/officeDocument/2006/relationships" xmlns:p="http://schemas.openxmlformats.org/presentationml/2006/main">
+  <p:cSld>
+    <p:spTree>
+      <p:nvGrpSpPr>
+        <p:cNvPr id="1" name=""/>
+        <p:cNvGrpSpPr/>
+        <p:nvPr/>
+      </p:nvGrpSpPr>
+      <p:grpSpPr>
+        <a:xfrm>
+          <a:off x="0" y="0"/>
+          <a:ext cx="0" cy="0"/>
+          <a:chOff x="0" y="0"/>
+          <a:chExt cx="0" cy="0"/>
+        </a:xfrm>
+      </p:grpSpPr>
+      <p:sp>
+        <p:nvSpPr>
+          <p:cNvPr id="2" name="Slide Image Placeholder 1"/>
+          <p:cNvSpPr>
+            <a:spLocks noGrp="1" noRot="1" noChangeAspect="1"/>
+          </p:cNvSpPr>
+          <p:nvPr>
+            <p:ph type="sldImg"/>
+          </p:nvPr>
+        </p:nvSpPr>
+        <p:spPr/>
+      </p:sp>
+      <p:sp>
+        <p:nvSpPr>
+          <p:cNvPr id="3" name="Notes Placeholder 2"/>
+          <p:cNvSpPr>
+            <a:spLocks noGrp="1"/>
+          </p:cNvSpPr>
+          <p:nvPr>
+            <p:ph type="body" idx="1"/>
+          </p:nvPr>
+        </p:nvSpPr>
+        <p:spPr/>
+        <p:txBody>
+          <a:bodyPr/>
+          <a:lstStyle/>
+          <a:p>
+            <a:endParaRPr lang="en-US" dirty="0"/>
+          </a:p>
+        </p:txBody>
+      </p:sp>
+      <p:sp>
+        <p:nvSpPr>
+          <p:cNvPr id="4" name="Slide Number Placeholder 3"/>
+          <p:cNvSpPr>
+            <a:spLocks noGrp="1"/>
+          </p:cNvSpPr>
+          <p:nvPr>
+            <p:ph type="sldNum" sz="quarter" idx="10"/>
+          </p:nvPr>
+        </p:nvSpPr>
+        <p:spPr/>
+        <p:txBody>
+          <a:bodyPr/>
+          <a:lstStyle/>
+          <a:p>
+            <a:fld id="{6EABD195-3F5A-6047-8732-E4A2E4EDC177}" type="slidenum">
+              <a:rPr lang="en-US" smtClean="0"/>
+              <a:t>26</a:t>
+            </a:fld>
+            <a:endParaRPr lang="en-US"/>
+          </a:p>
+        </p:txBody>
+      </p:sp>
+    </p:spTree>
+    <p:extLst>
+      <p:ext uri="{BB962C8B-B14F-4D97-AF65-F5344CB8AC3E}">
+        <p14:creationId xmlns:p14="http://schemas.microsoft.com/office/powerpoint/2010/main" val="1841962377"/>
+      </p:ext>
+    </p:extLst>
+  </p:cSld>
+  <p:clrMapOvr>
+    <a:masterClrMapping/>
+  </p:clrMapOvr>
+</p:notes>
+</file>
+
 <file path=ppt/slideLayouts/slideLayout1.xml><?xml version="1.0" encoding="utf-8"?>
 <p:sldLayout xmlns:a="http://schemas.openxmlformats.org/drawingml/2006/main" xmlns:r="http://schemas.openxmlformats.org/officeDocument/2006/relationships" xmlns:p="http://schemas.openxmlformats.org/presentationml/2006/main" type="title" preserve="1">
   <p:cSld name="Title Slide">
@@ -47820,6 +47905,88 @@
           <a:chExt cx="0" cy="0"/>
         </a:xfrm>
       </p:grpSpPr>
+      <p:sp>
+        <p:nvSpPr>
+          <p:cNvPr id="2" name="Title 1"/>
+          <p:cNvSpPr>
+            <a:spLocks noGrp="1"/>
+          </p:cNvSpPr>
+          <p:nvPr>
+            <p:ph type="title"/>
+          </p:nvPr>
+        </p:nvSpPr>
+        <p:spPr/>
+        <p:txBody>
+          <a:bodyPr/>
+          <a:lstStyle/>
+          <a:p>
+            <a:r>
+              <a:rPr lang="en-US" dirty="0" smtClean="0"/>
+              <a:t>Random Forest Classifier 10k Cross Validation</a:t>
+            </a:r>
+            <a:endParaRPr lang="en-US" dirty="0"/>
+          </a:p>
+        </p:txBody>
+      </p:sp>
+      <p:pic>
+        <p:nvPicPr>
+          <p:cNvPr id="4" name="Content Placeholder 3"/>
+          <p:cNvPicPr>
+            <a:picLocks noGrp="1" noChangeAspect="1"/>
+          </p:cNvPicPr>
+          <p:nvPr>
+            <p:ph idx="1"/>
+          </p:nvPr>
+        </p:nvPicPr>
+        <p:blipFill>
+          <a:blip r:embed="rId3">
+            <a:extLst>
+              <a:ext uri="{28A0092B-C50C-407E-A947-70E740481C1C}">
+                <a14:useLocalDpi xmlns:a14="http://schemas.microsoft.com/office/drawing/2010/main" val="0"/>
+              </a:ext>
+            </a:extLst>
+          </a:blip>
+          <a:stretch>
+            <a:fillRect/>
+          </a:stretch>
+        </p:blipFill>
+        <p:spPr>
+          <a:xfrm>
+            <a:off x="1829333" y="1825625"/>
+            <a:ext cx="8533334" cy="4351338"/>
+          </a:xfrm>
+        </p:spPr>
+      </p:pic>
+    </p:spTree>
+    <p:extLst>
+      <p:ext uri="{BB962C8B-B14F-4D97-AF65-F5344CB8AC3E}">
+        <p14:creationId xmlns:p14="http://schemas.microsoft.com/office/powerpoint/2010/main" val="999679094"/>
+      </p:ext>
+    </p:extLst>
+  </p:cSld>
+  <p:clrMapOvr>
+    <a:masterClrMapping/>
+  </p:clrMapOvr>
+</p:sld>
+</file>
+
+<file path=ppt/slides/slide27.xml><?xml version="1.0" encoding="utf-8"?>
+<p:sld xmlns:a="http://schemas.openxmlformats.org/drawingml/2006/main" xmlns:r="http://schemas.openxmlformats.org/officeDocument/2006/relationships" xmlns:p="http://schemas.openxmlformats.org/presentationml/2006/main">
+  <p:cSld>
+    <p:spTree>
+      <p:nvGrpSpPr>
+        <p:cNvPr id="1" name=""/>
+        <p:cNvGrpSpPr/>
+        <p:nvPr/>
+      </p:nvGrpSpPr>
+      <p:grpSpPr>
+        <a:xfrm>
+          <a:off x="0" y="0"/>
+          <a:ext cx="0" cy="0"/>
+          <a:chOff x="0" y="0"/>
+          <a:chExt cx="0" cy="0"/>
+        </a:xfrm>
+      </p:grpSpPr>
       <p:graphicFrame>
         <p:nvGraphicFramePr>
           <p:cNvPr id="4" name="Diagram 3"/>

</xml_diff>